<commit_message>
Adding Presentation & few more analysis
</commit_message>
<xml_diff>
--- a/Futuristic_Airbnb.pptx
+++ b/Futuristic_Airbnb.pptx
@@ -3321,7 +3321,27 @@
                 <a:effectLst/>
                 <a:latin typeface="Helvetica Neue"/>
               </a:rPr>
-              <a:t>o find a better Accommodation for the guests in Berlin based on customer requirements. </a:t>
+              <a:t>o find a better Accommodation for the guests in Berlin based on </a:t>
+            </a:r>
+            <a:r>
+              <a:rPr lang="en-IN" sz="2900" b="0" i="0" u="none" strike="noStrike" dirty="0" smtClean="0">
+                <a:solidFill>
+                  <a:srgbClr val="000000"/>
+                </a:solidFill>
+                <a:effectLst/>
+                <a:latin typeface="Helvetica Neue"/>
+              </a:rPr>
+              <a:t>their </a:t>
+            </a:r>
+            <a:r>
+              <a:rPr lang="en-IN" sz="2900" b="0" i="0" u="none" strike="noStrike" dirty="0" smtClean="0">
+                <a:solidFill>
+                  <a:srgbClr val="000000"/>
+                </a:solidFill>
+                <a:effectLst/>
+                <a:latin typeface="Helvetica Neue"/>
+              </a:rPr>
+              <a:t>requirements. </a:t>
             </a:r>
             <a:endParaRPr lang="en-IN" sz="2900" dirty="0">
               <a:solidFill>
@@ -4005,26 +4025,9 @@
           <a:bodyPr/>
           <a:lstStyle/>
           <a:p>
-            <a:endParaRPr lang="en-IN" dirty="0" smtClean="0">
-              <a:hlinkClick r:id=""/>
-            </a:endParaRPr>
-          </a:p>
-          <a:p>
-            <a:endParaRPr lang="en-IN" dirty="0">
-              <a:hlinkClick r:id=""/>
-            </a:endParaRPr>
-          </a:p>
-          <a:p>
-            <a:endParaRPr lang="en-IN" dirty="0" smtClean="0">
-              <a:hlinkClick r:id=""/>
-            </a:endParaRPr>
-          </a:p>
-          <a:p>
-            <a:endParaRPr lang="en-IN">
-              <a:hlinkClick r:id=""/>
-            </a:endParaRPr>
-          </a:p>
-          <a:p>
+            <a:pPr marL="0" indent="0">
+              <a:buNone/>
+            </a:pPr>
             <a:endParaRPr lang="en-IN" dirty="0" smtClean="0">
               <a:hlinkClick r:id=""/>
             </a:endParaRPr>
@@ -4038,13 +4041,7 @@
               <a:rPr lang="en-IN" dirty="0" smtClean="0">
                 <a:hlinkClick r:id=""/>
               </a:rPr>
-              <a:t>https</a:t>
-            </a:r>
-            <a:r>
-              <a:rPr lang="en-IN" dirty="0" smtClean="0">
-                <a:hlinkClick r:id=""/>
-              </a:rPr>
-              <a:t>://www.kaggle.com/brittabettendorf/berlin-airbnb-data</a:t>
+              <a:t>https://www.kaggle.com/brittabettendorf/berlin-airbnb-data</a:t>
             </a:r>
             <a:endParaRPr lang="en-IN" dirty="0" smtClean="0"/>
           </a:p>
@@ -4127,7 +4124,7 @@
               </a:lnSpc>
             </a:pPr>
             <a:r>
-              <a:rPr lang="en-IN" b="1" u="sng" dirty="0" smtClean="0">
+              <a:rPr lang="en-IN" b="1" dirty="0" smtClean="0">
                 <a:ln w="0"/>
                 <a:solidFill>
                   <a:schemeClr val="bg1"/>
@@ -4144,7 +4141,7 @@
               <a:t/>
             </a:r>
             <a:br>
-              <a:rPr lang="en-IN" b="1" u="sng" dirty="0" smtClean="0">
+              <a:rPr lang="en-IN" b="1" dirty="0" smtClean="0">
                 <a:ln w="0"/>
                 <a:solidFill>
                   <a:schemeClr val="bg1"/>
@@ -4160,7 +4157,7 @@
               </a:rPr>
             </a:br>
             <a:r>
-              <a:rPr lang="en-IN" b="1" u="sng" dirty="0" smtClean="0">
+              <a:rPr lang="en-IN" b="1" dirty="0" smtClean="0">
                 <a:ln w="0"/>
                 <a:solidFill>
                   <a:schemeClr val="bg1"/>
@@ -4177,7 +4174,7 @@
               <a:t>Data Sources</a:t>
             </a:r>
             <a:r>
-              <a:rPr lang="en-IN" b="1" u="sng" dirty="0">
+              <a:rPr lang="en-IN" b="1" dirty="0">
                 <a:ln w="0"/>
                 <a:solidFill>
                   <a:schemeClr val="bg1"/>
@@ -4194,7 +4191,7 @@
               <a:t/>
             </a:r>
             <a:br>
-              <a:rPr lang="en-IN" b="1" u="sng" dirty="0">
+              <a:rPr lang="en-IN" b="1" dirty="0">
                 <a:ln w="0"/>
                 <a:solidFill>
                   <a:schemeClr val="bg1"/>
@@ -4229,7 +4226,7 @@
         </p:blipFill>
         <p:spPr>
           <a:xfrm>
-            <a:off x="3629025" y="3614738"/>
+            <a:off x="3629025" y="3552032"/>
             <a:ext cx="4933950" cy="2019300"/>
           </a:xfrm>
           <a:prstGeom prst="rect">
@@ -4309,30 +4306,6 @@
           <a:xfrm>
             <a:off x="2943225" y="0"/>
             <a:ext cx="5857875" cy="3209925"/>
-          </a:xfrm>
-          <a:prstGeom prst="rect">
-            <a:avLst/>
-          </a:prstGeom>
-        </p:spPr>
-      </p:pic>
-      <p:pic>
-        <p:nvPicPr>
-          <p:cNvPr id="5" name="Picture 4"/>
-          <p:cNvPicPr>
-            <a:picLocks noChangeAspect="1"/>
-          </p:cNvPicPr>
-          <p:nvPr/>
-        </p:nvPicPr>
-        <p:blipFill>
-          <a:blip r:embed="rId3"/>
-          <a:stretch>
-            <a:fillRect/>
-          </a:stretch>
-        </p:blipFill>
-        <p:spPr>
-          <a:xfrm>
-            <a:off x="1026587" y="4467225"/>
-            <a:ext cx="4933950" cy="2019300"/>
           </a:xfrm>
           <a:prstGeom prst="rect">
             <a:avLst/>

</xml_diff>

<commit_message>
Updating Presentation and code
</commit_message>
<xml_diff>
--- a/Futuristic_Airbnb.pptx
+++ b/Futuristic_Airbnb.pptx
@@ -11,7 +11,22 @@
     <p:sldId id="260" r:id="rId5"/>
     <p:sldId id="261" r:id="rId6"/>
     <p:sldId id="262" r:id="rId7"/>
-    <p:sldId id="257" r:id="rId8"/>
+    <p:sldId id="264" r:id="rId8"/>
+    <p:sldId id="265" r:id="rId9"/>
+    <p:sldId id="267" r:id="rId10"/>
+    <p:sldId id="268" r:id="rId11"/>
+    <p:sldId id="269" r:id="rId12"/>
+    <p:sldId id="270" r:id="rId13"/>
+    <p:sldId id="271" r:id="rId14"/>
+    <p:sldId id="272" r:id="rId15"/>
+    <p:sldId id="273" r:id="rId16"/>
+    <p:sldId id="274" r:id="rId17"/>
+    <p:sldId id="275" r:id="rId18"/>
+    <p:sldId id="276" r:id="rId19"/>
+    <p:sldId id="277" r:id="rId20"/>
+    <p:sldId id="266" r:id="rId21"/>
+    <p:sldId id="263" r:id="rId22"/>
+    <p:sldId id="257" r:id="rId23"/>
   </p:sldIdLst>
   <p:sldSz cx="12192000" cy="6858000"/>
   <p:notesSz cx="6858000" cy="9144000"/>
@@ -3155,6 +3170,868 @@
   <p:clrMapOvr>
     <a:masterClrMapping/>
   </p:clrMapOvr>
+  <p:timing>
+    <p:tnLst>
+      <p:par>
+        <p:cTn id="1" dur="indefinite" restart="never" nodeType="tmRoot"/>
+      </p:par>
+    </p:tnLst>
+  </p:timing>
+</p:sld>
+</file>
+
+<file path=ppt/slides/slide10.xml><?xml version="1.0" encoding="utf-8"?>
+<p:sld xmlns:a="http://schemas.openxmlformats.org/drawingml/2006/main" xmlns:r="http://schemas.openxmlformats.org/officeDocument/2006/relationships" xmlns:p="http://schemas.openxmlformats.org/presentationml/2006/main">
+  <p:cSld>
+    <p:spTree>
+      <p:nvGrpSpPr>
+        <p:cNvPr id="1" name=""/>
+        <p:cNvGrpSpPr/>
+        <p:nvPr/>
+      </p:nvGrpSpPr>
+      <p:grpSpPr>
+        <a:xfrm>
+          <a:off x="0" y="0"/>
+          <a:ext cx="0" cy="0"/>
+          <a:chOff x="0" y="0"/>
+          <a:chExt cx="0" cy="0"/>
+        </a:xfrm>
+      </p:grpSpPr>
+      <p:sp>
+        <p:nvSpPr>
+          <p:cNvPr id="2" name="Title 1"/>
+          <p:cNvSpPr>
+            <a:spLocks noGrp="1"/>
+          </p:cNvSpPr>
+          <p:nvPr>
+            <p:ph type="title"/>
+          </p:nvPr>
+        </p:nvSpPr>
+        <p:spPr/>
+        <p:txBody>
+          <a:bodyPr/>
+          <a:lstStyle/>
+          <a:p>
+            <a:endParaRPr lang="en-IN"/>
+          </a:p>
+        </p:txBody>
+      </p:sp>
+      <p:pic>
+        <p:nvPicPr>
+          <p:cNvPr id="3" name="Picture 2"/>
+          <p:cNvPicPr>
+            <a:picLocks noChangeAspect="1"/>
+          </p:cNvPicPr>
+          <p:nvPr/>
+        </p:nvPicPr>
+        <p:blipFill>
+          <a:blip r:embed="rId2"/>
+          <a:stretch>
+            <a:fillRect/>
+          </a:stretch>
+        </p:blipFill>
+        <p:spPr>
+          <a:xfrm>
+            <a:off x="1500187" y="1900236"/>
+            <a:ext cx="9191625" cy="4043363"/>
+          </a:xfrm>
+          <a:prstGeom prst="rect">
+            <a:avLst/>
+          </a:prstGeom>
+        </p:spPr>
+      </p:pic>
+    </p:spTree>
+    <p:extLst>
+      <p:ext uri="{BB962C8B-B14F-4D97-AF65-F5344CB8AC3E}">
+        <p14:creationId xmlns:p14="http://schemas.microsoft.com/office/powerpoint/2010/main" val="180897005"/>
+      </p:ext>
+    </p:extLst>
+  </p:cSld>
+  <p:clrMapOvr>
+    <a:masterClrMapping/>
+  </p:clrMapOvr>
+</p:sld>
+</file>
+
+<file path=ppt/slides/slide11.xml><?xml version="1.0" encoding="utf-8"?>
+<p:sld xmlns:a="http://schemas.openxmlformats.org/drawingml/2006/main" xmlns:r="http://schemas.openxmlformats.org/officeDocument/2006/relationships" xmlns:p="http://schemas.openxmlformats.org/presentationml/2006/main">
+  <p:cSld>
+    <p:spTree>
+      <p:nvGrpSpPr>
+        <p:cNvPr id="1" name=""/>
+        <p:cNvGrpSpPr/>
+        <p:nvPr/>
+      </p:nvGrpSpPr>
+      <p:grpSpPr>
+        <a:xfrm>
+          <a:off x="0" y="0"/>
+          <a:ext cx="0" cy="0"/>
+          <a:chOff x="0" y="0"/>
+          <a:chExt cx="0" cy="0"/>
+        </a:xfrm>
+      </p:grpSpPr>
+      <p:pic>
+        <p:nvPicPr>
+          <p:cNvPr id="2" name="Picture 1"/>
+          <p:cNvPicPr>
+            <a:picLocks noChangeAspect="1"/>
+          </p:cNvPicPr>
+          <p:nvPr/>
+        </p:nvPicPr>
+        <p:blipFill>
+          <a:blip r:embed="rId2"/>
+          <a:stretch>
+            <a:fillRect/>
+          </a:stretch>
+        </p:blipFill>
+        <p:spPr>
+          <a:xfrm>
+            <a:off x="514350" y="1042987"/>
+            <a:ext cx="5843587" cy="4600575"/>
+          </a:xfrm>
+          <a:prstGeom prst="rect">
+            <a:avLst/>
+          </a:prstGeom>
+        </p:spPr>
+      </p:pic>
+      <p:pic>
+        <p:nvPicPr>
+          <p:cNvPr id="3" name="Picture 2"/>
+          <p:cNvPicPr>
+            <a:picLocks noChangeAspect="1"/>
+          </p:cNvPicPr>
+          <p:nvPr/>
+        </p:nvPicPr>
+        <p:blipFill>
+          <a:blip r:embed="rId3"/>
+          <a:stretch>
+            <a:fillRect/>
+          </a:stretch>
+        </p:blipFill>
+        <p:spPr>
+          <a:xfrm>
+            <a:off x="6100762" y="1085850"/>
+            <a:ext cx="5905500" cy="5300663"/>
+          </a:xfrm>
+          <a:prstGeom prst="rect">
+            <a:avLst/>
+          </a:prstGeom>
+        </p:spPr>
+      </p:pic>
+    </p:spTree>
+    <p:extLst>
+      <p:ext uri="{BB962C8B-B14F-4D97-AF65-F5344CB8AC3E}">
+        <p14:creationId xmlns:p14="http://schemas.microsoft.com/office/powerpoint/2010/main" val="1843385309"/>
+      </p:ext>
+    </p:extLst>
+  </p:cSld>
+  <p:clrMapOvr>
+    <a:masterClrMapping/>
+  </p:clrMapOvr>
+</p:sld>
+</file>
+
+<file path=ppt/slides/slide12.xml><?xml version="1.0" encoding="utf-8"?>
+<p:sld xmlns:a="http://schemas.openxmlformats.org/drawingml/2006/main" xmlns:r="http://schemas.openxmlformats.org/officeDocument/2006/relationships" xmlns:p="http://schemas.openxmlformats.org/presentationml/2006/main">
+  <p:cSld>
+    <p:spTree>
+      <p:nvGrpSpPr>
+        <p:cNvPr id="1" name=""/>
+        <p:cNvGrpSpPr/>
+        <p:nvPr/>
+      </p:nvGrpSpPr>
+      <p:grpSpPr>
+        <a:xfrm>
+          <a:off x="0" y="0"/>
+          <a:ext cx="0" cy="0"/>
+          <a:chOff x="0" y="0"/>
+          <a:chExt cx="0" cy="0"/>
+        </a:xfrm>
+      </p:grpSpPr>
+      <p:pic>
+        <p:nvPicPr>
+          <p:cNvPr id="2" name="Picture 1"/>
+          <p:cNvPicPr>
+            <a:picLocks noChangeAspect="1"/>
+          </p:cNvPicPr>
+          <p:nvPr/>
+        </p:nvPicPr>
+        <p:blipFill>
+          <a:blip r:embed="rId2"/>
+          <a:stretch>
+            <a:fillRect/>
+          </a:stretch>
+        </p:blipFill>
+        <p:spPr>
+          <a:xfrm>
+            <a:off x="166686" y="0"/>
+            <a:ext cx="9029700" cy="3429000"/>
+          </a:xfrm>
+          <a:prstGeom prst="rect">
+            <a:avLst/>
+          </a:prstGeom>
+        </p:spPr>
+      </p:pic>
+      <p:pic>
+        <p:nvPicPr>
+          <p:cNvPr id="3" name="Picture 2"/>
+          <p:cNvPicPr>
+            <a:picLocks noChangeAspect="1"/>
+          </p:cNvPicPr>
+          <p:nvPr/>
+        </p:nvPicPr>
+        <p:blipFill rotWithShape="1">
+          <a:blip r:embed="rId3"/>
+          <a:srcRect b="12722"/>
+          <a:stretch/>
+        </p:blipFill>
+        <p:spPr>
+          <a:xfrm>
+            <a:off x="85724" y="3557589"/>
+            <a:ext cx="9191625" cy="3300412"/>
+          </a:xfrm>
+          <a:prstGeom prst="rect">
+            <a:avLst/>
+          </a:prstGeom>
+        </p:spPr>
+      </p:pic>
+      <p:pic>
+        <p:nvPicPr>
+          <p:cNvPr id="5" name="Picture 4"/>
+          <p:cNvPicPr>
+            <a:picLocks noChangeAspect="1"/>
+          </p:cNvPicPr>
+          <p:nvPr/>
+        </p:nvPicPr>
+        <p:blipFill>
+          <a:blip r:embed="rId4"/>
+          <a:stretch>
+            <a:fillRect/>
+          </a:stretch>
+        </p:blipFill>
+        <p:spPr>
+          <a:xfrm>
+            <a:off x="9596438" y="1042989"/>
+            <a:ext cx="2133600" cy="5029200"/>
+          </a:xfrm>
+          <a:prstGeom prst="rect">
+            <a:avLst/>
+          </a:prstGeom>
+          <a:ln>
+            <a:solidFill>
+              <a:schemeClr val="accent2">
+                <a:lumMod val="75000"/>
+              </a:schemeClr>
+            </a:solidFill>
+          </a:ln>
+        </p:spPr>
+      </p:pic>
+    </p:spTree>
+    <p:extLst>
+      <p:ext uri="{BB962C8B-B14F-4D97-AF65-F5344CB8AC3E}">
+        <p14:creationId xmlns:p14="http://schemas.microsoft.com/office/powerpoint/2010/main" val="1229603811"/>
+      </p:ext>
+    </p:extLst>
+  </p:cSld>
+  <p:clrMapOvr>
+    <a:masterClrMapping/>
+  </p:clrMapOvr>
+</p:sld>
+</file>
+
+<file path=ppt/slides/slide13.xml><?xml version="1.0" encoding="utf-8"?>
+<p:sld xmlns:a="http://schemas.openxmlformats.org/drawingml/2006/main" xmlns:r="http://schemas.openxmlformats.org/officeDocument/2006/relationships" xmlns:p="http://schemas.openxmlformats.org/presentationml/2006/main">
+  <p:cSld>
+    <p:spTree>
+      <p:nvGrpSpPr>
+        <p:cNvPr id="1" name=""/>
+        <p:cNvGrpSpPr/>
+        <p:nvPr/>
+      </p:nvGrpSpPr>
+      <p:grpSpPr>
+        <a:xfrm>
+          <a:off x="0" y="0"/>
+          <a:ext cx="0" cy="0"/>
+          <a:chOff x="0" y="0"/>
+          <a:chExt cx="0" cy="0"/>
+        </a:xfrm>
+      </p:grpSpPr>
+      <p:pic>
+        <p:nvPicPr>
+          <p:cNvPr id="2" name="Picture 1"/>
+          <p:cNvPicPr>
+            <a:picLocks noChangeAspect="1"/>
+          </p:cNvPicPr>
+          <p:nvPr/>
+        </p:nvPicPr>
+        <p:blipFill>
+          <a:blip r:embed="rId2"/>
+          <a:stretch>
+            <a:fillRect/>
+          </a:stretch>
+        </p:blipFill>
+        <p:spPr>
+          <a:xfrm>
+            <a:off x="357187" y="1390650"/>
+            <a:ext cx="9248775" cy="3733800"/>
+          </a:xfrm>
+          <a:prstGeom prst="rect">
+            <a:avLst/>
+          </a:prstGeom>
+        </p:spPr>
+      </p:pic>
+      <p:pic>
+        <p:nvPicPr>
+          <p:cNvPr id="3" name="Picture 2"/>
+          <p:cNvPicPr>
+            <a:picLocks noChangeAspect="1"/>
+          </p:cNvPicPr>
+          <p:nvPr/>
+        </p:nvPicPr>
+        <p:blipFill>
+          <a:blip r:embed="rId3"/>
+          <a:stretch>
+            <a:fillRect/>
+          </a:stretch>
+        </p:blipFill>
+        <p:spPr>
+          <a:xfrm>
+            <a:off x="9829801" y="1390650"/>
+            <a:ext cx="1681162" cy="3733800"/>
+          </a:xfrm>
+          <a:prstGeom prst="rect">
+            <a:avLst/>
+          </a:prstGeom>
+          <a:ln>
+            <a:solidFill>
+              <a:schemeClr val="accent2">
+                <a:lumMod val="75000"/>
+              </a:schemeClr>
+            </a:solidFill>
+          </a:ln>
+        </p:spPr>
+      </p:pic>
+    </p:spTree>
+    <p:extLst>
+      <p:ext uri="{BB962C8B-B14F-4D97-AF65-F5344CB8AC3E}">
+        <p14:creationId xmlns:p14="http://schemas.microsoft.com/office/powerpoint/2010/main" val="2586965981"/>
+      </p:ext>
+    </p:extLst>
+  </p:cSld>
+  <p:clrMapOvr>
+    <a:masterClrMapping/>
+  </p:clrMapOvr>
+</p:sld>
+</file>
+
+<file path=ppt/slides/slide14.xml><?xml version="1.0" encoding="utf-8"?>
+<p:sld xmlns:a="http://schemas.openxmlformats.org/drawingml/2006/main" xmlns:r="http://schemas.openxmlformats.org/officeDocument/2006/relationships" xmlns:p="http://schemas.openxmlformats.org/presentationml/2006/main">
+  <p:cSld>
+    <p:spTree>
+      <p:nvGrpSpPr>
+        <p:cNvPr id="1" name=""/>
+        <p:cNvGrpSpPr/>
+        <p:nvPr/>
+      </p:nvGrpSpPr>
+      <p:grpSpPr>
+        <a:xfrm>
+          <a:off x="0" y="0"/>
+          <a:ext cx="0" cy="0"/>
+          <a:chOff x="0" y="0"/>
+          <a:chExt cx="0" cy="0"/>
+        </a:xfrm>
+      </p:grpSpPr>
+      <p:pic>
+        <p:nvPicPr>
+          <p:cNvPr id="13" name="Picture 12"/>
+          <p:cNvPicPr>
+            <a:picLocks noChangeAspect="1"/>
+          </p:cNvPicPr>
+          <p:nvPr/>
+        </p:nvPicPr>
+        <p:blipFill rotWithShape="1">
+          <a:blip r:embed="rId2"/>
+          <a:srcRect r="48071"/>
+          <a:stretch/>
+        </p:blipFill>
+        <p:spPr>
+          <a:xfrm>
+            <a:off x="923924" y="433387"/>
+            <a:ext cx="4743451" cy="3305175"/>
+          </a:xfrm>
+          <a:prstGeom prst="rect">
+            <a:avLst/>
+          </a:prstGeom>
+        </p:spPr>
+      </p:pic>
+      <p:pic>
+        <p:nvPicPr>
+          <p:cNvPr id="14" name="Picture 13"/>
+          <p:cNvPicPr>
+            <a:picLocks noChangeAspect="1"/>
+          </p:cNvPicPr>
+          <p:nvPr/>
+        </p:nvPicPr>
+        <p:blipFill>
+          <a:blip r:embed="rId3"/>
+          <a:stretch>
+            <a:fillRect/>
+          </a:stretch>
+        </p:blipFill>
+        <p:spPr>
+          <a:xfrm>
+            <a:off x="5876925" y="433387"/>
+            <a:ext cx="4524375" cy="3162300"/>
+          </a:xfrm>
+          <a:prstGeom prst="rect">
+            <a:avLst/>
+          </a:prstGeom>
+        </p:spPr>
+      </p:pic>
+      <p:pic>
+        <p:nvPicPr>
+          <p:cNvPr id="15" name="Picture 14"/>
+          <p:cNvPicPr>
+            <a:picLocks noChangeAspect="1"/>
+          </p:cNvPicPr>
+          <p:nvPr/>
+        </p:nvPicPr>
+        <p:blipFill>
+          <a:blip r:embed="rId4"/>
+          <a:stretch>
+            <a:fillRect/>
+          </a:stretch>
+        </p:blipFill>
+        <p:spPr>
+          <a:xfrm>
+            <a:off x="1095375" y="3733800"/>
+            <a:ext cx="4572000" cy="3124200"/>
+          </a:xfrm>
+          <a:prstGeom prst="rect">
+            <a:avLst/>
+          </a:prstGeom>
+        </p:spPr>
+      </p:pic>
+      <p:pic>
+        <p:nvPicPr>
+          <p:cNvPr id="16" name="Picture 15"/>
+          <p:cNvPicPr>
+            <a:picLocks noChangeAspect="1"/>
+          </p:cNvPicPr>
+          <p:nvPr/>
+        </p:nvPicPr>
+        <p:blipFill>
+          <a:blip r:embed="rId5"/>
+          <a:stretch>
+            <a:fillRect/>
+          </a:stretch>
+        </p:blipFill>
+        <p:spPr>
+          <a:xfrm>
+            <a:off x="5876925" y="3595687"/>
+            <a:ext cx="4552950" cy="3095625"/>
+          </a:xfrm>
+          <a:prstGeom prst="rect">
+            <a:avLst/>
+          </a:prstGeom>
+        </p:spPr>
+      </p:pic>
+    </p:spTree>
+    <p:extLst>
+      <p:ext uri="{BB962C8B-B14F-4D97-AF65-F5344CB8AC3E}">
+        <p14:creationId xmlns:p14="http://schemas.microsoft.com/office/powerpoint/2010/main" val="2474232928"/>
+      </p:ext>
+    </p:extLst>
+  </p:cSld>
+  <p:clrMapOvr>
+    <a:masterClrMapping/>
+  </p:clrMapOvr>
+</p:sld>
+</file>
+
+<file path=ppt/slides/slide15.xml><?xml version="1.0" encoding="utf-8"?>
+<p:sld xmlns:a="http://schemas.openxmlformats.org/drawingml/2006/main" xmlns:r="http://schemas.openxmlformats.org/officeDocument/2006/relationships" xmlns:p="http://schemas.openxmlformats.org/presentationml/2006/main">
+  <p:cSld>
+    <p:spTree>
+      <p:nvGrpSpPr>
+        <p:cNvPr id="1" name=""/>
+        <p:cNvGrpSpPr/>
+        <p:nvPr/>
+      </p:nvGrpSpPr>
+      <p:grpSpPr>
+        <a:xfrm>
+          <a:off x="0" y="0"/>
+          <a:ext cx="0" cy="0"/>
+          <a:chOff x="0" y="0"/>
+          <a:chExt cx="0" cy="0"/>
+        </a:xfrm>
+      </p:grpSpPr>
+      <p:pic>
+        <p:nvPicPr>
+          <p:cNvPr id="2" name="Picture 1"/>
+          <p:cNvPicPr>
+            <a:picLocks noChangeAspect="1"/>
+          </p:cNvPicPr>
+          <p:nvPr/>
+        </p:nvPicPr>
+        <p:blipFill>
+          <a:blip r:embed="rId2"/>
+          <a:stretch>
+            <a:fillRect/>
+          </a:stretch>
+        </p:blipFill>
+        <p:spPr>
+          <a:xfrm>
+            <a:off x="1576387" y="1733550"/>
+            <a:ext cx="9039225" cy="3390900"/>
+          </a:xfrm>
+          <a:prstGeom prst="rect">
+            <a:avLst/>
+          </a:prstGeom>
+        </p:spPr>
+      </p:pic>
+    </p:spTree>
+    <p:extLst>
+      <p:ext uri="{BB962C8B-B14F-4D97-AF65-F5344CB8AC3E}">
+        <p14:creationId xmlns:p14="http://schemas.microsoft.com/office/powerpoint/2010/main" val="451815921"/>
+      </p:ext>
+    </p:extLst>
+  </p:cSld>
+  <p:clrMapOvr>
+    <a:masterClrMapping/>
+  </p:clrMapOvr>
+</p:sld>
+</file>
+
+<file path=ppt/slides/slide16.xml><?xml version="1.0" encoding="utf-8"?>
+<p:sld xmlns:a="http://schemas.openxmlformats.org/drawingml/2006/main" xmlns:r="http://schemas.openxmlformats.org/officeDocument/2006/relationships" xmlns:p="http://schemas.openxmlformats.org/presentationml/2006/main">
+  <p:cSld>
+    <p:spTree>
+      <p:nvGrpSpPr>
+        <p:cNvPr id="1" name=""/>
+        <p:cNvGrpSpPr/>
+        <p:nvPr/>
+      </p:nvGrpSpPr>
+      <p:grpSpPr>
+        <a:xfrm>
+          <a:off x="0" y="0"/>
+          <a:ext cx="0" cy="0"/>
+          <a:chOff x="0" y="0"/>
+          <a:chExt cx="0" cy="0"/>
+        </a:xfrm>
+      </p:grpSpPr>
+      <p:pic>
+        <p:nvPicPr>
+          <p:cNvPr id="2" name="Picture 1"/>
+          <p:cNvPicPr>
+            <a:picLocks noChangeAspect="1"/>
+          </p:cNvPicPr>
+          <p:nvPr/>
+        </p:nvPicPr>
+        <p:blipFill>
+          <a:blip r:embed="rId2"/>
+          <a:stretch>
+            <a:fillRect/>
+          </a:stretch>
+        </p:blipFill>
+        <p:spPr>
+          <a:xfrm>
+            <a:off x="1838325" y="1857375"/>
+            <a:ext cx="8515350" cy="3143250"/>
+          </a:xfrm>
+          <a:prstGeom prst="rect">
+            <a:avLst/>
+          </a:prstGeom>
+        </p:spPr>
+      </p:pic>
+    </p:spTree>
+    <p:extLst>
+      <p:ext uri="{BB962C8B-B14F-4D97-AF65-F5344CB8AC3E}">
+        <p14:creationId xmlns:p14="http://schemas.microsoft.com/office/powerpoint/2010/main" val="2050382231"/>
+      </p:ext>
+    </p:extLst>
+  </p:cSld>
+  <p:clrMapOvr>
+    <a:masterClrMapping/>
+  </p:clrMapOvr>
+</p:sld>
+</file>
+
+<file path=ppt/slides/slide17.xml><?xml version="1.0" encoding="utf-8"?>
+<p:sld xmlns:a="http://schemas.openxmlformats.org/drawingml/2006/main" xmlns:r="http://schemas.openxmlformats.org/officeDocument/2006/relationships" xmlns:p="http://schemas.openxmlformats.org/presentationml/2006/main">
+  <p:cSld>
+    <p:spTree>
+      <p:nvGrpSpPr>
+        <p:cNvPr id="1" name=""/>
+        <p:cNvGrpSpPr/>
+        <p:nvPr/>
+      </p:nvGrpSpPr>
+      <p:grpSpPr>
+        <a:xfrm>
+          <a:off x="0" y="0"/>
+          <a:ext cx="0" cy="0"/>
+          <a:chOff x="0" y="0"/>
+          <a:chExt cx="0" cy="0"/>
+        </a:xfrm>
+      </p:grpSpPr>
+      <p:pic>
+        <p:nvPicPr>
+          <p:cNvPr id="8" name="Picture 7"/>
+          <p:cNvPicPr>
+            <a:picLocks noChangeAspect="1"/>
+          </p:cNvPicPr>
+          <p:nvPr/>
+        </p:nvPicPr>
+        <p:blipFill rotWithShape="1">
+          <a:blip r:embed="rId2">
+            <a:extLst>
+              <a:ext uri="{28A0092B-C50C-407E-A947-70E740481C1C}">
+                <a14:useLocalDpi xmlns:a14="http://schemas.microsoft.com/office/drawing/2010/main" val="0"/>
+              </a:ext>
+            </a:extLst>
+          </a:blip>
+          <a:srcRect l="3970" r="6615"/>
+          <a:stretch/>
+        </p:blipFill>
+        <p:spPr>
+          <a:xfrm>
+            <a:off x="5486400" y="192082"/>
+            <a:ext cx="5472113" cy="3060000"/>
+          </a:xfrm>
+          <a:prstGeom prst="rect">
+            <a:avLst/>
+          </a:prstGeom>
+        </p:spPr>
+      </p:pic>
+      <p:pic>
+        <p:nvPicPr>
+          <p:cNvPr id="9" name="Picture 8"/>
+          <p:cNvPicPr>
+            <a:picLocks noChangeAspect="1"/>
+          </p:cNvPicPr>
+          <p:nvPr/>
+        </p:nvPicPr>
+        <p:blipFill rotWithShape="1">
+          <a:blip r:embed="rId3">
+            <a:extLst>
+              <a:ext uri="{28A0092B-C50C-407E-A947-70E740481C1C}">
+                <a14:useLocalDpi xmlns:a14="http://schemas.microsoft.com/office/drawing/2010/main" val="0"/>
+              </a:ext>
+            </a:extLst>
+          </a:blip>
+          <a:srcRect l="4298" t="1401" r="5588" b="-1401"/>
+          <a:stretch/>
+        </p:blipFill>
+        <p:spPr>
+          <a:xfrm>
+            <a:off x="300038" y="3442767"/>
+            <a:ext cx="5514975" cy="3060000"/>
+          </a:xfrm>
+          <a:prstGeom prst="rect">
+            <a:avLst/>
+          </a:prstGeom>
+        </p:spPr>
+      </p:pic>
+      <p:pic>
+        <p:nvPicPr>
+          <p:cNvPr id="10" name="Picture 9"/>
+          <p:cNvPicPr>
+            <a:picLocks noChangeAspect="1"/>
+          </p:cNvPicPr>
+          <p:nvPr/>
+        </p:nvPicPr>
+        <p:blipFill rotWithShape="1">
+          <a:blip r:embed="rId4">
+            <a:extLst>
+              <a:ext uri="{28A0092B-C50C-407E-A947-70E740481C1C}">
+                <a14:useLocalDpi xmlns:a14="http://schemas.microsoft.com/office/drawing/2010/main" val="0"/>
+              </a:ext>
+            </a:extLst>
+          </a:blip>
+          <a:srcRect l="5582" t="-467" r="6499" b="467"/>
+          <a:stretch/>
+        </p:blipFill>
+        <p:spPr>
+          <a:xfrm>
+            <a:off x="357187" y="192082"/>
+            <a:ext cx="5400675" cy="3060000"/>
+          </a:xfrm>
+          <a:prstGeom prst="rect">
+            <a:avLst/>
+          </a:prstGeom>
+        </p:spPr>
+      </p:pic>
+      <p:pic>
+        <p:nvPicPr>
+          <p:cNvPr id="11" name="Picture 10"/>
+          <p:cNvPicPr>
+            <a:picLocks noChangeAspect="1"/>
+          </p:cNvPicPr>
+          <p:nvPr/>
+        </p:nvPicPr>
+        <p:blipFill rotWithShape="1">
+          <a:blip r:embed="rId5">
+            <a:extLst>
+              <a:ext uri="{28A0092B-C50C-407E-A947-70E740481C1C}">
+                <a14:useLocalDpi xmlns:a14="http://schemas.microsoft.com/office/drawing/2010/main" val="0"/>
+              </a:ext>
+            </a:extLst>
+          </a:blip>
+          <a:srcRect l="5230" t="-467" r="8390" b="467"/>
+          <a:stretch/>
+        </p:blipFill>
+        <p:spPr>
+          <a:xfrm>
+            <a:off x="5672138" y="3442767"/>
+            <a:ext cx="5286375" cy="3060000"/>
+          </a:xfrm>
+          <a:prstGeom prst="rect">
+            <a:avLst/>
+          </a:prstGeom>
+        </p:spPr>
+      </p:pic>
+    </p:spTree>
+    <p:extLst>
+      <p:ext uri="{BB962C8B-B14F-4D97-AF65-F5344CB8AC3E}">
+        <p14:creationId xmlns:p14="http://schemas.microsoft.com/office/powerpoint/2010/main" val="3879019294"/>
+      </p:ext>
+    </p:extLst>
+  </p:cSld>
+  <p:clrMapOvr>
+    <a:masterClrMapping/>
+  </p:clrMapOvr>
+</p:sld>
+</file>
+
+<file path=ppt/slides/slide18.xml><?xml version="1.0" encoding="utf-8"?>
+<p:sld xmlns:a="http://schemas.openxmlformats.org/drawingml/2006/main" xmlns:r="http://schemas.openxmlformats.org/officeDocument/2006/relationships" xmlns:p="http://schemas.openxmlformats.org/presentationml/2006/main">
+  <p:cSld>
+    <p:spTree>
+      <p:nvGrpSpPr>
+        <p:cNvPr id="1" name=""/>
+        <p:cNvGrpSpPr/>
+        <p:nvPr/>
+      </p:nvGrpSpPr>
+      <p:grpSpPr>
+        <a:xfrm>
+          <a:off x="0" y="0"/>
+          <a:ext cx="0" cy="0"/>
+          <a:chOff x="0" y="0"/>
+          <a:chExt cx="0" cy="0"/>
+        </a:xfrm>
+      </p:grpSpPr>
+      <p:pic>
+        <p:nvPicPr>
+          <p:cNvPr id="2" name="Picture 1"/>
+          <p:cNvPicPr>
+            <a:picLocks noChangeAspect="1"/>
+          </p:cNvPicPr>
+          <p:nvPr/>
+        </p:nvPicPr>
+        <p:blipFill>
+          <a:blip r:embed="rId2"/>
+          <a:stretch>
+            <a:fillRect/>
+          </a:stretch>
+        </p:blipFill>
+        <p:spPr>
+          <a:xfrm>
+            <a:off x="1443037" y="1423987"/>
+            <a:ext cx="9305925" cy="4010025"/>
+          </a:xfrm>
+          <a:prstGeom prst="rect">
+            <a:avLst/>
+          </a:prstGeom>
+        </p:spPr>
+      </p:pic>
+    </p:spTree>
+    <p:extLst>
+      <p:ext uri="{BB962C8B-B14F-4D97-AF65-F5344CB8AC3E}">
+        <p14:creationId xmlns:p14="http://schemas.microsoft.com/office/powerpoint/2010/main" val="2317851649"/>
+      </p:ext>
+    </p:extLst>
+  </p:cSld>
+  <p:clrMapOvr>
+    <a:masterClrMapping/>
+  </p:clrMapOvr>
+</p:sld>
+</file>
+
+<file path=ppt/slides/slide19.xml><?xml version="1.0" encoding="utf-8"?>
+<p:sld xmlns:a="http://schemas.openxmlformats.org/drawingml/2006/main" xmlns:r="http://schemas.openxmlformats.org/officeDocument/2006/relationships" xmlns:p="http://schemas.openxmlformats.org/presentationml/2006/main">
+  <p:cSld>
+    <p:spTree>
+      <p:nvGrpSpPr>
+        <p:cNvPr id="1" name=""/>
+        <p:cNvGrpSpPr/>
+        <p:nvPr/>
+      </p:nvGrpSpPr>
+      <p:grpSpPr>
+        <a:xfrm>
+          <a:off x="0" y="0"/>
+          <a:ext cx="0" cy="0"/>
+          <a:chOff x="0" y="0"/>
+          <a:chExt cx="0" cy="0"/>
+        </a:xfrm>
+      </p:grpSpPr>
+      <p:pic>
+        <p:nvPicPr>
+          <p:cNvPr id="2" name="Picture 1"/>
+          <p:cNvPicPr>
+            <a:picLocks noChangeAspect="1"/>
+          </p:cNvPicPr>
+          <p:nvPr/>
+        </p:nvPicPr>
+        <p:blipFill>
+          <a:blip r:embed="rId2"/>
+          <a:stretch>
+            <a:fillRect/>
+          </a:stretch>
+        </p:blipFill>
+        <p:spPr>
+          <a:xfrm>
+            <a:off x="1395413" y="1114425"/>
+            <a:ext cx="5486400" cy="3681412"/>
+          </a:xfrm>
+          <a:prstGeom prst="rect">
+            <a:avLst/>
+          </a:prstGeom>
+        </p:spPr>
+      </p:pic>
+      <p:pic>
+        <p:nvPicPr>
+          <p:cNvPr id="3" name="Picture 2"/>
+          <p:cNvPicPr>
+            <a:picLocks noChangeAspect="1"/>
+          </p:cNvPicPr>
+          <p:nvPr/>
+        </p:nvPicPr>
+        <p:blipFill>
+          <a:blip r:embed="rId3"/>
+          <a:stretch>
+            <a:fillRect/>
+          </a:stretch>
+        </p:blipFill>
+        <p:spPr>
+          <a:xfrm>
+            <a:off x="7343775" y="1285875"/>
+            <a:ext cx="3657600" cy="3200400"/>
+          </a:xfrm>
+          <a:prstGeom prst="rect">
+            <a:avLst/>
+          </a:prstGeom>
+        </p:spPr>
+      </p:pic>
+    </p:spTree>
+    <p:extLst>
+      <p:ext uri="{BB962C8B-B14F-4D97-AF65-F5344CB8AC3E}">
+        <p14:creationId xmlns:p14="http://schemas.microsoft.com/office/powerpoint/2010/main" val="115725383"/>
+      </p:ext>
+    </p:extLst>
+  </p:cSld>
+  <p:clrMapOvr>
+    <a:masterClrMapping/>
+  </p:clrMapOvr>
 </p:sld>
 </file>
 
@@ -3470,10 +4347,17 @@
   <p:clrMapOvr>
     <a:masterClrMapping/>
   </p:clrMapOvr>
+  <p:timing>
+    <p:tnLst>
+      <p:par>
+        <p:cTn id="1" dur="indefinite" restart="never" nodeType="tmRoot"/>
+      </p:par>
+    </p:tnLst>
+  </p:timing>
 </p:sld>
 </file>
 
-<file path=ppt/slides/slide3.xml><?xml version="1.0" encoding="utf-8"?>
+<file path=ppt/slides/slide20.xml><?xml version="1.0" encoding="utf-8"?>
 <p:sld xmlns:a="http://schemas.openxmlformats.org/drawingml/2006/main" xmlns:r="http://schemas.openxmlformats.org/officeDocument/2006/relationships" xmlns:p="http://schemas.openxmlformats.org/presentationml/2006/main">
   <p:cSld>
     <p:spTree>
@@ -3492,7 +4376,35 @@
       </p:grpSpPr>
       <p:sp>
         <p:nvSpPr>
-          <p:cNvPr id="7" name="Title 6"/>
+          <p:cNvPr id="3" name="Content Placeholder 2"/>
+          <p:cNvSpPr>
+            <a:spLocks noGrp="1"/>
+          </p:cNvSpPr>
+          <p:nvPr>
+            <p:ph idx="1"/>
+          </p:nvPr>
+        </p:nvSpPr>
+        <p:spPr>
+          <a:xfrm>
+            <a:off x="838200" y="1628776"/>
+            <a:ext cx="10515600" cy="4548187"/>
+          </a:xfrm>
+        </p:spPr>
+        <p:txBody>
+          <a:bodyPr/>
+          <a:lstStyle/>
+          <a:p>
+            <a:r>
+              <a:rPr lang="en-IN" dirty="0" smtClean="0"/>
+              <a:t>Performing </a:t>
+            </a:r>
+            <a:endParaRPr lang="en-IN" dirty="0"/>
+          </a:p>
+        </p:txBody>
+      </p:sp>
+      <p:sp>
+        <p:nvSpPr>
+          <p:cNvPr id="4" name="Title 6"/>
           <p:cNvSpPr>
             <a:spLocks noGrp="1"/>
           </p:cNvSpPr>
@@ -3502,8 +4414,8 @@
         </p:nvSpPr>
         <p:spPr>
           <a:xfrm>
-            <a:off x="838200" y="279401"/>
-            <a:ext cx="10515600" cy="1035049"/>
+            <a:off x="838200" y="365126"/>
+            <a:ext cx="10515600" cy="1263650"/>
           </a:xfrm>
           <a:gradFill flip="none" rotWithShape="1">
             <a:gsLst>
@@ -3562,7 +4474,7 @@
               </a:lnSpc>
             </a:pPr>
             <a:r>
-              <a:rPr lang="en-IN" b="1" u="sng" dirty="0" smtClean="0">
+              <a:rPr lang="en-IN" b="1" dirty="0" smtClean="0">
                 <a:ln w="0"/>
                 <a:solidFill>
                   <a:schemeClr val="bg1"/>
@@ -3579,7 +4491,7 @@
               <a:t/>
             </a:r>
             <a:br>
-              <a:rPr lang="en-IN" b="1" u="sng" dirty="0" smtClean="0">
+              <a:rPr lang="en-IN" b="1" dirty="0" smtClean="0">
                 <a:ln w="0"/>
                 <a:solidFill>
                   <a:schemeClr val="bg1"/>
@@ -3609,7 +4521,7 @@
                 </a:effectLst>
                 <a:latin typeface="Britannic Bold" panose="020B0903060703020204" pitchFamily="34" charset="0"/>
               </a:rPr>
-              <a:t>Topics </a:t>
+              <a:t>Future Work</a:t>
             </a:r>
             <a:r>
               <a:rPr lang="en-IN" b="1" dirty="0">
@@ -3626,27 +4538,10 @@
                 </a:effectLst>
                 <a:latin typeface="Britannic Bold" panose="020B0903060703020204" pitchFamily="34" charset="0"/>
               </a:rPr>
-              <a:t>Covered in Presentation</a:t>
-            </a:r>
-            <a:r>
-              <a:rPr lang="en-IN" b="1" u="sng" dirty="0">
-                <a:ln w="0"/>
-                <a:solidFill>
-                  <a:schemeClr val="bg1"/>
-                </a:solidFill>
-                <a:effectLst>
-                  <a:outerShdw blurRad="38100" dist="25400" dir="5400000" algn="ctr" rotWithShape="0">
-                    <a:srgbClr val="6E747A">
-                      <a:alpha val="43000"/>
-                    </a:srgbClr>
-                  </a:outerShdw>
-                </a:effectLst>
-                <a:latin typeface="Britannic Bold" panose="020B0903060703020204" pitchFamily="34" charset="0"/>
-              </a:rPr>
               <a:t/>
             </a:r>
             <a:br>
-              <a:rPr lang="en-IN" b="1" u="sng" dirty="0">
+              <a:rPr lang="en-IN" b="1" dirty="0">
                 <a:ln w="0"/>
                 <a:solidFill>
                   <a:schemeClr val="bg1"/>
@@ -3665,63 +4560,50 @@
           </a:p>
         </p:txBody>
       </p:sp>
-      <p:pic>
-        <p:nvPicPr>
-          <p:cNvPr id="5" name="Content Placeholder 4"/>
-          <p:cNvPicPr>
-            <a:picLocks noGrp="1" noChangeAspect="1"/>
-          </p:cNvPicPr>
-          <p:nvPr>
-            <p:ph sz="half" idx="1"/>
-          </p:nvPr>
-        </p:nvPicPr>
-        <p:blipFill>
-          <a:blip r:embed="rId2"/>
-          <a:stretch>
-            <a:fillRect/>
-          </a:stretch>
-        </p:blipFill>
-        <p:spPr>
-          <a:xfrm>
-            <a:off x="885824" y="1314450"/>
-            <a:ext cx="4714875" cy="4836320"/>
-          </a:xfrm>
-          <a:prstGeom prst="rect">
-            <a:avLst/>
-          </a:prstGeom>
-          <a:ln w="28575"/>
-        </p:spPr>
-        <p:style>
-          <a:lnRef idx="2">
-            <a:schemeClr val="accent2">
-              <a:shade val="50000"/>
-            </a:schemeClr>
-          </a:lnRef>
-          <a:fillRef idx="1">
-            <a:schemeClr val="accent2"/>
-          </a:fillRef>
-          <a:effectRef idx="0">
-            <a:schemeClr val="accent2"/>
-          </a:effectRef>
-          <a:fontRef idx="minor">
-            <a:schemeClr val="lt1"/>
-          </a:fontRef>
-        </p:style>
-      </p:pic>
-      <p:sp>
-        <p:nvSpPr>
-          <p:cNvPr id="4" name="Text Placeholder 3"/>
-          <p:cNvSpPr>
-            <a:spLocks noGrp="1"/>
-          </p:cNvSpPr>
-          <p:nvPr>
-            <p:ph sz="half" idx="2"/>
-          </p:nvPr>
-        </p:nvSpPr>
-        <p:spPr>
-          <a:xfrm>
-            <a:off x="5600700" y="1314450"/>
-            <a:ext cx="5753100" cy="4852989"/>
+    </p:spTree>
+    <p:extLst>
+      <p:ext uri="{BB962C8B-B14F-4D97-AF65-F5344CB8AC3E}">
+        <p14:creationId xmlns:p14="http://schemas.microsoft.com/office/powerpoint/2010/main" val="3613892963"/>
+      </p:ext>
+    </p:extLst>
+  </p:cSld>
+  <p:clrMapOvr>
+    <a:masterClrMapping/>
+  </p:clrMapOvr>
+</p:sld>
+</file>
+
+<file path=ppt/slides/slide21.xml><?xml version="1.0" encoding="utf-8"?>
+<p:sld xmlns:a="http://schemas.openxmlformats.org/drawingml/2006/main" xmlns:r="http://schemas.openxmlformats.org/officeDocument/2006/relationships" xmlns:p="http://schemas.openxmlformats.org/presentationml/2006/main">
+  <p:cSld>
+    <p:spTree>
+      <p:nvGrpSpPr>
+        <p:cNvPr id="1" name=""/>
+        <p:cNvGrpSpPr/>
+        <p:nvPr/>
+      </p:nvGrpSpPr>
+      <p:grpSpPr>
+        <a:xfrm>
+          <a:off x="0" y="0"/>
+          <a:ext cx="0" cy="0"/>
+          <a:chOff x="0" y="0"/>
+          <a:chExt cx="0" cy="0"/>
+        </a:xfrm>
+      </p:grpSpPr>
+      <p:sp>
+        <p:nvSpPr>
+          <p:cNvPr id="3" name="Title 6"/>
+          <p:cNvSpPr>
+            <a:spLocks noGrp="1"/>
+          </p:cNvSpPr>
+          <p:nvPr>
+            <p:ph type="title"/>
+          </p:nvPr>
+        </p:nvSpPr>
+        <p:spPr>
+          <a:xfrm>
+            <a:off x="838200" y="365126"/>
+            <a:ext cx="10515600" cy="877888"/>
           </a:xfrm>
           <a:gradFill flip="none" rotWithShape="1">
             <a:gsLst>
@@ -3770,215 +4652,198 @@
         </p:style>
         <p:txBody>
           <a:bodyPr>
-            <a:normAutofit/>
+            <a:normAutofit fontScale="90000"/>
           </a:bodyPr>
           <a:lstStyle/>
           <a:p>
-            <a:pPr marL="457200" indent="-457200">
+            <a:pPr algn="ctr">
               <a:lnSpc>
-                <a:spcPct val="110000"/>
+                <a:spcPct val="100000"/>
               </a:lnSpc>
+            </a:pPr>
+            <a:r>
+              <a:rPr lang="en-IN" b="1" dirty="0" smtClean="0">
+                <a:ln w="0"/>
+                <a:solidFill>
+                  <a:schemeClr val="bg1"/>
+                </a:solidFill>
+                <a:effectLst>
+                  <a:outerShdw blurRad="38100" dist="25400" dir="5400000" algn="ctr" rotWithShape="0">
+                    <a:srgbClr val="6E747A">
+                      <a:alpha val="43000"/>
+                    </a:srgbClr>
+                  </a:outerShdw>
+                </a:effectLst>
+                <a:latin typeface="Britannic Bold" panose="020B0903060703020204" pitchFamily="34" charset="0"/>
+              </a:rPr>
+              <a:t/>
+            </a:r>
+            <a:br>
+              <a:rPr lang="en-IN" b="1" dirty="0" smtClean="0">
+                <a:ln w="0"/>
+                <a:solidFill>
+                  <a:schemeClr val="bg1"/>
+                </a:solidFill>
+                <a:effectLst>
+                  <a:outerShdw blurRad="38100" dist="25400" dir="5400000" algn="ctr" rotWithShape="0">
+                    <a:srgbClr val="6E747A">
+                      <a:alpha val="43000"/>
+                    </a:srgbClr>
+                  </a:outerShdw>
+                </a:effectLst>
+                <a:latin typeface="Britannic Bold" panose="020B0903060703020204" pitchFamily="34" charset="0"/>
+              </a:rPr>
+            </a:br>
+            <a:r>
+              <a:rPr lang="en-IN" b="1" dirty="0" smtClean="0">
+                <a:ln w="0"/>
+                <a:solidFill>
+                  <a:schemeClr val="bg1"/>
+                </a:solidFill>
+                <a:effectLst>
+                  <a:outerShdw blurRad="38100" dist="25400" dir="5400000" algn="ctr" rotWithShape="0">
+                    <a:srgbClr val="6E747A">
+                      <a:alpha val="43000"/>
+                    </a:srgbClr>
+                  </a:outerShdw>
+                </a:effectLst>
+                <a:latin typeface="Britannic Bold" panose="020B0903060703020204" pitchFamily="34" charset="0"/>
+              </a:rPr>
+              <a:t>References</a:t>
+            </a:r>
+            <a:r>
+              <a:rPr lang="en-IN" b="1" dirty="0">
+                <a:ln w="0"/>
+                <a:solidFill>
+                  <a:schemeClr val="bg1"/>
+                </a:solidFill>
+                <a:effectLst>
+                  <a:outerShdw blurRad="38100" dist="25400" dir="5400000" algn="ctr" rotWithShape="0">
+                    <a:srgbClr val="6E747A">
+                      <a:alpha val="43000"/>
+                    </a:srgbClr>
+                  </a:outerShdw>
+                </a:effectLst>
+                <a:latin typeface="Britannic Bold" panose="020B0903060703020204" pitchFamily="34" charset="0"/>
+              </a:rPr>
+              <a:t/>
+            </a:r>
+            <a:br>
+              <a:rPr lang="en-IN" b="1" dirty="0">
+                <a:ln w="0"/>
+                <a:solidFill>
+                  <a:schemeClr val="bg1"/>
+                </a:solidFill>
+                <a:effectLst>
+                  <a:outerShdw blurRad="38100" dist="25400" dir="5400000" algn="ctr" rotWithShape="0">
+                    <a:srgbClr val="6E747A">
+                      <a:alpha val="43000"/>
+                    </a:srgbClr>
+                  </a:outerShdw>
+                </a:effectLst>
+                <a:latin typeface="Britannic Bold" panose="020B0903060703020204" pitchFamily="34" charset="0"/>
+              </a:rPr>
+            </a:br>
+            <a:endParaRPr lang="en-IN" dirty="0"/>
+          </a:p>
+        </p:txBody>
+      </p:sp>
+      <p:sp>
+        <p:nvSpPr>
+          <p:cNvPr id="4" name="Content Placeholder 3"/>
+          <p:cNvSpPr>
+            <a:spLocks noGrp="1"/>
+          </p:cNvSpPr>
+          <p:nvPr>
+            <p:ph idx="1"/>
+          </p:nvPr>
+        </p:nvSpPr>
+        <p:spPr>
+          <a:xfrm>
+            <a:off x="838200" y="1243014"/>
+            <a:ext cx="10515600" cy="4933949"/>
+          </a:xfrm>
+          <a:ln w="28575">
+            <a:solidFill>
+              <a:schemeClr val="accent2">
+                <a:lumMod val="75000"/>
+              </a:schemeClr>
+            </a:solidFill>
+          </a:ln>
+        </p:spPr>
+        <p:txBody>
+          <a:bodyPr/>
+          <a:lstStyle/>
+          <a:p>
+            <a:pPr>
               <a:buFont typeface="Wingdings" panose="05000000000000000000" pitchFamily="2" charset="2"/>
               <a:buChar char="Ø"/>
             </a:pPr>
             <a:r>
-              <a:rPr lang="en-IN" sz="3200" b="1" dirty="0" smtClean="0">
-                <a:solidFill>
-                  <a:schemeClr val="bg1"/>
-                </a:solidFill>
-                <a:latin typeface="Britannic Bold" panose="020B0903060703020204" pitchFamily="34" charset="0"/>
+              <a:rPr lang="en-IN" sz="2400" dirty="0">
+                <a:hlinkClick r:id="rId2"/>
               </a:rPr>
-              <a:t>Data Sources</a:t>
-            </a:r>
-          </a:p>
-          <a:p>
-            <a:pPr marL="457200" indent="-457200">
-              <a:lnSpc>
-                <a:spcPct val="110000"/>
-              </a:lnSpc>
+              <a:t>http://insideairbnb.com/berlin/</a:t>
+            </a:r>
+            <a:endParaRPr lang="en-IN" sz="2400" u="sng" dirty="0" smtClean="0">
+              <a:hlinkClick r:id="rId3"/>
+            </a:endParaRPr>
+          </a:p>
+          <a:p>
+            <a:pPr>
               <a:buFont typeface="Wingdings" panose="05000000000000000000" pitchFamily="2" charset="2"/>
               <a:buChar char="Ø"/>
             </a:pPr>
             <a:r>
-              <a:rPr lang="en-IN" sz="3200" b="1" dirty="0" smtClean="0">
-                <a:solidFill>
-                  <a:schemeClr val="bg1"/>
-                </a:solidFill>
-                <a:latin typeface="Britannic Bold" panose="020B0903060703020204" pitchFamily="34" charset="0"/>
+              <a:rPr lang="en-IN" sz="2400" u="sng" dirty="0" smtClean="0">
+                <a:hlinkClick r:id="rId3"/>
               </a:rPr>
-              <a:t>Data Clean up &amp; Exploration</a:t>
-            </a:r>
-          </a:p>
-          <a:p>
-            <a:pPr marL="457200" indent="-457200">
-              <a:lnSpc>
-                <a:spcPct val="110000"/>
-              </a:lnSpc>
+              <a:t>https</a:t>
+            </a:r>
+            <a:r>
+              <a:rPr lang="en-IN" sz="2400" u="sng" dirty="0">
+                <a:hlinkClick r:id="rId3"/>
+              </a:rPr>
+              <a:t>://</a:t>
+            </a:r>
+            <a:r>
+              <a:rPr lang="en-IN" sz="2400" u="sng" dirty="0" smtClean="0">
+                <a:hlinkClick r:id="rId3"/>
+              </a:rPr>
+              <a:t>www.dataquest.io/blog/tutorial-time-series-analysis-with-pandas/</a:t>
+            </a:r>
+            <a:endParaRPr lang="en-IN" sz="2400" u="sng" dirty="0" smtClean="0"/>
+          </a:p>
+          <a:p>
+            <a:pPr>
               <a:buFont typeface="Wingdings" panose="05000000000000000000" pitchFamily="2" charset="2"/>
               <a:buChar char="Ø"/>
             </a:pPr>
-            <a:r>
-              <a:rPr lang="en-IN" sz="3200" b="1" dirty="0" smtClean="0">
-                <a:solidFill>
-                  <a:schemeClr val="bg1"/>
-                </a:solidFill>
-                <a:latin typeface="Britannic Bold" panose="020B0903060703020204" pitchFamily="34" charset="0"/>
-              </a:rPr>
-              <a:t>Data Analysis</a:t>
-            </a:r>
-          </a:p>
-          <a:p>
-            <a:pPr marL="457200" indent="-457200">
-              <a:lnSpc>
-                <a:spcPct val="110000"/>
-              </a:lnSpc>
-              <a:buFont typeface="Wingdings" panose="05000000000000000000" pitchFamily="2" charset="2"/>
-              <a:buChar char="Ø"/>
-            </a:pPr>
-            <a:r>
-              <a:rPr lang="en-IN" sz="3200" b="1" dirty="0" smtClean="0">
-                <a:solidFill>
-                  <a:schemeClr val="bg1"/>
-                </a:solidFill>
-                <a:latin typeface="Britannic Bold" panose="020B0903060703020204" pitchFamily="34" charset="0"/>
-              </a:rPr>
-              <a:t>Outcomes/Take </a:t>
-            </a:r>
-            <a:r>
-              <a:rPr lang="en-IN" sz="3200" b="1" dirty="0" err="1" smtClean="0">
-                <a:solidFill>
-                  <a:schemeClr val="bg1"/>
-                </a:solidFill>
-                <a:latin typeface="Britannic Bold" panose="020B0903060703020204" pitchFamily="34" charset="0"/>
-              </a:rPr>
-              <a:t>Aways</a:t>
-            </a:r>
-            <a:endParaRPr lang="en-IN" sz="3200" b="1" dirty="0" smtClean="0">
-              <a:solidFill>
-                <a:schemeClr val="bg1"/>
-              </a:solidFill>
-              <a:latin typeface="Britannic Bold" panose="020B0903060703020204" pitchFamily="34" charset="0"/>
-            </a:endParaRPr>
-          </a:p>
-          <a:p>
-            <a:pPr marL="457200" indent="-457200">
-              <a:lnSpc>
-                <a:spcPct val="110000"/>
-              </a:lnSpc>
-              <a:buFont typeface="Wingdings" panose="05000000000000000000" pitchFamily="2" charset="2"/>
-              <a:buChar char="Ø"/>
-            </a:pPr>
-            <a:r>
-              <a:rPr lang="en-IN" sz="3200" b="1" dirty="0" smtClean="0">
-                <a:solidFill>
-                  <a:schemeClr val="bg1"/>
-                </a:solidFill>
-                <a:latin typeface="Britannic Bold" panose="020B0903060703020204" pitchFamily="34" charset="0"/>
-              </a:rPr>
-              <a:t>Conclusion</a:t>
-            </a:r>
-          </a:p>
-          <a:p>
-            <a:pPr marL="457200" indent="-457200">
-              <a:lnSpc>
-                <a:spcPct val="110000"/>
-              </a:lnSpc>
-              <a:buFont typeface="Wingdings" panose="05000000000000000000" pitchFamily="2" charset="2"/>
-              <a:buChar char="Ø"/>
-            </a:pPr>
-            <a:r>
-              <a:rPr lang="en-IN" sz="3200" b="1" dirty="0" smtClean="0">
-                <a:solidFill>
-                  <a:schemeClr val="bg1"/>
-                </a:solidFill>
-                <a:latin typeface="Britannic Bold" panose="020B0903060703020204" pitchFamily="34" charset="0"/>
-              </a:rPr>
-              <a:t>Future Work</a:t>
-            </a:r>
-          </a:p>
-          <a:p>
-            <a:pPr marL="457200" indent="-457200">
-              <a:lnSpc>
-                <a:spcPct val="110000"/>
-              </a:lnSpc>
-              <a:buFont typeface="Wingdings" panose="05000000000000000000" pitchFamily="2" charset="2"/>
-              <a:buChar char="Ø"/>
-            </a:pPr>
-            <a:endParaRPr lang="en-IN" sz="3200" b="1" dirty="0" smtClean="0">
-              <a:solidFill>
-                <a:schemeClr val="bg1"/>
-              </a:solidFill>
-              <a:latin typeface="Britannic Bold" panose="020B0903060703020204" pitchFamily="34" charset="0"/>
-            </a:endParaRPr>
-          </a:p>
-          <a:p>
-            <a:pPr>
-              <a:lnSpc>
-                <a:spcPct val="110000"/>
-              </a:lnSpc>
-            </a:pPr>
-            <a:endParaRPr lang="en-IN" sz="3200" b="1" dirty="0" smtClean="0">
-              <a:solidFill>
-                <a:schemeClr val="bg1"/>
-              </a:solidFill>
-              <a:latin typeface="Britannic Bold" panose="020B0903060703020204" pitchFamily="34" charset="0"/>
-            </a:endParaRPr>
-          </a:p>
-          <a:p>
-            <a:pPr marL="457200" indent="-457200">
-              <a:lnSpc>
-                <a:spcPct val="110000"/>
-              </a:lnSpc>
-              <a:buFont typeface="Wingdings" panose="05000000000000000000" pitchFamily="2" charset="2"/>
-              <a:buChar char="Ø"/>
-            </a:pPr>
-            <a:endParaRPr lang="en-IN" sz="3200" b="1" dirty="0">
-              <a:solidFill>
-                <a:schemeClr val="bg1"/>
-              </a:solidFill>
-              <a:latin typeface="Britannic Bold" panose="020B0903060703020204" pitchFamily="34" charset="0"/>
-            </a:endParaRPr>
-          </a:p>
-        </p:txBody>
-      </p:sp>
-      <p:pic>
-        <p:nvPicPr>
-          <p:cNvPr id="9" name="Picture 8"/>
-          <p:cNvPicPr>
-            <a:picLocks noChangeAspect="1"/>
-          </p:cNvPicPr>
-          <p:nvPr/>
-        </p:nvPicPr>
-        <p:blipFill>
-          <a:blip r:embed="rId3"/>
-          <a:stretch>
-            <a:fillRect/>
-          </a:stretch>
-        </p:blipFill>
-        <p:spPr>
-          <a:xfrm>
-            <a:off x="10106024" y="6167439"/>
-            <a:ext cx="2085975" cy="690561"/>
-          </a:xfrm>
-          <a:prstGeom prst="rect">
-            <a:avLst/>
-          </a:prstGeom>
-        </p:spPr>
-      </p:pic>
+            <a:endParaRPr lang="en-IN" sz="2400" dirty="0"/>
+          </a:p>
+        </p:txBody>
+      </p:sp>
     </p:spTree>
     <p:extLst>
       <p:ext uri="{BB962C8B-B14F-4D97-AF65-F5344CB8AC3E}">
-        <p14:creationId xmlns:p14="http://schemas.microsoft.com/office/powerpoint/2010/main" val="897284640"/>
+        <p14:creationId xmlns:p14="http://schemas.microsoft.com/office/powerpoint/2010/main" val="272497744"/>
       </p:ext>
     </p:extLst>
   </p:cSld>
   <p:clrMapOvr>
     <a:masterClrMapping/>
   </p:clrMapOvr>
+  <p:timing>
+    <p:tnLst>
+      <p:par>
+        <p:cTn id="1" dur="indefinite" restart="never" nodeType="tmRoot"/>
+      </p:par>
+    </p:tnLst>
+  </p:timing>
 </p:sld>
 </file>
 
-<file path=ppt/slides/slide4.xml><?xml version="1.0" encoding="utf-8"?>
+<file path=ppt/slides/slide22.xml><?xml version="1.0" encoding="utf-8"?>
 <p:sld xmlns:a="http://schemas.openxmlformats.org/drawingml/2006/main" xmlns:r="http://schemas.openxmlformats.org/officeDocument/2006/relationships" xmlns:p="http://schemas.openxmlformats.org/presentationml/2006/main">
   <p:cSld>
     <p:spTree>
@@ -3995,9 +4860,63 @@
           <a:chExt cx="0" cy="0"/>
         </a:xfrm>
       </p:grpSpPr>
-      <p:sp>
-        <p:nvSpPr>
-          <p:cNvPr id="5" name="Title 6"/>
+      <p:pic>
+        <p:nvPicPr>
+          <p:cNvPr id="3" name="Picture 2"/>
+          <p:cNvPicPr>
+            <a:picLocks noChangeAspect="1"/>
+          </p:cNvPicPr>
+          <p:nvPr/>
+        </p:nvPicPr>
+        <p:blipFill>
+          <a:blip r:embed="rId2"/>
+          <a:stretch>
+            <a:fillRect/>
+          </a:stretch>
+        </p:blipFill>
+        <p:spPr>
+          <a:xfrm>
+            <a:off x="2943225" y="0"/>
+            <a:ext cx="5857875" cy="3209925"/>
+          </a:xfrm>
+          <a:prstGeom prst="rect">
+            <a:avLst/>
+          </a:prstGeom>
+        </p:spPr>
+      </p:pic>
+    </p:spTree>
+    <p:extLst>
+      <p:ext uri="{BB962C8B-B14F-4D97-AF65-F5344CB8AC3E}">
+        <p14:creationId xmlns:p14="http://schemas.microsoft.com/office/powerpoint/2010/main" val="2396009489"/>
+      </p:ext>
+    </p:extLst>
+  </p:cSld>
+  <p:clrMapOvr>
+    <a:masterClrMapping/>
+  </p:clrMapOvr>
+</p:sld>
+</file>
+
+<file path=ppt/slides/slide3.xml><?xml version="1.0" encoding="utf-8"?>
+<p:sld xmlns:a="http://schemas.openxmlformats.org/drawingml/2006/main" xmlns:r="http://schemas.openxmlformats.org/officeDocument/2006/relationships" xmlns:p="http://schemas.openxmlformats.org/presentationml/2006/main">
+  <p:cSld>
+    <p:spTree>
+      <p:nvGrpSpPr>
+        <p:cNvPr id="1" name=""/>
+        <p:cNvGrpSpPr/>
+        <p:nvPr/>
+      </p:nvGrpSpPr>
+      <p:grpSpPr>
+        <a:xfrm>
+          <a:off x="0" y="0"/>
+          <a:ext cx="0" cy="0"/>
+          <a:chOff x="0" y="0"/>
+          <a:chExt cx="0" cy="0"/>
+        </a:xfrm>
+      </p:grpSpPr>
+      <p:sp>
+        <p:nvSpPr>
+          <p:cNvPr id="7" name="Title 6"/>
           <p:cNvSpPr>
             <a:spLocks noGrp="1"/>
           </p:cNvSpPr>
@@ -4007,8 +4926,8 @@
         </p:nvSpPr>
         <p:spPr>
           <a:xfrm>
-            <a:off x="839788" y="365125"/>
-            <a:ext cx="10515600" cy="1143455"/>
+            <a:off x="838200" y="279401"/>
+            <a:ext cx="10515600" cy="1035049"/>
           </a:xfrm>
           <a:gradFill flip="none" rotWithShape="1">
             <a:gsLst>
@@ -4067,6 +4986,39 @@
               </a:lnSpc>
             </a:pPr>
             <a:r>
+              <a:rPr lang="en-IN" b="1" u="sng" dirty="0" smtClean="0">
+                <a:ln w="0"/>
+                <a:solidFill>
+                  <a:schemeClr val="bg1"/>
+                </a:solidFill>
+                <a:effectLst>
+                  <a:outerShdw blurRad="38100" dist="25400" dir="5400000" algn="ctr" rotWithShape="0">
+                    <a:srgbClr val="6E747A">
+                      <a:alpha val="43000"/>
+                    </a:srgbClr>
+                  </a:outerShdw>
+                </a:effectLst>
+                <a:latin typeface="Britannic Bold" panose="020B0903060703020204" pitchFamily="34" charset="0"/>
+              </a:rPr>
+              <a:t/>
+            </a:r>
+            <a:br>
+              <a:rPr lang="en-IN" b="1" u="sng" dirty="0" smtClean="0">
+                <a:ln w="0"/>
+                <a:solidFill>
+                  <a:schemeClr val="bg1"/>
+                </a:solidFill>
+                <a:effectLst>
+                  <a:outerShdw blurRad="38100" dist="25400" dir="5400000" algn="ctr" rotWithShape="0">
+                    <a:srgbClr val="6E747A">
+                      <a:alpha val="43000"/>
+                    </a:srgbClr>
+                  </a:outerShdw>
+                </a:effectLst>
+                <a:latin typeface="Britannic Bold" panose="020B0903060703020204" pitchFamily="34" charset="0"/>
+              </a:rPr>
+            </a:br>
+            <a:r>
               <a:rPr lang="en-IN" b="1" dirty="0" smtClean="0">
                 <a:ln w="0"/>
                 <a:solidFill>
@@ -4081,40 +5033,7 @@
                 </a:effectLst>
                 <a:latin typeface="Britannic Bold" panose="020B0903060703020204" pitchFamily="34" charset="0"/>
               </a:rPr>
-              <a:t/>
-            </a:r>
-            <a:br>
-              <a:rPr lang="en-IN" b="1" dirty="0" smtClean="0">
-                <a:ln w="0"/>
-                <a:solidFill>
-                  <a:schemeClr val="bg1"/>
-                </a:solidFill>
-                <a:effectLst>
-                  <a:outerShdw blurRad="38100" dist="25400" dir="5400000" algn="ctr" rotWithShape="0">
-                    <a:srgbClr val="6E747A">
-                      <a:alpha val="43000"/>
-                    </a:srgbClr>
-                  </a:outerShdw>
-                </a:effectLst>
-                <a:latin typeface="Britannic Bold" panose="020B0903060703020204" pitchFamily="34" charset="0"/>
-              </a:rPr>
-            </a:br>
-            <a:r>
-              <a:rPr lang="en-IN" b="1" dirty="0" smtClean="0">
-                <a:ln w="0"/>
-                <a:solidFill>
-                  <a:schemeClr val="bg1"/>
-                </a:solidFill>
-                <a:effectLst>
-                  <a:outerShdw blurRad="38100" dist="25400" dir="5400000" algn="ctr" rotWithShape="0">
-                    <a:srgbClr val="6E747A">
-                      <a:alpha val="43000"/>
-                    </a:srgbClr>
-                  </a:outerShdw>
-                </a:effectLst>
-                <a:latin typeface="Britannic Bold" panose="020B0903060703020204" pitchFamily="34" charset="0"/>
-              </a:rPr>
-              <a:t>Data Sources</a:t>
+              <a:t>Topics </a:t>
             </a:r>
             <a:r>
               <a:rPr lang="en-IN" b="1" dirty="0">
@@ -4131,10 +5050,27 @@
                 </a:effectLst>
                 <a:latin typeface="Britannic Bold" panose="020B0903060703020204" pitchFamily="34" charset="0"/>
               </a:rPr>
+              <a:t>Covered in Presentation</a:t>
+            </a:r>
+            <a:r>
+              <a:rPr lang="en-IN" b="1" u="sng" dirty="0">
+                <a:ln w="0"/>
+                <a:solidFill>
+                  <a:schemeClr val="bg1"/>
+                </a:solidFill>
+                <a:effectLst>
+                  <a:outerShdw blurRad="38100" dist="25400" dir="5400000" algn="ctr" rotWithShape="0">
+                    <a:srgbClr val="6E747A">
+                      <a:alpha val="43000"/>
+                    </a:srgbClr>
+                  </a:outerShdw>
+                </a:effectLst>
+                <a:latin typeface="Britannic Bold" panose="020B0903060703020204" pitchFamily="34" charset="0"/>
+              </a:rPr>
               <a:t/>
             </a:r>
             <a:br>
-              <a:rPr lang="en-IN" b="1" dirty="0">
+              <a:rPr lang="en-IN" b="1" u="sng" dirty="0">
                 <a:ln w="0"/>
                 <a:solidFill>
                   <a:schemeClr val="bg1"/>
@@ -4153,79 +5089,52 @@
           </a:p>
         </p:txBody>
       </p:sp>
-      <p:sp>
-        <p:nvSpPr>
-          <p:cNvPr id="3" name="Content Placeholder 2"/>
-          <p:cNvSpPr>
-            <a:spLocks noGrp="1"/>
-          </p:cNvSpPr>
-          <p:nvPr>
-            <p:ph type="body" idx="1"/>
-          </p:nvPr>
-        </p:nvSpPr>
-        <p:spPr>
-          <a:xfrm>
-            <a:off x="839788" y="1508580"/>
-            <a:ext cx="5176790" cy="823912"/>
-          </a:xfrm>
-          <a:solidFill>
-            <a:srgbClr val="0070C0"/>
-          </a:solidFill>
-          <a:ln w="28575">
-            <a:solidFill>
-              <a:schemeClr val="accent2">
-                <a:lumMod val="75000"/>
-              </a:schemeClr>
-            </a:solidFill>
-          </a:ln>
+      <p:pic>
+        <p:nvPicPr>
+          <p:cNvPr id="5" name="Content Placeholder 4"/>
+          <p:cNvPicPr>
+            <a:picLocks noGrp="1" noChangeAspect="1"/>
+          </p:cNvPicPr>
+          <p:nvPr>
+            <p:ph sz="half" idx="1"/>
+          </p:nvPr>
+        </p:nvPicPr>
+        <p:blipFill>
+          <a:blip r:embed="rId2"/>
+          <a:stretch>
+            <a:fillRect/>
+          </a:stretch>
+        </p:blipFill>
+        <p:spPr>
+          <a:xfrm>
+            <a:off x="885824" y="1314450"/>
+            <a:ext cx="4714875" cy="4836320"/>
+          </a:xfrm>
+          <a:prstGeom prst="rect">
+            <a:avLst/>
+          </a:prstGeom>
+          <a:ln w="28575"/>
         </p:spPr>
         <p:style>
           <a:lnRef idx="2">
-            <a:schemeClr val="accent2"/>
+            <a:schemeClr val="accent2">
+              <a:shade val="50000"/>
+            </a:schemeClr>
           </a:lnRef>
           <a:fillRef idx="1">
-            <a:schemeClr val="lt1"/>
+            <a:schemeClr val="accent2"/>
           </a:fillRef>
           <a:effectRef idx="0">
             <a:schemeClr val="accent2"/>
           </a:effectRef>
           <a:fontRef idx="minor">
-            <a:schemeClr val="dk1"/>
+            <a:schemeClr val="lt1"/>
           </a:fontRef>
         </p:style>
-        <p:txBody>
-          <a:bodyPr>
-            <a:noAutofit/>
-          </a:bodyPr>
-          <a:lstStyle/>
-          <a:p>
-            <a:pPr marL="0" indent="0" algn="ctr">
-              <a:lnSpc>
-                <a:spcPct val="250000"/>
-              </a:lnSpc>
-              <a:buNone/>
-            </a:pPr>
-            <a:r>
-              <a:rPr lang="en-IN" sz="2800" dirty="0" smtClean="0">
-                <a:solidFill>
-                  <a:schemeClr val="bg1"/>
-                </a:solidFill>
-                <a:latin typeface="Britannic Bold" panose="020B0903060703020204" pitchFamily="34" charset="0"/>
-              </a:rPr>
-              <a:t>Source Data</a:t>
-            </a:r>
-            <a:endParaRPr lang="en-IN" sz="2800" dirty="0">
-              <a:solidFill>
-                <a:schemeClr val="bg1"/>
-              </a:solidFill>
-              <a:latin typeface="Britannic Bold" panose="020B0903060703020204" pitchFamily="34" charset="0"/>
-            </a:endParaRPr>
-          </a:p>
-        </p:txBody>
-      </p:sp>
-      <p:sp>
-        <p:nvSpPr>
-          <p:cNvPr id="22" name="Content Placeholder 21"/>
+      </p:pic>
+      <p:sp>
+        <p:nvSpPr>
+          <p:cNvPr id="4" name="Text Placeholder 3"/>
           <p:cNvSpPr>
             <a:spLocks noGrp="1"/>
           </p:cNvSpPr>
@@ -4235,316 +5144,8 @@
         </p:nvSpPr>
         <p:spPr>
           <a:xfrm>
-            <a:off x="836612" y="2322967"/>
-            <a:ext cx="5157787" cy="3712892"/>
-          </a:xfrm>
-          <a:ln w="28575">
-            <a:solidFill>
-              <a:schemeClr val="accent2">
-                <a:lumMod val="75000"/>
-              </a:schemeClr>
-            </a:solidFill>
-          </a:ln>
-        </p:spPr>
-        <p:style>
-          <a:lnRef idx="2">
-            <a:schemeClr val="accent2"/>
-          </a:lnRef>
-          <a:fillRef idx="1">
-            <a:schemeClr val="lt1"/>
-          </a:fillRef>
-          <a:effectRef idx="0">
-            <a:schemeClr val="accent2"/>
-          </a:effectRef>
-          <a:fontRef idx="minor">
-            <a:schemeClr val="dk1"/>
-          </a:fontRef>
-        </p:style>
-        <p:txBody>
-          <a:bodyPr>
-            <a:normAutofit/>
-          </a:bodyPr>
-          <a:lstStyle/>
-          <a:p>
-            <a:pPr>
-              <a:buFont typeface="Wingdings" panose="05000000000000000000" pitchFamily="2" charset="2"/>
-              <a:buChar char="Ø"/>
-            </a:pPr>
-            <a:r>
-              <a:rPr lang="en-IN" sz="2500" dirty="0" smtClean="0">
-                <a:hlinkClick r:id=""/>
-              </a:rPr>
-              <a:t>https</a:t>
-            </a:r>
-            <a:r>
-              <a:rPr lang="en-IN" sz="2500" dirty="0">
-                <a:hlinkClick r:id=""/>
-              </a:rPr>
-              <a:t>://www.kaggle.com/brittabettendorf/berlin-airbnb-data</a:t>
-            </a:r>
-            <a:endParaRPr lang="en-IN" sz="2500" dirty="0"/>
-          </a:p>
-          <a:p>
-            <a:pPr>
-              <a:buFont typeface="Wingdings" panose="05000000000000000000" pitchFamily="2" charset="2"/>
-              <a:buChar char="Ø"/>
-            </a:pPr>
-            <a:r>
-              <a:rPr lang="en-IN" sz="2500" dirty="0">
-                <a:hlinkClick r:id="rId2"/>
-              </a:rPr>
-              <a:t>http://insideairbnb.com/get-the-data.html</a:t>
-            </a:r>
-            <a:endParaRPr lang="en-IN" sz="2500" dirty="0"/>
-          </a:p>
-          <a:p>
-            <a:endParaRPr lang="en-IN" sz="2400" dirty="0"/>
-          </a:p>
-          <a:p>
-            <a:pPr marL="0" indent="0">
-              <a:buNone/>
-            </a:pPr>
-            <a:endParaRPr lang="en-IN" sz="2400" dirty="0" smtClean="0"/>
-          </a:p>
-          <a:p>
-            <a:pPr marL="0" indent="0">
-              <a:buNone/>
-            </a:pPr>
-            <a:endParaRPr lang="en-IN" sz="2400" dirty="0"/>
-          </a:p>
-        </p:txBody>
-      </p:sp>
-      <p:sp>
-        <p:nvSpPr>
-          <p:cNvPr id="27" name="Text Placeholder 26"/>
-          <p:cNvSpPr>
-            <a:spLocks noGrp="1"/>
-          </p:cNvSpPr>
-          <p:nvPr>
-            <p:ph type="body" sz="quarter" idx="3"/>
-          </p:nvPr>
-        </p:nvSpPr>
-        <p:spPr>
-          <a:xfrm>
-            <a:off x="6019800" y="1508580"/>
-            <a:ext cx="5335588" cy="823912"/>
-          </a:xfrm>
-          <a:solidFill>
-            <a:srgbClr val="0070C0"/>
-          </a:solidFill>
-          <a:ln w="28575">
-            <a:solidFill>
-              <a:schemeClr val="accent2">
-                <a:lumMod val="75000"/>
-              </a:schemeClr>
-            </a:solidFill>
-          </a:ln>
-        </p:spPr>
-        <p:txBody>
-          <a:bodyPr>
-            <a:noAutofit/>
-          </a:bodyPr>
-          <a:lstStyle/>
-          <a:p>
-            <a:pPr algn="ctr">
-              <a:lnSpc>
-                <a:spcPct val="250000"/>
-              </a:lnSpc>
-            </a:pPr>
-            <a:r>
-              <a:rPr lang="en-IN" sz="2800" dirty="0" smtClean="0">
-                <a:solidFill>
-                  <a:schemeClr val="bg1"/>
-                </a:solidFill>
-                <a:latin typeface="Britannic Bold" panose="020B0903060703020204" pitchFamily="34" charset="0"/>
-              </a:rPr>
-              <a:t>API Data</a:t>
-            </a:r>
-            <a:endParaRPr lang="en-IN" sz="2800" dirty="0">
-              <a:solidFill>
-                <a:schemeClr val="bg1"/>
-              </a:solidFill>
-              <a:latin typeface="Britannic Bold" panose="020B0903060703020204" pitchFamily="34" charset="0"/>
-            </a:endParaRPr>
-          </a:p>
-        </p:txBody>
-      </p:sp>
-      <p:sp>
-        <p:nvSpPr>
-          <p:cNvPr id="28" name="Content Placeholder 27"/>
-          <p:cNvSpPr>
-            <a:spLocks noGrp="1"/>
-          </p:cNvSpPr>
-          <p:nvPr>
-            <p:ph sz="quarter" idx="4"/>
-          </p:nvPr>
-        </p:nvSpPr>
-        <p:spPr>
-          <a:xfrm>
-            <a:off x="6018189" y="2322967"/>
-            <a:ext cx="5338810" cy="3712892"/>
-          </a:xfrm>
-          <a:ln w="28575">
-            <a:solidFill>
-              <a:schemeClr val="accent2">
-                <a:lumMod val="75000"/>
-              </a:schemeClr>
-            </a:solidFill>
-          </a:ln>
-        </p:spPr>
-        <p:txBody>
-          <a:bodyPr/>
-          <a:lstStyle/>
-          <a:p>
-            <a:pPr>
-              <a:buFont typeface="Wingdings" panose="05000000000000000000" pitchFamily="2" charset="2"/>
-              <a:buChar char="Ø"/>
-            </a:pPr>
-            <a:r>
-              <a:rPr lang="en-IN" sz="2500" dirty="0">
-                <a:hlinkClick r:id="rId3"/>
-              </a:rPr>
-              <a:t>https://api.yelp.com/v3/businesses/search</a:t>
-            </a:r>
-            <a:endParaRPr lang="en-IN" sz="2500" dirty="0"/>
-          </a:p>
-          <a:p>
-            <a:pPr>
-              <a:buFont typeface="Wingdings" panose="05000000000000000000" pitchFamily="2" charset="2"/>
-              <a:buChar char="Ø"/>
-            </a:pPr>
-            <a:r>
-              <a:rPr lang="en-IN" sz="2500" dirty="0">
-                <a:hlinkClick r:id="rId4"/>
-              </a:rPr>
-              <a:t>https://maps.googleapis.com/maps/api/geocode/json</a:t>
-            </a:r>
-            <a:r>
-              <a:rPr lang="en-IN" sz="2500" dirty="0"/>
-              <a:t>?</a:t>
-            </a:r>
-          </a:p>
-          <a:p>
-            <a:endParaRPr lang="en-IN" dirty="0"/>
-          </a:p>
-        </p:txBody>
-      </p:sp>
-      <p:pic>
-        <p:nvPicPr>
-          <p:cNvPr id="6" name="Picture 5"/>
-          <p:cNvPicPr>
-            <a:picLocks noChangeAspect="1"/>
-          </p:cNvPicPr>
-          <p:nvPr/>
-        </p:nvPicPr>
-        <p:blipFill>
-          <a:blip r:embed="rId5"/>
-          <a:stretch>
-            <a:fillRect/>
-          </a:stretch>
-        </p:blipFill>
-        <p:spPr>
-          <a:xfrm>
-            <a:off x="1304897" y="4071697"/>
-            <a:ext cx="4293395" cy="1757143"/>
-          </a:xfrm>
-          <a:prstGeom prst="rect">
-            <a:avLst/>
-          </a:prstGeom>
-        </p:spPr>
-      </p:pic>
-      <p:pic>
-        <p:nvPicPr>
-          <p:cNvPr id="7" name="Picture 6"/>
-          <p:cNvPicPr>
-            <a:picLocks noChangeAspect="1"/>
-          </p:cNvPicPr>
-          <p:nvPr/>
-        </p:nvPicPr>
-        <p:blipFill>
-          <a:blip r:embed="rId6"/>
-          <a:stretch>
-            <a:fillRect/>
-          </a:stretch>
-        </p:blipFill>
-        <p:spPr>
-          <a:xfrm>
-            <a:off x="10106024" y="6167439"/>
-            <a:ext cx="2085975" cy="690561"/>
-          </a:xfrm>
-          <a:prstGeom prst="rect">
-            <a:avLst/>
-          </a:prstGeom>
-        </p:spPr>
-      </p:pic>
-      <p:pic>
-        <p:nvPicPr>
-          <p:cNvPr id="26" name="Picture 25"/>
-          <p:cNvPicPr>
-            <a:picLocks noChangeAspect="1"/>
-          </p:cNvPicPr>
-          <p:nvPr/>
-        </p:nvPicPr>
-        <p:blipFill>
-          <a:blip r:embed="rId7"/>
-          <a:stretch>
-            <a:fillRect/>
-          </a:stretch>
-        </p:blipFill>
-        <p:spPr>
-          <a:xfrm>
-            <a:off x="6373392" y="4174971"/>
-            <a:ext cx="4628403" cy="1550593"/>
-          </a:xfrm>
-          <a:prstGeom prst="rect">
-            <a:avLst/>
-          </a:prstGeom>
-        </p:spPr>
-      </p:pic>
-    </p:spTree>
-    <p:extLst>
-      <p:ext uri="{BB962C8B-B14F-4D97-AF65-F5344CB8AC3E}">
-        <p14:creationId xmlns:p14="http://schemas.microsoft.com/office/powerpoint/2010/main" val="503584227"/>
-      </p:ext>
-    </p:extLst>
-  </p:cSld>
-  <p:clrMapOvr>
-    <a:masterClrMapping/>
-  </p:clrMapOvr>
-</p:sld>
-</file>
-
-<file path=ppt/slides/slide5.xml><?xml version="1.0" encoding="utf-8"?>
-<p:sld xmlns:a="http://schemas.openxmlformats.org/drawingml/2006/main" xmlns:r="http://schemas.openxmlformats.org/officeDocument/2006/relationships" xmlns:p="http://schemas.openxmlformats.org/presentationml/2006/main">
-  <p:cSld>
-    <p:spTree>
-      <p:nvGrpSpPr>
-        <p:cNvPr id="1" name=""/>
-        <p:cNvGrpSpPr/>
-        <p:nvPr/>
-      </p:nvGrpSpPr>
-      <p:grpSpPr>
-        <a:xfrm>
-          <a:off x="0" y="0"/>
-          <a:ext cx="0" cy="0"/>
-          <a:chOff x="0" y="0"/>
-          <a:chExt cx="0" cy="0"/>
-        </a:xfrm>
-      </p:grpSpPr>
-      <p:sp>
-        <p:nvSpPr>
-          <p:cNvPr id="3" name="Title 6"/>
-          <p:cNvSpPr>
-            <a:spLocks noGrp="1"/>
-          </p:cNvSpPr>
-          <p:nvPr>
-            <p:ph type="title"/>
-          </p:nvPr>
-        </p:nvSpPr>
-        <p:spPr>
-          <a:xfrm>
-            <a:off x="838200" y="365126"/>
-            <a:ext cx="10515600" cy="992188"/>
+            <a:off x="5600700" y="1314450"/>
+            <a:ext cx="5753100" cy="4852989"/>
           </a:xfrm>
           <a:gradFill flip="none" rotWithShape="1">
             <a:gsLst>
@@ -4593,265 +5194,180 @@
         </p:style>
         <p:txBody>
           <a:bodyPr>
-            <a:normAutofit fontScale="90000"/>
+            <a:normAutofit/>
           </a:bodyPr>
           <a:lstStyle/>
           <a:p>
-            <a:pPr algn="ctr">
+            <a:pPr marL="457200" indent="-457200">
               <a:lnSpc>
-                <a:spcPct val="100000"/>
+                <a:spcPct val="110000"/>
               </a:lnSpc>
+              <a:buFont typeface="Wingdings" panose="05000000000000000000" pitchFamily="2" charset="2"/>
+              <a:buChar char="Ø"/>
             </a:pPr>
             <a:r>
-              <a:rPr lang="en-IN" b="1" dirty="0" smtClean="0">
-                <a:ln w="0"/>
+              <a:rPr lang="en-IN" sz="3200" b="1" dirty="0" smtClean="0">
                 <a:solidFill>
                   <a:schemeClr val="bg1"/>
                 </a:solidFill>
-                <a:effectLst>
-                  <a:outerShdw blurRad="38100" dist="25400" dir="5400000" algn="ctr" rotWithShape="0">
-                    <a:srgbClr val="6E747A">
-                      <a:alpha val="43000"/>
-                    </a:srgbClr>
-                  </a:outerShdw>
-                </a:effectLst>
                 <a:latin typeface="Britannic Bold" panose="020B0903060703020204" pitchFamily="34" charset="0"/>
               </a:rPr>
-              <a:t/>
-            </a:r>
-            <a:br>
-              <a:rPr lang="en-IN" b="1" dirty="0" smtClean="0">
-                <a:ln w="0"/>
+              <a:t>Data Sources</a:t>
+            </a:r>
+          </a:p>
+          <a:p>
+            <a:pPr marL="457200" indent="-457200">
+              <a:lnSpc>
+                <a:spcPct val="110000"/>
+              </a:lnSpc>
+              <a:buFont typeface="Wingdings" panose="05000000000000000000" pitchFamily="2" charset="2"/>
+              <a:buChar char="Ø"/>
+            </a:pPr>
+            <a:r>
+              <a:rPr lang="en-IN" sz="3200" b="1" dirty="0" smtClean="0">
                 <a:solidFill>
                   <a:schemeClr val="bg1"/>
                 </a:solidFill>
-                <a:effectLst>
-                  <a:outerShdw blurRad="38100" dist="25400" dir="5400000" algn="ctr" rotWithShape="0">
-                    <a:srgbClr val="6E747A">
-                      <a:alpha val="43000"/>
-                    </a:srgbClr>
-                  </a:outerShdw>
-                </a:effectLst>
                 <a:latin typeface="Britannic Bold" panose="020B0903060703020204" pitchFamily="34" charset="0"/>
               </a:rPr>
-            </a:br>
-            <a:r>
-              <a:rPr lang="en-IN" b="1" dirty="0" smtClean="0">
-                <a:ln w="0"/>
+              <a:t>Data Clean up &amp; Exploration</a:t>
+            </a:r>
+          </a:p>
+          <a:p>
+            <a:pPr marL="457200" indent="-457200">
+              <a:lnSpc>
+                <a:spcPct val="110000"/>
+              </a:lnSpc>
+              <a:buFont typeface="Wingdings" panose="05000000000000000000" pitchFamily="2" charset="2"/>
+              <a:buChar char="Ø"/>
+            </a:pPr>
+            <a:r>
+              <a:rPr lang="en-IN" sz="3200" b="1" dirty="0" smtClean="0">
                 <a:solidFill>
                   <a:schemeClr val="bg1"/>
                 </a:solidFill>
-                <a:effectLst>
-                  <a:outerShdw blurRad="38100" dist="25400" dir="5400000" algn="ctr" rotWithShape="0">
-                    <a:srgbClr val="6E747A">
-                      <a:alpha val="43000"/>
-                    </a:srgbClr>
-                  </a:outerShdw>
-                </a:effectLst>
                 <a:latin typeface="Britannic Bold" panose="020B0903060703020204" pitchFamily="34" charset="0"/>
               </a:rPr>
-              <a:t>Data Sources Description</a:t>
-            </a:r>
-            <a:r>
-              <a:rPr lang="en-IN" b="1" dirty="0">
-                <a:ln w="0"/>
+              <a:t>Data Analysis</a:t>
+            </a:r>
+          </a:p>
+          <a:p>
+            <a:pPr marL="457200" indent="-457200">
+              <a:lnSpc>
+                <a:spcPct val="110000"/>
+              </a:lnSpc>
+              <a:buFont typeface="Wingdings" panose="05000000000000000000" pitchFamily="2" charset="2"/>
+              <a:buChar char="Ø"/>
+            </a:pPr>
+            <a:r>
+              <a:rPr lang="en-IN" sz="3200" b="1" dirty="0" smtClean="0">
                 <a:solidFill>
                   <a:schemeClr val="bg1"/>
                 </a:solidFill>
-                <a:effectLst>
-                  <a:outerShdw blurRad="38100" dist="25400" dir="5400000" algn="ctr" rotWithShape="0">
-                    <a:srgbClr val="6E747A">
-                      <a:alpha val="43000"/>
-                    </a:srgbClr>
-                  </a:outerShdw>
-                </a:effectLst>
                 <a:latin typeface="Britannic Bold" panose="020B0903060703020204" pitchFamily="34" charset="0"/>
               </a:rPr>
-              <a:t/>
-            </a:r>
-            <a:br>
-              <a:rPr lang="en-IN" b="1" dirty="0">
-                <a:ln w="0"/>
+              <a:t>Outcomes/Take </a:t>
+            </a:r>
+            <a:r>
+              <a:rPr lang="en-IN" sz="3200" b="1" dirty="0" err="1" smtClean="0">
                 <a:solidFill>
                   <a:schemeClr val="bg1"/>
                 </a:solidFill>
-                <a:effectLst>
-                  <a:outerShdw blurRad="38100" dist="25400" dir="5400000" algn="ctr" rotWithShape="0">
-                    <a:srgbClr val="6E747A">
-                      <a:alpha val="43000"/>
-                    </a:srgbClr>
-                  </a:outerShdw>
-                </a:effectLst>
                 <a:latin typeface="Britannic Bold" panose="020B0903060703020204" pitchFamily="34" charset="0"/>
               </a:rPr>
-            </a:br>
-            <a:endParaRPr lang="en-IN" dirty="0"/>
-          </a:p>
-        </p:txBody>
-      </p:sp>
-      <p:sp>
-        <p:nvSpPr>
-          <p:cNvPr id="8" name="Content Placeholder 7"/>
-          <p:cNvSpPr>
-            <a:spLocks noGrp="1"/>
-          </p:cNvSpPr>
-          <p:nvPr>
-            <p:ph idx="1"/>
-          </p:nvPr>
-        </p:nvSpPr>
-        <p:spPr>
-          <a:xfrm>
-            <a:off x="838200" y="1357314"/>
-            <a:ext cx="10515600" cy="4686299"/>
-          </a:xfrm>
-          <a:ln w="28575">
-            <a:solidFill>
-              <a:schemeClr val="accent2">
-                <a:lumMod val="75000"/>
-              </a:schemeClr>
-            </a:solidFill>
-          </a:ln>
-        </p:spPr>
-        <p:txBody>
-          <a:bodyPr/>
-          <a:lstStyle/>
+              <a:t>Aways</a:t>
+            </a:r>
+            <a:endParaRPr lang="en-IN" sz="3200" b="1" dirty="0" smtClean="0">
+              <a:solidFill>
+                <a:schemeClr val="bg1"/>
+              </a:solidFill>
+              <a:latin typeface="Britannic Bold" panose="020B0903060703020204" pitchFamily="34" charset="0"/>
+            </a:endParaRPr>
+          </a:p>
+          <a:p>
+            <a:pPr marL="457200" indent="-457200">
+              <a:lnSpc>
+                <a:spcPct val="110000"/>
+              </a:lnSpc>
+              <a:buFont typeface="Wingdings" panose="05000000000000000000" pitchFamily="2" charset="2"/>
+              <a:buChar char="Ø"/>
+            </a:pPr>
+            <a:r>
+              <a:rPr lang="en-IN" sz="3200" b="1" dirty="0" smtClean="0">
+                <a:solidFill>
+                  <a:schemeClr val="bg1"/>
+                </a:solidFill>
+                <a:latin typeface="Britannic Bold" panose="020B0903060703020204" pitchFamily="34" charset="0"/>
+              </a:rPr>
+              <a:t>Conclusion</a:t>
+            </a:r>
+          </a:p>
+          <a:p>
+            <a:pPr marL="457200" indent="-457200">
+              <a:lnSpc>
+                <a:spcPct val="110000"/>
+              </a:lnSpc>
+              <a:buFont typeface="Wingdings" panose="05000000000000000000" pitchFamily="2" charset="2"/>
+              <a:buChar char="Ø"/>
+            </a:pPr>
+            <a:r>
+              <a:rPr lang="en-IN" sz="3200" b="1" dirty="0" smtClean="0">
+                <a:solidFill>
+                  <a:schemeClr val="bg1"/>
+                </a:solidFill>
+                <a:latin typeface="Britannic Bold" panose="020B0903060703020204" pitchFamily="34" charset="0"/>
+              </a:rPr>
+              <a:t>Future Work</a:t>
+            </a:r>
+          </a:p>
+          <a:p>
+            <a:pPr marL="457200" indent="-457200">
+              <a:lnSpc>
+                <a:spcPct val="110000"/>
+              </a:lnSpc>
+              <a:buFont typeface="Wingdings" panose="05000000000000000000" pitchFamily="2" charset="2"/>
+              <a:buChar char="Ø"/>
+            </a:pPr>
+            <a:endParaRPr lang="en-IN" sz="3200" b="1" dirty="0" smtClean="0">
+              <a:solidFill>
+                <a:schemeClr val="bg1"/>
+              </a:solidFill>
+              <a:latin typeface="Britannic Bold" panose="020B0903060703020204" pitchFamily="34" charset="0"/>
+            </a:endParaRPr>
+          </a:p>
           <a:p>
             <a:pPr>
+              <a:lnSpc>
+                <a:spcPct val="110000"/>
+              </a:lnSpc>
+            </a:pPr>
+            <a:endParaRPr lang="en-IN" sz="3200" b="1" dirty="0" smtClean="0">
+              <a:solidFill>
+                <a:schemeClr val="bg1"/>
+              </a:solidFill>
+              <a:latin typeface="Britannic Bold" panose="020B0903060703020204" pitchFamily="34" charset="0"/>
+            </a:endParaRPr>
+          </a:p>
+          <a:p>
+            <a:pPr marL="457200" indent="-457200">
+              <a:lnSpc>
+                <a:spcPct val="110000"/>
+              </a:lnSpc>
               <a:buFont typeface="Wingdings" panose="05000000000000000000" pitchFamily="2" charset="2"/>
-              <a:buChar char="q"/>
+              <a:buChar char="Ø"/>
             </a:pPr>
-            <a:endParaRPr lang="en-IN" b="1" u="sng" dirty="0" smtClean="0"/>
-          </a:p>
-          <a:p>
-            <a:pPr>
-              <a:buFont typeface="Wingdings" panose="05000000000000000000" pitchFamily="2" charset="2"/>
-              <a:buChar char="q"/>
-            </a:pPr>
-            <a:r>
-              <a:rPr lang="en-IN" b="1" u="sng" dirty="0" smtClean="0"/>
-              <a:t>Source Data :</a:t>
-            </a:r>
-          </a:p>
-          <a:p>
-            <a:pPr>
-              <a:buFont typeface="Wingdings" panose="05000000000000000000" pitchFamily="2" charset="2"/>
-              <a:buChar char="ü"/>
-            </a:pPr>
-            <a:r>
-              <a:rPr lang="en-IN" sz="2400" dirty="0"/>
-              <a:t>The </a:t>
-            </a:r>
-            <a:r>
-              <a:rPr lang="en-IN" sz="2400" dirty="0" err="1" smtClean="0"/>
-              <a:t>Kaggle</a:t>
-            </a:r>
-            <a:r>
-              <a:rPr lang="en-IN" sz="2400" dirty="0" smtClean="0"/>
-              <a:t> datasets </a:t>
-            </a:r>
-            <a:r>
-              <a:rPr lang="en-IN" sz="2400" dirty="0"/>
-              <a:t>were scraped on November 07th, 2018 and </a:t>
-            </a:r>
-            <a:r>
-              <a:rPr lang="en-IN" sz="2400" dirty="0" smtClean="0"/>
-              <a:t>contains the </a:t>
-            </a:r>
-            <a:r>
-              <a:rPr lang="en-IN" sz="2400" dirty="0"/>
-              <a:t>detailed listings data, review data and calendar data of current Airbnb listings in </a:t>
-            </a:r>
-            <a:r>
-              <a:rPr lang="en-IN" sz="2400" dirty="0" smtClean="0"/>
-              <a:t>Berlin</a:t>
-            </a:r>
-            <a:r>
-              <a:rPr lang="en-IN" sz="2400" dirty="0"/>
-              <a:t> </a:t>
-            </a:r>
-            <a:r>
-              <a:rPr lang="en-IN" sz="2400" dirty="0" smtClean="0"/>
-              <a:t>from 2008 to 2018.</a:t>
-            </a:r>
-          </a:p>
-          <a:p>
-            <a:pPr>
-              <a:buFont typeface="Wingdings" panose="05000000000000000000" pitchFamily="2" charset="2"/>
-              <a:buChar char="ü"/>
-            </a:pPr>
-            <a:r>
-              <a:rPr lang="en-IN" sz="2400" dirty="0" smtClean="0"/>
-              <a:t>The </a:t>
-            </a:r>
-            <a:r>
-              <a:rPr lang="en-IN" sz="2400" dirty="0" err="1" smtClean="0"/>
-              <a:t>Kaggle</a:t>
-            </a:r>
-            <a:r>
-              <a:rPr lang="en-IN" sz="2400" dirty="0" smtClean="0"/>
-              <a:t> datasets were scraped from the insideairbnb.com source.</a:t>
-            </a:r>
-          </a:p>
-          <a:p>
-            <a:pPr marL="0" indent="0">
-              <a:buNone/>
-            </a:pPr>
-            <a:endParaRPr lang="en-IN" sz="2400" dirty="0"/>
-          </a:p>
-          <a:p>
-            <a:pPr>
-              <a:buFont typeface="Wingdings" panose="05000000000000000000" pitchFamily="2" charset="2"/>
-              <a:buChar char="q"/>
-            </a:pPr>
-            <a:r>
-              <a:rPr lang="en-IN" b="1" u="sng" dirty="0" smtClean="0"/>
-              <a:t>API Data :</a:t>
-            </a:r>
-          </a:p>
-          <a:p>
-            <a:pPr>
-              <a:buFont typeface="Wingdings" panose="05000000000000000000" pitchFamily="2" charset="2"/>
-              <a:buChar char="ü"/>
-            </a:pPr>
-            <a:r>
-              <a:rPr lang="en-IN" sz="2400" u="sng" dirty="0" smtClean="0"/>
-              <a:t> </a:t>
-            </a:r>
-            <a:r>
-              <a:rPr lang="en-IN" sz="2400" dirty="0" smtClean="0"/>
-              <a:t>We have used the yelp and google api to retrieve the top 5 star ratings restaurants/café/bars around the top accommodations in berlin.</a:t>
-            </a:r>
-            <a:endParaRPr lang="en-IN" sz="2400" u="sng" dirty="0"/>
+            <a:endParaRPr lang="en-IN" sz="3200" b="1" dirty="0">
+              <a:solidFill>
+                <a:schemeClr val="bg1"/>
+              </a:solidFill>
+              <a:latin typeface="Britannic Bold" panose="020B0903060703020204" pitchFamily="34" charset="0"/>
+            </a:endParaRPr>
           </a:p>
         </p:txBody>
       </p:sp>
       <p:pic>
         <p:nvPicPr>
           <p:cNvPr id="9" name="Picture 8"/>
-          <p:cNvPicPr>
-            <a:picLocks noChangeAspect="1"/>
-          </p:cNvPicPr>
-          <p:nvPr/>
-        </p:nvPicPr>
-        <p:blipFill>
-          <a:blip r:embed="rId2"/>
-          <a:stretch>
-            <a:fillRect/>
-          </a:stretch>
-        </p:blipFill>
-        <p:spPr>
-          <a:xfrm>
-            <a:off x="10106024" y="6167439"/>
-            <a:ext cx="2085975" cy="690561"/>
-          </a:xfrm>
-          <a:prstGeom prst="rect">
-            <a:avLst/>
-          </a:prstGeom>
-        </p:spPr>
-      </p:pic>
-      <p:pic>
-        <p:nvPicPr>
-          <p:cNvPr id="10" name="Picture 9"/>
           <p:cNvPicPr>
             <a:picLocks noChangeAspect="1"/>
           </p:cNvPicPr>
@@ -4865,8 +5381,8 @@
         </p:blipFill>
         <p:spPr>
           <a:xfrm>
-            <a:off x="9637202" y="5384008"/>
-            <a:ext cx="1511809" cy="557212"/>
+            <a:off x="10106024" y="6167439"/>
+            <a:ext cx="2085975" cy="690561"/>
           </a:xfrm>
           <a:prstGeom prst="rect">
             <a:avLst/>
@@ -4876,17 +5392,24 @@
     </p:spTree>
     <p:extLst>
       <p:ext uri="{BB962C8B-B14F-4D97-AF65-F5344CB8AC3E}">
-        <p14:creationId xmlns:p14="http://schemas.microsoft.com/office/powerpoint/2010/main" val="1062386827"/>
+        <p14:creationId xmlns:p14="http://schemas.microsoft.com/office/powerpoint/2010/main" val="897284640"/>
       </p:ext>
     </p:extLst>
   </p:cSld>
   <p:clrMapOvr>
     <a:masterClrMapping/>
   </p:clrMapOvr>
+  <p:timing>
+    <p:tnLst>
+      <p:par>
+        <p:cTn id="1" dur="indefinite" restart="never" nodeType="tmRoot"/>
+      </p:par>
+    </p:tnLst>
+  </p:timing>
 </p:sld>
 </file>
 
-<file path=ppt/slides/slide6.xml><?xml version="1.0" encoding="utf-8"?>
+<file path=ppt/slides/slide4.xml><?xml version="1.0" encoding="utf-8"?>
 <p:sld xmlns:a="http://schemas.openxmlformats.org/drawingml/2006/main" xmlns:r="http://schemas.openxmlformats.org/officeDocument/2006/relationships" xmlns:p="http://schemas.openxmlformats.org/presentationml/2006/main">
   <p:cSld>
     <p:spTree>
@@ -4905,31 +5428,7 @@
       </p:grpSpPr>
       <p:sp>
         <p:nvSpPr>
-          <p:cNvPr id="3" name="Content Placeholder 2"/>
-          <p:cNvSpPr>
-            <a:spLocks noGrp="1"/>
-          </p:cNvSpPr>
-          <p:nvPr>
-            <p:ph idx="1"/>
-          </p:nvPr>
-        </p:nvSpPr>
-        <p:spPr>
-          <a:xfrm>
-            <a:off x="838200" y="1357314"/>
-            <a:ext cx="10515600" cy="4819649"/>
-          </a:xfrm>
-        </p:spPr>
-        <p:txBody>
-          <a:bodyPr/>
-          <a:lstStyle/>
-          <a:p>
-            <a:endParaRPr lang="en-IN" dirty="0"/>
-          </a:p>
-        </p:txBody>
-      </p:sp>
-      <p:sp>
-        <p:nvSpPr>
-          <p:cNvPr id="4" name="Title 6"/>
+          <p:cNvPr id="5" name="Title 6"/>
           <p:cNvSpPr>
             <a:spLocks noGrp="1"/>
           </p:cNvSpPr>
@@ -4939,8 +5438,8 @@
         </p:nvSpPr>
         <p:spPr>
           <a:xfrm>
-            <a:off x="838200" y="365126"/>
-            <a:ext cx="10515600" cy="992188"/>
+            <a:off x="839788" y="365125"/>
+            <a:ext cx="10515600" cy="1143455"/>
           </a:xfrm>
           <a:gradFill flip="none" rotWithShape="1">
             <a:gsLst>
@@ -5046,7 +5545,7 @@
                 </a:effectLst>
                 <a:latin typeface="Britannic Bold" panose="020B0903060703020204" pitchFamily="34" charset="0"/>
               </a:rPr>
-              <a:t>Data Clean Up &amp; Exploration</a:t>
+              <a:t>Data Sources</a:t>
             </a:r>
             <a:r>
               <a:rPr lang="en-IN" b="1" dirty="0">
@@ -5085,6 +5584,1127 @@
           </a:p>
         </p:txBody>
       </p:sp>
+      <p:sp>
+        <p:nvSpPr>
+          <p:cNvPr id="3" name="Content Placeholder 2"/>
+          <p:cNvSpPr>
+            <a:spLocks noGrp="1"/>
+          </p:cNvSpPr>
+          <p:nvPr>
+            <p:ph type="body" idx="1"/>
+          </p:nvPr>
+        </p:nvSpPr>
+        <p:spPr>
+          <a:xfrm>
+            <a:off x="839788" y="1508580"/>
+            <a:ext cx="5176790" cy="823912"/>
+          </a:xfrm>
+          <a:solidFill>
+            <a:srgbClr val="0070C0"/>
+          </a:solidFill>
+          <a:ln w="28575">
+            <a:solidFill>
+              <a:schemeClr val="accent2">
+                <a:lumMod val="75000"/>
+              </a:schemeClr>
+            </a:solidFill>
+          </a:ln>
+        </p:spPr>
+        <p:style>
+          <a:lnRef idx="2">
+            <a:schemeClr val="accent2"/>
+          </a:lnRef>
+          <a:fillRef idx="1">
+            <a:schemeClr val="lt1"/>
+          </a:fillRef>
+          <a:effectRef idx="0">
+            <a:schemeClr val="accent2"/>
+          </a:effectRef>
+          <a:fontRef idx="minor">
+            <a:schemeClr val="dk1"/>
+          </a:fontRef>
+        </p:style>
+        <p:txBody>
+          <a:bodyPr>
+            <a:noAutofit/>
+          </a:bodyPr>
+          <a:lstStyle/>
+          <a:p>
+            <a:pPr marL="0" indent="0" algn="ctr">
+              <a:lnSpc>
+                <a:spcPct val="250000"/>
+              </a:lnSpc>
+              <a:buNone/>
+            </a:pPr>
+            <a:r>
+              <a:rPr lang="en-IN" sz="2800" dirty="0" smtClean="0">
+                <a:solidFill>
+                  <a:schemeClr val="bg1"/>
+                </a:solidFill>
+                <a:latin typeface="Britannic Bold" panose="020B0903060703020204" pitchFamily="34" charset="0"/>
+              </a:rPr>
+              <a:t>Source Data</a:t>
+            </a:r>
+            <a:endParaRPr lang="en-IN" sz="2800" dirty="0">
+              <a:solidFill>
+                <a:schemeClr val="bg1"/>
+              </a:solidFill>
+              <a:latin typeface="Britannic Bold" panose="020B0903060703020204" pitchFamily="34" charset="0"/>
+            </a:endParaRPr>
+          </a:p>
+        </p:txBody>
+      </p:sp>
+      <p:sp>
+        <p:nvSpPr>
+          <p:cNvPr id="22" name="Content Placeholder 21"/>
+          <p:cNvSpPr>
+            <a:spLocks noGrp="1"/>
+          </p:cNvSpPr>
+          <p:nvPr>
+            <p:ph sz="half" idx="2"/>
+          </p:nvPr>
+        </p:nvSpPr>
+        <p:spPr>
+          <a:xfrm>
+            <a:off x="836612" y="2322967"/>
+            <a:ext cx="5157787" cy="3712892"/>
+          </a:xfrm>
+          <a:ln w="28575">
+            <a:solidFill>
+              <a:schemeClr val="accent2">
+                <a:lumMod val="75000"/>
+              </a:schemeClr>
+            </a:solidFill>
+          </a:ln>
+        </p:spPr>
+        <p:style>
+          <a:lnRef idx="2">
+            <a:schemeClr val="accent2"/>
+          </a:lnRef>
+          <a:fillRef idx="1">
+            <a:schemeClr val="lt1"/>
+          </a:fillRef>
+          <a:effectRef idx="0">
+            <a:schemeClr val="accent2"/>
+          </a:effectRef>
+          <a:fontRef idx="minor">
+            <a:schemeClr val="dk1"/>
+          </a:fontRef>
+        </p:style>
+        <p:txBody>
+          <a:bodyPr>
+            <a:normAutofit/>
+          </a:bodyPr>
+          <a:lstStyle/>
+          <a:p>
+            <a:pPr>
+              <a:buFont typeface="Wingdings" panose="05000000000000000000" pitchFamily="2" charset="2"/>
+              <a:buChar char="Ø"/>
+            </a:pPr>
+            <a:r>
+              <a:rPr lang="en-IN" sz="2500" dirty="0" smtClean="0">
+                <a:hlinkClick r:id=""/>
+              </a:rPr>
+              <a:t>https</a:t>
+            </a:r>
+            <a:r>
+              <a:rPr lang="en-IN" sz="2500" dirty="0">
+                <a:hlinkClick r:id=""/>
+              </a:rPr>
+              <a:t>://www.kaggle.com/brittabettendorf/berlin-airbnb-data</a:t>
+            </a:r>
+            <a:endParaRPr lang="en-IN" sz="2500" dirty="0"/>
+          </a:p>
+          <a:p>
+            <a:pPr>
+              <a:buFont typeface="Wingdings" panose="05000000000000000000" pitchFamily="2" charset="2"/>
+              <a:buChar char="Ø"/>
+            </a:pPr>
+            <a:r>
+              <a:rPr lang="en-IN" sz="2500" dirty="0">
+                <a:hlinkClick r:id="rId2"/>
+              </a:rPr>
+              <a:t>http://insideairbnb.com/get-the-data.html</a:t>
+            </a:r>
+            <a:endParaRPr lang="en-IN" sz="2500" dirty="0"/>
+          </a:p>
+          <a:p>
+            <a:endParaRPr lang="en-IN" sz="2400" dirty="0"/>
+          </a:p>
+          <a:p>
+            <a:pPr marL="0" indent="0">
+              <a:buNone/>
+            </a:pPr>
+            <a:endParaRPr lang="en-IN" sz="2400" dirty="0" smtClean="0"/>
+          </a:p>
+          <a:p>
+            <a:pPr marL="0" indent="0">
+              <a:buNone/>
+            </a:pPr>
+            <a:endParaRPr lang="en-IN" sz="2400" dirty="0"/>
+          </a:p>
+        </p:txBody>
+      </p:sp>
+      <p:sp>
+        <p:nvSpPr>
+          <p:cNvPr id="27" name="Text Placeholder 26"/>
+          <p:cNvSpPr>
+            <a:spLocks noGrp="1"/>
+          </p:cNvSpPr>
+          <p:nvPr>
+            <p:ph type="body" sz="quarter" idx="3"/>
+          </p:nvPr>
+        </p:nvSpPr>
+        <p:spPr>
+          <a:xfrm>
+            <a:off x="6019800" y="1508580"/>
+            <a:ext cx="5335588" cy="823912"/>
+          </a:xfrm>
+          <a:solidFill>
+            <a:srgbClr val="0070C0"/>
+          </a:solidFill>
+          <a:ln w="28575">
+            <a:solidFill>
+              <a:schemeClr val="accent2">
+                <a:lumMod val="75000"/>
+              </a:schemeClr>
+            </a:solidFill>
+          </a:ln>
+        </p:spPr>
+        <p:txBody>
+          <a:bodyPr>
+            <a:noAutofit/>
+          </a:bodyPr>
+          <a:lstStyle/>
+          <a:p>
+            <a:pPr algn="ctr">
+              <a:lnSpc>
+                <a:spcPct val="250000"/>
+              </a:lnSpc>
+            </a:pPr>
+            <a:r>
+              <a:rPr lang="en-IN" sz="2800" dirty="0" smtClean="0">
+                <a:solidFill>
+                  <a:schemeClr val="bg1"/>
+                </a:solidFill>
+                <a:latin typeface="Britannic Bold" panose="020B0903060703020204" pitchFamily="34" charset="0"/>
+              </a:rPr>
+              <a:t>API Data</a:t>
+            </a:r>
+            <a:endParaRPr lang="en-IN" sz="2800" dirty="0">
+              <a:solidFill>
+                <a:schemeClr val="bg1"/>
+              </a:solidFill>
+              <a:latin typeface="Britannic Bold" panose="020B0903060703020204" pitchFamily="34" charset="0"/>
+            </a:endParaRPr>
+          </a:p>
+        </p:txBody>
+      </p:sp>
+      <p:sp>
+        <p:nvSpPr>
+          <p:cNvPr id="28" name="Content Placeholder 27"/>
+          <p:cNvSpPr>
+            <a:spLocks noGrp="1"/>
+          </p:cNvSpPr>
+          <p:nvPr>
+            <p:ph sz="quarter" idx="4"/>
+          </p:nvPr>
+        </p:nvSpPr>
+        <p:spPr>
+          <a:xfrm>
+            <a:off x="6018189" y="2322967"/>
+            <a:ext cx="5338810" cy="3712892"/>
+          </a:xfrm>
+          <a:ln w="28575">
+            <a:solidFill>
+              <a:schemeClr val="accent2">
+                <a:lumMod val="75000"/>
+              </a:schemeClr>
+            </a:solidFill>
+          </a:ln>
+        </p:spPr>
+        <p:txBody>
+          <a:bodyPr/>
+          <a:lstStyle/>
+          <a:p>
+            <a:pPr>
+              <a:buFont typeface="Wingdings" panose="05000000000000000000" pitchFamily="2" charset="2"/>
+              <a:buChar char="Ø"/>
+            </a:pPr>
+            <a:r>
+              <a:rPr lang="en-IN" sz="2500" dirty="0">
+                <a:hlinkClick r:id="rId3"/>
+              </a:rPr>
+              <a:t>https://api.yelp.com/v3/businesses/search</a:t>
+            </a:r>
+            <a:endParaRPr lang="en-IN" sz="2500" dirty="0"/>
+          </a:p>
+          <a:p>
+            <a:pPr>
+              <a:buFont typeface="Wingdings" panose="05000000000000000000" pitchFamily="2" charset="2"/>
+              <a:buChar char="Ø"/>
+            </a:pPr>
+            <a:r>
+              <a:rPr lang="en-IN" sz="2500" dirty="0">
+                <a:hlinkClick r:id="rId4"/>
+              </a:rPr>
+              <a:t>https://maps.googleapis.com/maps/api/geocode/json</a:t>
+            </a:r>
+            <a:r>
+              <a:rPr lang="en-IN" sz="2500" dirty="0"/>
+              <a:t>?</a:t>
+            </a:r>
+          </a:p>
+          <a:p>
+            <a:endParaRPr lang="en-IN" dirty="0"/>
+          </a:p>
+        </p:txBody>
+      </p:sp>
+      <p:pic>
+        <p:nvPicPr>
+          <p:cNvPr id="6" name="Picture 5"/>
+          <p:cNvPicPr>
+            <a:picLocks noChangeAspect="1"/>
+          </p:cNvPicPr>
+          <p:nvPr/>
+        </p:nvPicPr>
+        <p:blipFill>
+          <a:blip r:embed="rId5"/>
+          <a:stretch>
+            <a:fillRect/>
+          </a:stretch>
+        </p:blipFill>
+        <p:spPr>
+          <a:xfrm>
+            <a:off x="1304897" y="4071697"/>
+            <a:ext cx="4293395" cy="1757143"/>
+          </a:xfrm>
+          <a:prstGeom prst="rect">
+            <a:avLst/>
+          </a:prstGeom>
+        </p:spPr>
+      </p:pic>
+      <p:pic>
+        <p:nvPicPr>
+          <p:cNvPr id="7" name="Picture 6"/>
+          <p:cNvPicPr>
+            <a:picLocks noChangeAspect="1"/>
+          </p:cNvPicPr>
+          <p:nvPr/>
+        </p:nvPicPr>
+        <p:blipFill>
+          <a:blip r:embed="rId6"/>
+          <a:stretch>
+            <a:fillRect/>
+          </a:stretch>
+        </p:blipFill>
+        <p:spPr>
+          <a:xfrm>
+            <a:off x="10106024" y="6167439"/>
+            <a:ext cx="2085975" cy="690561"/>
+          </a:xfrm>
+          <a:prstGeom prst="rect">
+            <a:avLst/>
+          </a:prstGeom>
+        </p:spPr>
+      </p:pic>
+      <p:pic>
+        <p:nvPicPr>
+          <p:cNvPr id="26" name="Picture 25"/>
+          <p:cNvPicPr>
+            <a:picLocks noChangeAspect="1"/>
+          </p:cNvPicPr>
+          <p:nvPr/>
+        </p:nvPicPr>
+        <p:blipFill>
+          <a:blip r:embed="rId7"/>
+          <a:stretch>
+            <a:fillRect/>
+          </a:stretch>
+        </p:blipFill>
+        <p:spPr>
+          <a:xfrm>
+            <a:off x="6373392" y="4174971"/>
+            <a:ext cx="4628403" cy="1550593"/>
+          </a:xfrm>
+          <a:prstGeom prst="rect">
+            <a:avLst/>
+          </a:prstGeom>
+        </p:spPr>
+      </p:pic>
+    </p:spTree>
+    <p:extLst>
+      <p:ext uri="{BB962C8B-B14F-4D97-AF65-F5344CB8AC3E}">
+        <p14:creationId xmlns:p14="http://schemas.microsoft.com/office/powerpoint/2010/main" val="503584227"/>
+      </p:ext>
+    </p:extLst>
+  </p:cSld>
+  <p:clrMapOvr>
+    <a:masterClrMapping/>
+  </p:clrMapOvr>
+  <p:timing>
+    <p:tnLst>
+      <p:par>
+        <p:cTn id="1" dur="indefinite" restart="never" nodeType="tmRoot"/>
+      </p:par>
+    </p:tnLst>
+  </p:timing>
+</p:sld>
+</file>
+
+<file path=ppt/slides/slide5.xml><?xml version="1.0" encoding="utf-8"?>
+<p:sld xmlns:a="http://schemas.openxmlformats.org/drawingml/2006/main" xmlns:r="http://schemas.openxmlformats.org/officeDocument/2006/relationships" xmlns:p="http://schemas.openxmlformats.org/presentationml/2006/main">
+  <p:cSld>
+    <p:spTree>
+      <p:nvGrpSpPr>
+        <p:cNvPr id="1" name=""/>
+        <p:cNvGrpSpPr/>
+        <p:nvPr/>
+      </p:nvGrpSpPr>
+      <p:grpSpPr>
+        <a:xfrm>
+          <a:off x="0" y="0"/>
+          <a:ext cx="0" cy="0"/>
+          <a:chOff x="0" y="0"/>
+          <a:chExt cx="0" cy="0"/>
+        </a:xfrm>
+      </p:grpSpPr>
+      <p:sp>
+        <p:nvSpPr>
+          <p:cNvPr id="3" name="Title 6"/>
+          <p:cNvSpPr>
+            <a:spLocks noGrp="1"/>
+          </p:cNvSpPr>
+          <p:nvPr>
+            <p:ph type="title"/>
+          </p:nvPr>
+        </p:nvSpPr>
+        <p:spPr>
+          <a:xfrm>
+            <a:off x="838200" y="365126"/>
+            <a:ext cx="10515600" cy="992188"/>
+          </a:xfrm>
+          <a:gradFill flip="none" rotWithShape="1">
+            <a:gsLst>
+              <a:gs pos="0">
+                <a:schemeClr val="accent2">
+                  <a:lumMod val="67000"/>
+                </a:schemeClr>
+              </a:gs>
+              <a:gs pos="48000">
+                <a:schemeClr val="accent2">
+                  <a:lumMod val="97000"/>
+                  <a:lumOff val="3000"/>
+                </a:schemeClr>
+              </a:gs>
+              <a:gs pos="100000">
+                <a:schemeClr val="accent2">
+                  <a:lumMod val="60000"/>
+                  <a:lumOff val="40000"/>
+                </a:schemeClr>
+              </a:gs>
+            </a:gsLst>
+            <a:lin ang="16200000" scaled="1"/>
+            <a:tileRect/>
+          </a:gradFill>
+          <a:ln w="28575">
+            <a:solidFill>
+              <a:schemeClr val="accent2">
+                <a:lumMod val="75000"/>
+              </a:schemeClr>
+            </a:solidFill>
+          </a:ln>
+        </p:spPr>
+        <p:style>
+          <a:lnRef idx="0">
+            <a:scrgbClr r="0" g="0" b="0"/>
+          </a:lnRef>
+          <a:fillRef idx="0">
+            <a:scrgbClr r="0" g="0" b="0"/>
+          </a:fillRef>
+          <a:effectRef idx="0">
+            <a:scrgbClr r="0" g="0" b="0"/>
+          </a:effectRef>
+          <a:fontRef idx="minor">
+            <a:schemeClr val="lt1"/>
+          </a:fontRef>
+        </p:style>
+        <p:txBody>
+          <a:bodyPr>
+            <a:normAutofit fontScale="90000"/>
+          </a:bodyPr>
+          <a:lstStyle/>
+          <a:p>
+            <a:pPr algn="ctr">
+              <a:lnSpc>
+                <a:spcPct val="100000"/>
+              </a:lnSpc>
+            </a:pPr>
+            <a:r>
+              <a:rPr lang="en-IN" b="1" dirty="0" smtClean="0">
+                <a:ln w="0"/>
+                <a:solidFill>
+                  <a:schemeClr val="bg1"/>
+                </a:solidFill>
+                <a:effectLst>
+                  <a:outerShdw blurRad="38100" dist="25400" dir="5400000" algn="ctr" rotWithShape="0">
+                    <a:srgbClr val="6E747A">
+                      <a:alpha val="43000"/>
+                    </a:srgbClr>
+                  </a:outerShdw>
+                </a:effectLst>
+                <a:latin typeface="Britannic Bold" panose="020B0903060703020204" pitchFamily="34" charset="0"/>
+              </a:rPr>
+              <a:t/>
+            </a:r>
+            <a:br>
+              <a:rPr lang="en-IN" b="1" dirty="0" smtClean="0">
+                <a:ln w="0"/>
+                <a:solidFill>
+                  <a:schemeClr val="bg1"/>
+                </a:solidFill>
+                <a:effectLst>
+                  <a:outerShdw blurRad="38100" dist="25400" dir="5400000" algn="ctr" rotWithShape="0">
+                    <a:srgbClr val="6E747A">
+                      <a:alpha val="43000"/>
+                    </a:srgbClr>
+                  </a:outerShdw>
+                </a:effectLst>
+                <a:latin typeface="Britannic Bold" panose="020B0903060703020204" pitchFamily="34" charset="0"/>
+              </a:rPr>
+            </a:br>
+            <a:r>
+              <a:rPr lang="en-IN" b="1" dirty="0" smtClean="0">
+                <a:ln w="0"/>
+                <a:solidFill>
+                  <a:schemeClr val="bg1"/>
+                </a:solidFill>
+                <a:effectLst>
+                  <a:outerShdw blurRad="38100" dist="25400" dir="5400000" algn="ctr" rotWithShape="0">
+                    <a:srgbClr val="6E747A">
+                      <a:alpha val="43000"/>
+                    </a:srgbClr>
+                  </a:outerShdw>
+                </a:effectLst>
+                <a:latin typeface="Britannic Bold" panose="020B0903060703020204" pitchFamily="34" charset="0"/>
+              </a:rPr>
+              <a:t>Data Sources Description</a:t>
+            </a:r>
+            <a:r>
+              <a:rPr lang="en-IN" b="1" dirty="0">
+                <a:ln w="0"/>
+                <a:solidFill>
+                  <a:schemeClr val="bg1"/>
+                </a:solidFill>
+                <a:effectLst>
+                  <a:outerShdw blurRad="38100" dist="25400" dir="5400000" algn="ctr" rotWithShape="0">
+                    <a:srgbClr val="6E747A">
+                      <a:alpha val="43000"/>
+                    </a:srgbClr>
+                  </a:outerShdw>
+                </a:effectLst>
+                <a:latin typeface="Britannic Bold" panose="020B0903060703020204" pitchFamily="34" charset="0"/>
+              </a:rPr>
+              <a:t/>
+            </a:r>
+            <a:br>
+              <a:rPr lang="en-IN" b="1" dirty="0">
+                <a:ln w="0"/>
+                <a:solidFill>
+                  <a:schemeClr val="bg1"/>
+                </a:solidFill>
+                <a:effectLst>
+                  <a:outerShdw blurRad="38100" dist="25400" dir="5400000" algn="ctr" rotWithShape="0">
+                    <a:srgbClr val="6E747A">
+                      <a:alpha val="43000"/>
+                    </a:srgbClr>
+                  </a:outerShdw>
+                </a:effectLst>
+                <a:latin typeface="Britannic Bold" panose="020B0903060703020204" pitchFamily="34" charset="0"/>
+              </a:rPr>
+            </a:br>
+            <a:endParaRPr lang="en-IN" dirty="0"/>
+          </a:p>
+        </p:txBody>
+      </p:sp>
+      <p:sp>
+        <p:nvSpPr>
+          <p:cNvPr id="8" name="Content Placeholder 7"/>
+          <p:cNvSpPr>
+            <a:spLocks noGrp="1"/>
+          </p:cNvSpPr>
+          <p:nvPr>
+            <p:ph idx="1"/>
+          </p:nvPr>
+        </p:nvSpPr>
+        <p:spPr>
+          <a:xfrm>
+            <a:off x="838200" y="1357314"/>
+            <a:ext cx="10515600" cy="4686299"/>
+          </a:xfrm>
+          <a:ln w="28575">
+            <a:solidFill>
+              <a:schemeClr val="accent2">
+                <a:lumMod val="75000"/>
+              </a:schemeClr>
+            </a:solidFill>
+          </a:ln>
+        </p:spPr>
+        <p:txBody>
+          <a:bodyPr/>
+          <a:lstStyle/>
+          <a:p>
+            <a:pPr>
+              <a:buFont typeface="Wingdings" panose="05000000000000000000" pitchFamily="2" charset="2"/>
+              <a:buChar char="q"/>
+            </a:pPr>
+            <a:r>
+              <a:rPr lang="en-IN" b="1" u="sng" dirty="0" smtClean="0"/>
+              <a:t>Source </a:t>
+            </a:r>
+            <a:r>
+              <a:rPr lang="en-IN" b="1" u="sng" dirty="0" smtClean="0"/>
+              <a:t>Data :</a:t>
+            </a:r>
+          </a:p>
+          <a:p>
+            <a:pPr>
+              <a:buFont typeface="Wingdings" panose="05000000000000000000" pitchFamily="2" charset="2"/>
+              <a:buChar char="ü"/>
+            </a:pPr>
+            <a:r>
+              <a:rPr lang="en-IN" sz="2400" dirty="0"/>
+              <a:t>The </a:t>
+            </a:r>
+            <a:r>
+              <a:rPr lang="en-IN" sz="2400" dirty="0" err="1" smtClean="0"/>
+              <a:t>Kaggle</a:t>
+            </a:r>
+            <a:r>
+              <a:rPr lang="en-IN" sz="2400" dirty="0" smtClean="0"/>
+              <a:t> datasets </a:t>
+            </a:r>
+            <a:r>
+              <a:rPr lang="en-IN" sz="2400" dirty="0"/>
+              <a:t>were scraped on November 07th, 2018 and </a:t>
+            </a:r>
+            <a:r>
+              <a:rPr lang="en-IN" sz="2400" dirty="0" smtClean="0"/>
+              <a:t>contains the </a:t>
+            </a:r>
+            <a:r>
+              <a:rPr lang="en-IN" sz="2400" dirty="0"/>
+              <a:t>detailed listings data, review data and calendar data of current Airbnb listings in </a:t>
+            </a:r>
+            <a:r>
+              <a:rPr lang="en-IN" sz="2400" dirty="0" smtClean="0"/>
+              <a:t>Berlin</a:t>
+            </a:r>
+            <a:r>
+              <a:rPr lang="en-IN" sz="2400" dirty="0"/>
+              <a:t> </a:t>
+            </a:r>
+            <a:r>
+              <a:rPr lang="en-IN" sz="2400" dirty="0" smtClean="0"/>
+              <a:t>from 2008 to 2018.</a:t>
+            </a:r>
+          </a:p>
+          <a:p>
+            <a:pPr>
+              <a:buFont typeface="Wingdings" panose="05000000000000000000" pitchFamily="2" charset="2"/>
+              <a:buChar char="ü"/>
+            </a:pPr>
+            <a:r>
+              <a:rPr lang="en-IN" sz="2400" dirty="0" smtClean="0"/>
+              <a:t>The </a:t>
+            </a:r>
+            <a:r>
+              <a:rPr lang="en-IN" sz="2400" dirty="0" err="1" smtClean="0"/>
+              <a:t>Kaggle</a:t>
+            </a:r>
+            <a:r>
+              <a:rPr lang="en-IN" sz="2400" dirty="0" smtClean="0"/>
+              <a:t> datasets were scraped from the insideairbnb.com </a:t>
+            </a:r>
+            <a:r>
+              <a:rPr lang="en-IN" sz="2400" dirty="0" smtClean="0"/>
+              <a:t>source. The latest scrapped was on 8</a:t>
+            </a:r>
+            <a:r>
+              <a:rPr lang="en-IN" sz="2400" baseline="30000" dirty="0" smtClean="0"/>
+              <a:t>th</a:t>
+            </a:r>
+            <a:r>
+              <a:rPr lang="en-IN" sz="2400" dirty="0" smtClean="0"/>
+              <a:t> June, 2019. ( We will be using the 8</a:t>
+            </a:r>
+            <a:r>
+              <a:rPr lang="en-IN" sz="2400" baseline="30000" dirty="0" smtClean="0"/>
+              <a:t>th</a:t>
+            </a:r>
+            <a:r>
+              <a:rPr lang="en-IN" sz="2400" dirty="0" smtClean="0"/>
+              <a:t> June 2019 data for our analysis)</a:t>
+            </a:r>
+            <a:endParaRPr lang="en-IN" sz="2400" dirty="0"/>
+          </a:p>
+          <a:p>
+            <a:pPr>
+              <a:buFont typeface="Wingdings" panose="05000000000000000000" pitchFamily="2" charset="2"/>
+              <a:buChar char="q"/>
+            </a:pPr>
+            <a:r>
+              <a:rPr lang="en-IN" b="1" u="sng" dirty="0" smtClean="0"/>
+              <a:t>API Data :</a:t>
+            </a:r>
+          </a:p>
+          <a:p>
+            <a:pPr>
+              <a:buFont typeface="Wingdings" panose="05000000000000000000" pitchFamily="2" charset="2"/>
+              <a:buChar char="ü"/>
+            </a:pPr>
+            <a:r>
+              <a:rPr lang="en-IN" sz="2400" u="sng" dirty="0" smtClean="0"/>
+              <a:t> </a:t>
+            </a:r>
+            <a:r>
+              <a:rPr lang="en-IN" sz="2400" dirty="0" smtClean="0"/>
+              <a:t>We have used the yelp and google api to retrieve the top 5 star ratings restaurants/café/bars around the top accommodations in berlin.</a:t>
+            </a:r>
+            <a:endParaRPr lang="en-IN" sz="2400" u="sng" dirty="0"/>
+          </a:p>
+        </p:txBody>
+      </p:sp>
+      <p:pic>
+        <p:nvPicPr>
+          <p:cNvPr id="9" name="Picture 8"/>
+          <p:cNvPicPr>
+            <a:picLocks noChangeAspect="1"/>
+          </p:cNvPicPr>
+          <p:nvPr/>
+        </p:nvPicPr>
+        <p:blipFill>
+          <a:blip r:embed="rId2"/>
+          <a:stretch>
+            <a:fillRect/>
+          </a:stretch>
+        </p:blipFill>
+        <p:spPr>
+          <a:xfrm>
+            <a:off x="10106024" y="6167439"/>
+            <a:ext cx="2085975" cy="690561"/>
+          </a:xfrm>
+          <a:prstGeom prst="rect">
+            <a:avLst/>
+          </a:prstGeom>
+        </p:spPr>
+      </p:pic>
+      <p:pic>
+        <p:nvPicPr>
+          <p:cNvPr id="10" name="Picture 9"/>
+          <p:cNvPicPr>
+            <a:picLocks noChangeAspect="1"/>
+          </p:cNvPicPr>
+          <p:nvPr/>
+        </p:nvPicPr>
+        <p:blipFill>
+          <a:blip r:embed="rId3"/>
+          <a:stretch>
+            <a:fillRect/>
+          </a:stretch>
+        </p:blipFill>
+        <p:spPr>
+          <a:xfrm>
+            <a:off x="9637202" y="5384008"/>
+            <a:ext cx="1511809" cy="557212"/>
+          </a:xfrm>
+          <a:prstGeom prst="rect">
+            <a:avLst/>
+          </a:prstGeom>
+        </p:spPr>
+      </p:pic>
+    </p:spTree>
+    <p:extLst>
+      <p:ext uri="{BB962C8B-B14F-4D97-AF65-F5344CB8AC3E}">
+        <p14:creationId xmlns:p14="http://schemas.microsoft.com/office/powerpoint/2010/main" val="1062386827"/>
+      </p:ext>
+    </p:extLst>
+  </p:cSld>
+  <p:clrMapOvr>
+    <a:masterClrMapping/>
+  </p:clrMapOvr>
+  <p:timing>
+    <p:tnLst>
+      <p:par>
+        <p:cTn id="1" dur="indefinite" restart="never" nodeType="tmRoot"/>
+      </p:par>
+    </p:tnLst>
+  </p:timing>
+</p:sld>
+</file>
+
+<file path=ppt/slides/slide6.xml><?xml version="1.0" encoding="utf-8"?>
+<p:sld xmlns:a="http://schemas.openxmlformats.org/drawingml/2006/main" xmlns:r="http://schemas.openxmlformats.org/officeDocument/2006/relationships" xmlns:p="http://schemas.openxmlformats.org/presentationml/2006/main">
+  <p:cSld>
+    <p:spTree>
+      <p:nvGrpSpPr>
+        <p:cNvPr id="1" name=""/>
+        <p:cNvGrpSpPr/>
+        <p:nvPr/>
+      </p:nvGrpSpPr>
+      <p:grpSpPr>
+        <a:xfrm>
+          <a:off x="0" y="0"/>
+          <a:ext cx="0" cy="0"/>
+          <a:chOff x="0" y="0"/>
+          <a:chExt cx="0" cy="0"/>
+        </a:xfrm>
+      </p:grpSpPr>
+      <p:pic>
+        <p:nvPicPr>
+          <p:cNvPr id="6" name="Picture 5"/>
+          <p:cNvPicPr>
+            <a:picLocks noChangeAspect="1"/>
+          </p:cNvPicPr>
+          <p:nvPr/>
+        </p:nvPicPr>
+        <p:blipFill>
+          <a:blip r:embed="rId2"/>
+          <a:stretch>
+            <a:fillRect/>
+          </a:stretch>
+        </p:blipFill>
+        <p:spPr>
+          <a:xfrm>
+            <a:off x="10106024" y="6167439"/>
+            <a:ext cx="2085975" cy="690561"/>
+          </a:xfrm>
+          <a:prstGeom prst="rect">
+            <a:avLst/>
+          </a:prstGeom>
+        </p:spPr>
+      </p:pic>
+      <p:sp>
+        <p:nvSpPr>
+          <p:cNvPr id="3" name="Content Placeholder 2"/>
+          <p:cNvSpPr>
+            <a:spLocks noGrp="1"/>
+          </p:cNvSpPr>
+          <p:nvPr>
+            <p:ph idx="1"/>
+          </p:nvPr>
+        </p:nvSpPr>
+        <p:spPr>
+          <a:xfrm>
+            <a:off x="838200" y="1278734"/>
+            <a:ext cx="10515600" cy="4888705"/>
+          </a:xfrm>
+          <a:ln w="28575">
+            <a:solidFill>
+              <a:schemeClr val="accent2">
+                <a:lumMod val="75000"/>
+              </a:schemeClr>
+            </a:solidFill>
+          </a:ln>
+        </p:spPr>
+        <p:txBody>
+          <a:bodyPr>
+            <a:normAutofit/>
+          </a:bodyPr>
+          <a:lstStyle/>
+          <a:p>
+            <a:pPr marL="0" indent="0">
+              <a:buNone/>
+            </a:pPr>
+            <a:r>
+              <a:rPr lang="en-IN" sz="2100" dirty="0" smtClean="0"/>
+              <a:t>There were around 106 features in Airbnb Listing Dataset consisting of various descriptive, categorical, numerical, Boolean, etc</a:t>
+            </a:r>
+            <a:r>
+              <a:rPr lang="en-IN" sz="2100" dirty="0"/>
+              <a:t>.</a:t>
+            </a:r>
+            <a:r>
+              <a:rPr lang="en-IN" sz="2100" dirty="0" smtClean="0"/>
+              <a:t> fields. </a:t>
+            </a:r>
+            <a:r>
+              <a:rPr lang="en-IN" sz="2100" dirty="0" smtClean="0"/>
+              <a:t>Few fields in the dataset had its own limitations. Below are the few data cleaning process implemented using Pandas as part of this Dataset.</a:t>
+            </a:r>
+          </a:p>
+          <a:p>
+            <a:pPr>
+              <a:buFont typeface="Wingdings" panose="05000000000000000000" pitchFamily="2" charset="2"/>
+              <a:buChar char="ü"/>
+            </a:pPr>
+            <a:r>
+              <a:rPr lang="en-IN" sz="2100" dirty="0" smtClean="0"/>
+              <a:t>Few unnecessary columns were dropped in the Listing Data frame which were not used as part of analysis. (By just seeing the data)</a:t>
+            </a:r>
+            <a:endParaRPr lang="en-IN" sz="2100" dirty="0" smtClean="0"/>
+          </a:p>
+          <a:p>
+            <a:pPr>
+              <a:buFont typeface="Wingdings" panose="05000000000000000000" pitchFamily="2" charset="2"/>
+              <a:buChar char="ü"/>
+            </a:pPr>
+            <a:endParaRPr lang="en-IN" sz="2100" dirty="0" smtClean="0"/>
+          </a:p>
+          <a:p>
+            <a:pPr>
+              <a:buFont typeface="Wingdings" panose="05000000000000000000" pitchFamily="2" charset="2"/>
+              <a:buChar char="ü"/>
+            </a:pPr>
+            <a:endParaRPr lang="en-IN" sz="2100" dirty="0"/>
+          </a:p>
+          <a:p>
+            <a:pPr marL="0" indent="0">
+              <a:buNone/>
+            </a:pPr>
+            <a:endParaRPr lang="en-IN" sz="2100" dirty="0"/>
+          </a:p>
+          <a:p>
+            <a:pPr marL="0" indent="0">
+              <a:spcBef>
+                <a:spcPts val="0"/>
+              </a:spcBef>
+              <a:buNone/>
+            </a:pPr>
+            <a:endParaRPr lang="en-IN" sz="2100" dirty="0" smtClean="0"/>
+          </a:p>
+          <a:p>
+            <a:pPr>
+              <a:buFont typeface="Wingdings" panose="05000000000000000000" pitchFamily="2" charset="2"/>
+              <a:buChar char="ü"/>
+            </a:pPr>
+            <a:r>
+              <a:rPr lang="en-IN" sz="2100" dirty="0" smtClean="0"/>
+              <a:t>The below columns were dropped because it had more than 85% of null values.</a:t>
+            </a:r>
+          </a:p>
+        </p:txBody>
+      </p:sp>
+      <p:sp>
+        <p:nvSpPr>
+          <p:cNvPr id="4" name="Title 6"/>
+          <p:cNvSpPr>
+            <a:spLocks noGrp="1"/>
+          </p:cNvSpPr>
+          <p:nvPr>
+            <p:ph type="title"/>
+          </p:nvPr>
+        </p:nvSpPr>
+        <p:spPr>
+          <a:xfrm>
+            <a:off x="838200" y="365126"/>
+            <a:ext cx="10515600" cy="913608"/>
+          </a:xfrm>
+          <a:gradFill flip="none" rotWithShape="1">
+            <a:gsLst>
+              <a:gs pos="0">
+                <a:schemeClr val="accent2">
+                  <a:lumMod val="67000"/>
+                </a:schemeClr>
+              </a:gs>
+              <a:gs pos="48000">
+                <a:schemeClr val="accent2">
+                  <a:lumMod val="97000"/>
+                  <a:lumOff val="3000"/>
+                </a:schemeClr>
+              </a:gs>
+              <a:gs pos="100000">
+                <a:schemeClr val="accent2">
+                  <a:lumMod val="60000"/>
+                  <a:lumOff val="40000"/>
+                </a:schemeClr>
+              </a:gs>
+            </a:gsLst>
+            <a:lin ang="16200000" scaled="1"/>
+            <a:tileRect/>
+          </a:gradFill>
+          <a:ln w="28575">
+            <a:solidFill>
+              <a:schemeClr val="accent2">
+                <a:lumMod val="75000"/>
+              </a:schemeClr>
+            </a:solidFill>
+          </a:ln>
+        </p:spPr>
+        <p:style>
+          <a:lnRef idx="0">
+            <a:scrgbClr r="0" g="0" b="0"/>
+          </a:lnRef>
+          <a:fillRef idx="0">
+            <a:scrgbClr r="0" g="0" b="0"/>
+          </a:fillRef>
+          <a:effectRef idx="0">
+            <a:scrgbClr r="0" g="0" b="0"/>
+          </a:effectRef>
+          <a:fontRef idx="minor">
+            <a:schemeClr val="lt1"/>
+          </a:fontRef>
+        </p:style>
+        <p:txBody>
+          <a:bodyPr>
+            <a:normAutofit fontScale="90000"/>
+          </a:bodyPr>
+          <a:lstStyle/>
+          <a:p>
+            <a:pPr algn="ctr">
+              <a:lnSpc>
+                <a:spcPct val="100000"/>
+              </a:lnSpc>
+            </a:pPr>
+            <a:r>
+              <a:rPr lang="en-IN" b="1" dirty="0" smtClean="0">
+                <a:ln w="0"/>
+                <a:solidFill>
+                  <a:schemeClr val="bg1"/>
+                </a:solidFill>
+                <a:effectLst>
+                  <a:outerShdw blurRad="38100" dist="25400" dir="5400000" algn="ctr" rotWithShape="0">
+                    <a:srgbClr val="6E747A">
+                      <a:alpha val="43000"/>
+                    </a:srgbClr>
+                  </a:outerShdw>
+                </a:effectLst>
+                <a:latin typeface="Britannic Bold" panose="020B0903060703020204" pitchFamily="34" charset="0"/>
+              </a:rPr>
+              <a:t/>
+            </a:r>
+            <a:br>
+              <a:rPr lang="en-IN" b="1" dirty="0" smtClean="0">
+                <a:ln w="0"/>
+                <a:solidFill>
+                  <a:schemeClr val="bg1"/>
+                </a:solidFill>
+                <a:effectLst>
+                  <a:outerShdw blurRad="38100" dist="25400" dir="5400000" algn="ctr" rotWithShape="0">
+                    <a:srgbClr val="6E747A">
+                      <a:alpha val="43000"/>
+                    </a:srgbClr>
+                  </a:outerShdw>
+                </a:effectLst>
+                <a:latin typeface="Britannic Bold" panose="020B0903060703020204" pitchFamily="34" charset="0"/>
+              </a:rPr>
+            </a:br>
+            <a:r>
+              <a:rPr lang="en-IN" b="1" dirty="0" smtClean="0">
+                <a:ln w="0"/>
+                <a:solidFill>
+                  <a:schemeClr val="bg1"/>
+                </a:solidFill>
+                <a:effectLst>
+                  <a:outerShdw blurRad="38100" dist="25400" dir="5400000" algn="ctr" rotWithShape="0">
+                    <a:srgbClr val="6E747A">
+                      <a:alpha val="43000"/>
+                    </a:srgbClr>
+                  </a:outerShdw>
+                </a:effectLst>
+                <a:latin typeface="Britannic Bold" panose="020B0903060703020204" pitchFamily="34" charset="0"/>
+              </a:rPr>
+              <a:t>Data Clean Up &amp; Exploration</a:t>
+            </a:r>
+            <a:r>
+              <a:rPr lang="en-IN" b="1" dirty="0">
+                <a:ln w="0"/>
+                <a:solidFill>
+                  <a:schemeClr val="bg1"/>
+                </a:solidFill>
+                <a:effectLst>
+                  <a:outerShdw blurRad="38100" dist="25400" dir="5400000" algn="ctr" rotWithShape="0">
+                    <a:srgbClr val="6E747A">
+                      <a:alpha val="43000"/>
+                    </a:srgbClr>
+                  </a:outerShdw>
+                </a:effectLst>
+                <a:latin typeface="Britannic Bold" panose="020B0903060703020204" pitchFamily="34" charset="0"/>
+              </a:rPr>
+              <a:t/>
+            </a:r>
+            <a:br>
+              <a:rPr lang="en-IN" b="1" dirty="0">
+                <a:ln w="0"/>
+                <a:solidFill>
+                  <a:schemeClr val="bg1"/>
+                </a:solidFill>
+                <a:effectLst>
+                  <a:outerShdw blurRad="38100" dist="25400" dir="5400000" algn="ctr" rotWithShape="0">
+                    <a:srgbClr val="6E747A">
+                      <a:alpha val="43000"/>
+                    </a:srgbClr>
+                  </a:outerShdw>
+                </a:effectLst>
+                <a:latin typeface="Britannic Bold" panose="020B0903060703020204" pitchFamily="34" charset="0"/>
+              </a:rPr>
+            </a:br>
+            <a:endParaRPr lang="en-IN" dirty="0"/>
+          </a:p>
+        </p:txBody>
+      </p:sp>
+      <p:pic>
+        <p:nvPicPr>
+          <p:cNvPr id="2" name="Picture 1"/>
+          <p:cNvPicPr>
+            <a:picLocks noChangeAspect="1"/>
+          </p:cNvPicPr>
+          <p:nvPr/>
+        </p:nvPicPr>
+        <p:blipFill>
+          <a:blip r:embed="rId3"/>
+          <a:stretch>
+            <a:fillRect/>
+          </a:stretch>
+        </p:blipFill>
+        <p:spPr>
+          <a:xfrm>
+            <a:off x="1166811" y="2933700"/>
+            <a:ext cx="7343775" cy="1447800"/>
+          </a:xfrm>
+          <a:prstGeom prst="rect">
+            <a:avLst/>
+          </a:prstGeom>
+          <a:ln>
+            <a:solidFill>
+              <a:schemeClr val="accent2">
+                <a:lumMod val="75000"/>
+              </a:schemeClr>
+            </a:solidFill>
+          </a:ln>
+        </p:spPr>
+      </p:pic>
+      <p:pic>
+        <p:nvPicPr>
+          <p:cNvPr id="5" name="Picture 4"/>
+          <p:cNvPicPr>
+            <a:picLocks noChangeAspect="1"/>
+          </p:cNvPicPr>
+          <p:nvPr/>
+        </p:nvPicPr>
+        <p:blipFill>
+          <a:blip r:embed="rId4"/>
+          <a:stretch>
+            <a:fillRect/>
+          </a:stretch>
+        </p:blipFill>
+        <p:spPr>
+          <a:xfrm>
+            <a:off x="1219198" y="4986336"/>
+            <a:ext cx="7239000" cy="971550"/>
+          </a:xfrm>
+          <a:prstGeom prst="rect">
+            <a:avLst/>
+          </a:prstGeom>
+          <a:ln>
+            <a:solidFill>
+              <a:schemeClr val="accent2">
+                <a:lumMod val="75000"/>
+              </a:schemeClr>
+            </a:solidFill>
+          </a:ln>
+        </p:spPr>
+      </p:pic>
     </p:spTree>
     <p:extLst>
       <p:ext uri="{BB962C8B-B14F-4D97-AF65-F5344CB8AC3E}">
@@ -5095,6 +6715,13 @@
   <p:clrMapOvr>
     <a:masterClrMapping/>
   </p:clrMapOvr>
+  <p:timing>
+    <p:tnLst>
+      <p:par>
+        <p:cTn id="1" dur="indefinite" restart="never" nodeType="tmRoot"/>
+      </p:par>
+    </p:tnLst>
+  </p:timing>
 </p:sld>
 </file>
 
@@ -5117,7 +6744,7 @@
       </p:grpSpPr>
       <p:pic>
         <p:nvPicPr>
-          <p:cNvPr id="3" name="Picture 2"/>
+          <p:cNvPr id="6" name="Picture 5"/>
           <p:cNvPicPr>
             <a:picLocks noChangeAspect="1"/>
           </p:cNvPicPr>
@@ -5131,18 +6758,1057 @@
         </p:blipFill>
         <p:spPr>
           <a:xfrm>
-            <a:off x="2943225" y="0"/>
-            <a:ext cx="5857875" cy="3209925"/>
+            <a:off x="10106024" y="6167439"/>
+            <a:ext cx="2085975" cy="690561"/>
           </a:xfrm>
           <a:prstGeom prst="rect">
             <a:avLst/>
           </a:prstGeom>
+        </p:spPr>
+      </p:pic>
+      <p:sp>
+        <p:nvSpPr>
+          <p:cNvPr id="3" name="Content Placeholder 2"/>
+          <p:cNvSpPr>
+            <a:spLocks noGrp="1"/>
+          </p:cNvSpPr>
+          <p:nvPr>
+            <p:ph idx="1"/>
+          </p:nvPr>
+        </p:nvSpPr>
+        <p:spPr>
+          <a:xfrm>
+            <a:off x="838200" y="1278734"/>
+            <a:ext cx="10515600" cy="4888705"/>
+          </a:xfrm>
+          <a:ln w="28575">
+            <a:solidFill>
+              <a:schemeClr val="accent2">
+                <a:lumMod val="75000"/>
+              </a:schemeClr>
+            </a:solidFill>
+          </a:ln>
+        </p:spPr>
+        <p:txBody>
+          <a:bodyPr>
+            <a:normAutofit/>
+          </a:bodyPr>
+          <a:lstStyle/>
+          <a:p>
+            <a:pPr>
+              <a:buFont typeface="Wingdings" panose="05000000000000000000" pitchFamily="2" charset="2"/>
+              <a:buChar char="ü"/>
+            </a:pPr>
+            <a:r>
+              <a:rPr lang="en-IN" sz="2100" dirty="0" smtClean="0"/>
+              <a:t>Similar type of columns were dropped by just keeping the important column.</a:t>
+            </a:r>
+            <a:endParaRPr lang="en-IN" sz="2100" dirty="0" smtClean="0"/>
+          </a:p>
+          <a:p>
+            <a:pPr marL="0" indent="0">
+              <a:buNone/>
+            </a:pPr>
+            <a:endParaRPr lang="en-IN" sz="2100" dirty="0"/>
+          </a:p>
+          <a:p>
+            <a:pPr marL="0" indent="0">
+              <a:spcBef>
+                <a:spcPts val="0"/>
+              </a:spcBef>
+              <a:buNone/>
+            </a:pPr>
+            <a:endParaRPr lang="en-IN" sz="2100" dirty="0" smtClean="0"/>
+          </a:p>
+          <a:p>
+            <a:pPr marL="0" indent="0">
+              <a:spcBef>
+                <a:spcPts val="0"/>
+              </a:spcBef>
+              <a:buNone/>
+            </a:pPr>
+            <a:endParaRPr lang="en-IN" sz="2100" dirty="0" smtClean="0"/>
+          </a:p>
+          <a:p>
+            <a:pPr>
+              <a:buFont typeface="Wingdings" panose="05000000000000000000" pitchFamily="2" charset="2"/>
+              <a:buChar char="ü"/>
+            </a:pPr>
+            <a:r>
+              <a:rPr lang="en-IN" sz="2100" dirty="0" smtClean="0"/>
+              <a:t>Locations related columns which had similar values in all the rows were dropped.</a:t>
+            </a:r>
+          </a:p>
+          <a:p>
+            <a:pPr marL="0" indent="0">
+              <a:buNone/>
+            </a:pPr>
+            <a:endParaRPr lang="en-IN" sz="2100" dirty="0" smtClean="0"/>
+          </a:p>
+          <a:p>
+            <a:pPr marL="0" indent="0">
+              <a:buNone/>
+            </a:pPr>
+            <a:endParaRPr lang="en-IN" sz="2100" dirty="0" smtClean="0"/>
+          </a:p>
+          <a:p>
+            <a:pPr>
+              <a:buFont typeface="Wingdings" panose="05000000000000000000" pitchFamily="2" charset="2"/>
+              <a:buChar char="ü"/>
+            </a:pPr>
+            <a:r>
+              <a:rPr lang="en-IN" sz="2100" dirty="0" smtClean="0"/>
+              <a:t>Boolean Columns which had just 1 category values were dropped.</a:t>
+            </a:r>
+            <a:endParaRPr lang="en-IN" sz="2100" dirty="0"/>
+          </a:p>
+          <a:p>
+            <a:pPr marL="0" indent="0">
+              <a:buNone/>
+            </a:pPr>
+            <a:endParaRPr lang="en-IN" sz="2100" dirty="0" smtClean="0"/>
+          </a:p>
+        </p:txBody>
+      </p:sp>
+      <p:sp>
+        <p:nvSpPr>
+          <p:cNvPr id="4" name="Title 6"/>
+          <p:cNvSpPr>
+            <a:spLocks noGrp="1"/>
+          </p:cNvSpPr>
+          <p:nvPr>
+            <p:ph type="title"/>
+          </p:nvPr>
+        </p:nvSpPr>
+        <p:spPr>
+          <a:xfrm>
+            <a:off x="838200" y="365126"/>
+            <a:ext cx="10515600" cy="913608"/>
+          </a:xfrm>
+          <a:gradFill flip="none" rotWithShape="1">
+            <a:gsLst>
+              <a:gs pos="0">
+                <a:schemeClr val="accent2">
+                  <a:lumMod val="67000"/>
+                </a:schemeClr>
+              </a:gs>
+              <a:gs pos="48000">
+                <a:schemeClr val="accent2">
+                  <a:lumMod val="97000"/>
+                  <a:lumOff val="3000"/>
+                </a:schemeClr>
+              </a:gs>
+              <a:gs pos="100000">
+                <a:schemeClr val="accent2">
+                  <a:lumMod val="60000"/>
+                  <a:lumOff val="40000"/>
+                </a:schemeClr>
+              </a:gs>
+            </a:gsLst>
+            <a:lin ang="16200000" scaled="1"/>
+            <a:tileRect/>
+          </a:gradFill>
+          <a:ln w="28575">
+            <a:solidFill>
+              <a:schemeClr val="accent2">
+                <a:lumMod val="75000"/>
+              </a:schemeClr>
+            </a:solidFill>
+          </a:ln>
+        </p:spPr>
+        <p:style>
+          <a:lnRef idx="0">
+            <a:scrgbClr r="0" g="0" b="0"/>
+          </a:lnRef>
+          <a:fillRef idx="0">
+            <a:scrgbClr r="0" g="0" b="0"/>
+          </a:fillRef>
+          <a:effectRef idx="0">
+            <a:scrgbClr r="0" g="0" b="0"/>
+          </a:effectRef>
+          <a:fontRef idx="minor">
+            <a:schemeClr val="lt1"/>
+          </a:fontRef>
+        </p:style>
+        <p:txBody>
+          <a:bodyPr>
+            <a:normAutofit fontScale="90000"/>
+          </a:bodyPr>
+          <a:lstStyle/>
+          <a:p>
+            <a:pPr algn="ctr">
+              <a:lnSpc>
+                <a:spcPct val="100000"/>
+              </a:lnSpc>
+            </a:pPr>
+            <a:r>
+              <a:rPr lang="en-IN" b="1" dirty="0" smtClean="0">
+                <a:ln w="0"/>
+                <a:solidFill>
+                  <a:schemeClr val="bg1"/>
+                </a:solidFill>
+                <a:effectLst>
+                  <a:outerShdw blurRad="38100" dist="25400" dir="5400000" algn="ctr" rotWithShape="0">
+                    <a:srgbClr val="6E747A">
+                      <a:alpha val="43000"/>
+                    </a:srgbClr>
+                  </a:outerShdw>
+                </a:effectLst>
+                <a:latin typeface="Britannic Bold" panose="020B0903060703020204" pitchFamily="34" charset="0"/>
+              </a:rPr>
+              <a:t/>
+            </a:r>
+            <a:br>
+              <a:rPr lang="en-IN" b="1" dirty="0" smtClean="0">
+                <a:ln w="0"/>
+                <a:solidFill>
+                  <a:schemeClr val="bg1"/>
+                </a:solidFill>
+                <a:effectLst>
+                  <a:outerShdw blurRad="38100" dist="25400" dir="5400000" algn="ctr" rotWithShape="0">
+                    <a:srgbClr val="6E747A">
+                      <a:alpha val="43000"/>
+                    </a:srgbClr>
+                  </a:outerShdw>
+                </a:effectLst>
+                <a:latin typeface="Britannic Bold" panose="020B0903060703020204" pitchFamily="34" charset="0"/>
+              </a:rPr>
+            </a:br>
+            <a:r>
+              <a:rPr lang="en-IN" b="1" dirty="0" smtClean="0">
+                <a:ln w="0"/>
+                <a:solidFill>
+                  <a:schemeClr val="bg1"/>
+                </a:solidFill>
+                <a:effectLst>
+                  <a:outerShdw blurRad="38100" dist="25400" dir="5400000" algn="ctr" rotWithShape="0">
+                    <a:srgbClr val="6E747A">
+                      <a:alpha val="43000"/>
+                    </a:srgbClr>
+                  </a:outerShdw>
+                </a:effectLst>
+                <a:latin typeface="Britannic Bold" panose="020B0903060703020204" pitchFamily="34" charset="0"/>
+              </a:rPr>
+              <a:t>Data Clean Up &amp; </a:t>
+            </a:r>
+            <a:r>
+              <a:rPr lang="en-IN" b="1" dirty="0" smtClean="0">
+                <a:ln w="0"/>
+                <a:solidFill>
+                  <a:schemeClr val="bg1"/>
+                </a:solidFill>
+                <a:effectLst>
+                  <a:outerShdw blurRad="38100" dist="25400" dir="5400000" algn="ctr" rotWithShape="0">
+                    <a:srgbClr val="6E747A">
+                      <a:alpha val="43000"/>
+                    </a:srgbClr>
+                  </a:outerShdw>
+                </a:effectLst>
+                <a:latin typeface="Britannic Bold" panose="020B0903060703020204" pitchFamily="34" charset="0"/>
+              </a:rPr>
+              <a:t>Exploration (cont..)</a:t>
+            </a:r>
+            <a:r>
+              <a:rPr lang="en-IN" b="1" dirty="0">
+                <a:ln w="0"/>
+                <a:solidFill>
+                  <a:schemeClr val="bg1"/>
+                </a:solidFill>
+                <a:effectLst>
+                  <a:outerShdw blurRad="38100" dist="25400" dir="5400000" algn="ctr" rotWithShape="0">
+                    <a:srgbClr val="6E747A">
+                      <a:alpha val="43000"/>
+                    </a:srgbClr>
+                  </a:outerShdw>
+                </a:effectLst>
+                <a:latin typeface="Britannic Bold" panose="020B0903060703020204" pitchFamily="34" charset="0"/>
+              </a:rPr>
+              <a:t/>
+            </a:r>
+            <a:br>
+              <a:rPr lang="en-IN" b="1" dirty="0">
+                <a:ln w="0"/>
+                <a:solidFill>
+                  <a:schemeClr val="bg1"/>
+                </a:solidFill>
+                <a:effectLst>
+                  <a:outerShdw blurRad="38100" dist="25400" dir="5400000" algn="ctr" rotWithShape="0">
+                    <a:srgbClr val="6E747A">
+                      <a:alpha val="43000"/>
+                    </a:srgbClr>
+                  </a:outerShdw>
+                </a:effectLst>
+                <a:latin typeface="Britannic Bold" panose="020B0903060703020204" pitchFamily="34" charset="0"/>
+              </a:rPr>
+            </a:br>
+            <a:endParaRPr lang="en-IN" dirty="0"/>
+          </a:p>
+        </p:txBody>
+      </p:sp>
+      <p:pic>
+        <p:nvPicPr>
+          <p:cNvPr id="8" name="Picture 7"/>
+          <p:cNvPicPr>
+            <a:picLocks noChangeAspect="1"/>
+          </p:cNvPicPr>
+          <p:nvPr/>
+        </p:nvPicPr>
+        <p:blipFill>
+          <a:blip r:embed="rId3"/>
+          <a:stretch>
+            <a:fillRect/>
+          </a:stretch>
+        </p:blipFill>
+        <p:spPr>
+          <a:xfrm>
+            <a:off x="1123950" y="1614487"/>
+            <a:ext cx="8058150" cy="914400"/>
+          </a:xfrm>
+          <a:prstGeom prst="rect">
+            <a:avLst/>
+          </a:prstGeom>
+          <a:ln>
+            <a:solidFill>
+              <a:schemeClr val="accent2">
+                <a:lumMod val="75000"/>
+              </a:schemeClr>
+            </a:solidFill>
+          </a:ln>
+        </p:spPr>
+      </p:pic>
+      <p:pic>
+        <p:nvPicPr>
+          <p:cNvPr id="9" name="Picture 8"/>
+          <p:cNvPicPr>
+            <a:picLocks noChangeAspect="1"/>
+          </p:cNvPicPr>
+          <p:nvPr/>
+        </p:nvPicPr>
+        <p:blipFill>
+          <a:blip r:embed="rId4"/>
+          <a:stretch>
+            <a:fillRect/>
+          </a:stretch>
+        </p:blipFill>
+        <p:spPr>
+          <a:xfrm>
+            <a:off x="1123950" y="3232945"/>
+            <a:ext cx="8058150" cy="453230"/>
+          </a:xfrm>
+          <a:prstGeom prst="rect">
+            <a:avLst/>
+          </a:prstGeom>
+          <a:ln>
+            <a:solidFill>
+              <a:schemeClr val="accent2">
+                <a:lumMod val="75000"/>
+              </a:schemeClr>
+            </a:solidFill>
+          </a:ln>
+        </p:spPr>
+      </p:pic>
+      <p:pic>
+        <p:nvPicPr>
+          <p:cNvPr id="14" name="Picture 13"/>
+          <p:cNvPicPr>
+            <a:picLocks noChangeAspect="1"/>
+          </p:cNvPicPr>
+          <p:nvPr/>
+        </p:nvPicPr>
+        <p:blipFill>
+          <a:blip r:embed="rId5"/>
+          <a:stretch>
+            <a:fillRect/>
+          </a:stretch>
+        </p:blipFill>
+        <p:spPr>
+          <a:xfrm>
+            <a:off x="1123950" y="4347768"/>
+            <a:ext cx="4714875" cy="1447800"/>
+          </a:xfrm>
+          <a:prstGeom prst="rect">
+            <a:avLst/>
+          </a:prstGeom>
+          <a:ln>
+            <a:solidFill>
+              <a:schemeClr val="accent2">
+                <a:lumMod val="75000"/>
+              </a:schemeClr>
+            </a:solidFill>
+          </a:ln>
+        </p:spPr>
+      </p:pic>
+      <p:pic>
+        <p:nvPicPr>
+          <p:cNvPr id="15" name="Picture 14"/>
+          <p:cNvPicPr>
+            <a:picLocks noChangeAspect="1"/>
+          </p:cNvPicPr>
+          <p:nvPr/>
+        </p:nvPicPr>
+        <p:blipFill>
+          <a:blip r:embed="rId6"/>
+          <a:stretch>
+            <a:fillRect/>
+          </a:stretch>
+        </p:blipFill>
+        <p:spPr>
+          <a:xfrm>
+            <a:off x="6505575" y="4347768"/>
+            <a:ext cx="4181475" cy="1447800"/>
+          </a:xfrm>
+          <a:prstGeom prst="rect">
+            <a:avLst/>
+          </a:prstGeom>
+          <a:ln>
+            <a:solidFill>
+              <a:schemeClr val="accent2">
+                <a:lumMod val="75000"/>
+              </a:schemeClr>
+            </a:solidFill>
+          </a:ln>
         </p:spPr>
       </p:pic>
     </p:spTree>
     <p:extLst>
       <p:ext uri="{BB962C8B-B14F-4D97-AF65-F5344CB8AC3E}">
-        <p14:creationId xmlns:p14="http://schemas.microsoft.com/office/powerpoint/2010/main" val="2396009489"/>
+        <p14:creationId xmlns:p14="http://schemas.microsoft.com/office/powerpoint/2010/main" val="2254829634"/>
+      </p:ext>
+    </p:extLst>
+  </p:cSld>
+  <p:clrMapOvr>
+    <a:masterClrMapping/>
+  </p:clrMapOvr>
+  <p:timing>
+    <p:tnLst>
+      <p:par>
+        <p:cTn id="1" dur="indefinite" restart="never" nodeType="tmRoot"/>
+      </p:par>
+    </p:tnLst>
+  </p:timing>
+</p:sld>
+</file>
+
+<file path=ppt/slides/slide8.xml><?xml version="1.0" encoding="utf-8"?>
+<p:sld xmlns:a="http://schemas.openxmlformats.org/drawingml/2006/main" xmlns:r="http://schemas.openxmlformats.org/officeDocument/2006/relationships" xmlns:p="http://schemas.openxmlformats.org/presentationml/2006/main">
+  <p:cSld>
+    <p:spTree>
+      <p:nvGrpSpPr>
+        <p:cNvPr id="1" name=""/>
+        <p:cNvGrpSpPr/>
+        <p:nvPr/>
+      </p:nvGrpSpPr>
+      <p:grpSpPr>
+        <a:xfrm>
+          <a:off x="0" y="0"/>
+          <a:ext cx="0" cy="0"/>
+          <a:chOff x="0" y="0"/>
+          <a:chExt cx="0" cy="0"/>
+        </a:xfrm>
+      </p:grpSpPr>
+      <p:pic>
+        <p:nvPicPr>
+          <p:cNvPr id="6" name="Picture 5"/>
+          <p:cNvPicPr>
+            <a:picLocks noChangeAspect="1"/>
+          </p:cNvPicPr>
+          <p:nvPr/>
+        </p:nvPicPr>
+        <p:blipFill>
+          <a:blip r:embed="rId2"/>
+          <a:stretch>
+            <a:fillRect/>
+          </a:stretch>
+        </p:blipFill>
+        <p:spPr>
+          <a:xfrm>
+            <a:off x="10106024" y="6167439"/>
+            <a:ext cx="2085975" cy="690561"/>
+          </a:xfrm>
+          <a:prstGeom prst="rect">
+            <a:avLst/>
+          </a:prstGeom>
+        </p:spPr>
+      </p:pic>
+      <p:sp>
+        <p:nvSpPr>
+          <p:cNvPr id="4" name="Title 6"/>
+          <p:cNvSpPr>
+            <a:spLocks noGrp="1"/>
+          </p:cNvSpPr>
+          <p:nvPr>
+            <p:ph type="title"/>
+          </p:nvPr>
+        </p:nvSpPr>
+        <p:spPr>
+          <a:xfrm>
+            <a:off x="838200" y="365126"/>
+            <a:ext cx="10515600" cy="1020762"/>
+          </a:xfrm>
+          <a:gradFill flip="none" rotWithShape="1">
+            <a:gsLst>
+              <a:gs pos="0">
+                <a:schemeClr val="accent2">
+                  <a:lumMod val="67000"/>
+                </a:schemeClr>
+              </a:gs>
+              <a:gs pos="48000">
+                <a:schemeClr val="accent2">
+                  <a:lumMod val="97000"/>
+                  <a:lumOff val="3000"/>
+                </a:schemeClr>
+              </a:gs>
+              <a:gs pos="100000">
+                <a:schemeClr val="accent2">
+                  <a:lumMod val="60000"/>
+                  <a:lumOff val="40000"/>
+                </a:schemeClr>
+              </a:gs>
+            </a:gsLst>
+            <a:lin ang="16200000" scaled="1"/>
+            <a:tileRect/>
+          </a:gradFill>
+          <a:ln w="28575">
+            <a:solidFill>
+              <a:schemeClr val="accent2">
+                <a:lumMod val="75000"/>
+              </a:schemeClr>
+            </a:solidFill>
+          </a:ln>
+        </p:spPr>
+        <p:style>
+          <a:lnRef idx="0">
+            <a:scrgbClr r="0" g="0" b="0"/>
+          </a:lnRef>
+          <a:fillRef idx="0">
+            <a:scrgbClr r="0" g="0" b="0"/>
+          </a:fillRef>
+          <a:effectRef idx="0">
+            <a:scrgbClr r="0" g="0" b="0"/>
+          </a:effectRef>
+          <a:fontRef idx="minor">
+            <a:schemeClr val="lt1"/>
+          </a:fontRef>
+        </p:style>
+        <p:txBody>
+          <a:bodyPr>
+            <a:normAutofit fontScale="90000"/>
+          </a:bodyPr>
+          <a:lstStyle/>
+          <a:p>
+            <a:pPr algn="ctr">
+              <a:lnSpc>
+                <a:spcPct val="100000"/>
+              </a:lnSpc>
+            </a:pPr>
+            <a:r>
+              <a:rPr lang="en-IN" b="1" dirty="0" smtClean="0">
+                <a:ln w="0"/>
+                <a:solidFill>
+                  <a:schemeClr val="bg1"/>
+                </a:solidFill>
+                <a:effectLst>
+                  <a:outerShdw blurRad="38100" dist="25400" dir="5400000" algn="ctr" rotWithShape="0">
+                    <a:srgbClr val="6E747A">
+                      <a:alpha val="43000"/>
+                    </a:srgbClr>
+                  </a:outerShdw>
+                </a:effectLst>
+                <a:latin typeface="Britannic Bold" panose="020B0903060703020204" pitchFamily="34" charset="0"/>
+              </a:rPr>
+              <a:t/>
+            </a:r>
+            <a:br>
+              <a:rPr lang="en-IN" b="1" dirty="0" smtClean="0">
+                <a:ln w="0"/>
+                <a:solidFill>
+                  <a:schemeClr val="bg1"/>
+                </a:solidFill>
+                <a:effectLst>
+                  <a:outerShdw blurRad="38100" dist="25400" dir="5400000" algn="ctr" rotWithShape="0">
+                    <a:srgbClr val="6E747A">
+                      <a:alpha val="43000"/>
+                    </a:srgbClr>
+                  </a:outerShdw>
+                </a:effectLst>
+                <a:latin typeface="Britannic Bold" panose="020B0903060703020204" pitchFamily="34" charset="0"/>
+              </a:rPr>
+            </a:br>
+            <a:r>
+              <a:rPr lang="en-IN" b="1" dirty="0" smtClean="0">
+                <a:ln w="0"/>
+                <a:solidFill>
+                  <a:schemeClr val="bg1"/>
+                </a:solidFill>
+                <a:effectLst>
+                  <a:outerShdw blurRad="38100" dist="25400" dir="5400000" algn="ctr" rotWithShape="0">
+                    <a:srgbClr val="6E747A">
+                      <a:alpha val="43000"/>
+                    </a:srgbClr>
+                  </a:outerShdw>
+                </a:effectLst>
+                <a:latin typeface="Britannic Bold" panose="020B0903060703020204" pitchFamily="34" charset="0"/>
+              </a:rPr>
+              <a:t>Data Clean Up &amp; </a:t>
+            </a:r>
+            <a:r>
+              <a:rPr lang="en-IN" b="1" dirty="0" smtClean="0">
+                <a:ln w="0"/>
+                <a:solidFill>
+                  <a:schemeClr val="bg1"/>
+                </a:solidFill>
+                <a:effectLst>
+                  <a:outerShdw blurRad="38100" dist="25400" dir="5400000" algn="ctr" rotWithShape="0">
+                    <a:srgbClr val="6E747A">
+                      <a:alpha val="43000"/>
+                    </a:srgbClr>
+                  </a:outerShdw>
+                </a:effectLst>
+                <a:latin typeface="Britannic Bold" panose="020B0903060703020204" pitchFamily="34" charset="0"/>
+              </a:rPr>
+              <a:t>Exploration (cont..)</a:t>
+            </a:r>
+            <a:r>
+              <a:rPr lang="en-IN" b="1" dirty="0">
+                <a:ln w="0"/>
+                <a:solidFill>
+                  <a:schemeClr val="bg1"/>
+                </a:solidFill>
+                <a:effectLst>
+                  <a:outerShdw blurRad="38100" dist="25400" dir="5400000" algn="ctr" rotWithShape="0">
+                    <a:srgbClr val="6E747A">
+                      <a:alpha val="43000"/>
+                    </a:srgbClr>
+                  </a:outerShdw>
+                </a:effectLst>
+                <a:latin typeface="Britannic Bold" panose="020B0903060703020204" pitchFamily="34" charset="0"/>
+              </a:rPr>
+              <a:t/>
+            </a:r>
+            <a:br>
+              <a:rPr lang="en-IN" b="1" dirty="0">
+                <a:ln w="0"/>
+                <a:solidFill>
+                  <a:schemeClr val="bg1"/>
+                </a:solidFill>
+                <a:effectLst>
+                  <a:outerShdw blurRad="38100" dist="25400" dir="5400000" algn="ctr" rotWithShape="0">
+                    <a:srgbClr val="6E747A">
+                      <a:alpha val="43000"/>
+                    </a:srgbClr>
+                  </a:outerShdw>
+                </a:effectLst>
+                <a:latin typeface="Britannic Bold" panose="020B0903060703020204" pitchFamily="34" charset="0"/>
+              </a:rPr>
+            </a:br>
+            <a:endParaRPr lang="en-IN" dirty="0"/>
+          </a:p>
+        </p:txBody>
+      </p:sp>
+      <p:sp>
+        <p:nvSpPr>
+          <p:cNvPr id="7" name="Content Placeholder 6"/>
+          <p:cNvSpPr>
+            <a:spLocks noGrp="1"/>
+          </p:cNvSpPr>
+          <p:nvPr>
+            <p:ph sz="half" idx="2"/>
+          </p:nvPr>
+        </p:nvSpPr>
+        <p:spPr>
+          <a:xfrm>
+            <a:off x="838201" y="1385888"/>
+            <a:ext cx="10515600" cy="4656138"/>
+          </a:xfrm>
+          <a:ln w="28575">
+            <a:solidFill>
+              <a:schemeClr val="accent2">
+                <a:lumMod val="75000"/>
+              </a:schemeClr>
+            </a:solidFill>
+          </a:ln>
+        </p:spPr>
+        <p:txBody>
+          <a:bodyPr>
+            <a:normAutofit/>
+          </a:bodyPr>
+          <a:lstStyle/>
+          <a:p>
+            <a:pPr>
+              <a:buFont typeface="Wingdings" panose="05000000000000000000" pitchFamily="2" charset="2"/>
+              <a:buChar char="ü"/>
+            </a:pPr>
+            <a:r>
+              <a:rPr lang="en-IN" sz="2300" dirty="0" smtClean="0"/>
+              <a:t>Amenities Column were stored as one big block of text. </a:t>
+            </a:r>
+          </a:p>
+          <a:p>
+            <a:pPr>
+              <a:buFont typeface="Wingdings" panose="05000000000000000000" pitchFamily="2" charset="2"/>
+              <a:buChar char="ü"/>
+            </a:pPr>
+            <a:endParaRPr lang="en-IN" sz="2300" dirty="0"/>
+          </a:p>
+          <a:p>
+            <a:pPr>
+              <a:buFont typeface="Wingdings" panose="05000000000000000000" pitchFamily="2" charset="2"/>
+              <a:buChar char="ü"/>
+            </a:pPr>
+            <a:endParaRPr lang="en-IN" sz="2300" dirty="0" smtClean="0"/>
+          </a:p>
+          <a:p>
+            <a:pPr>
+              <a:buFont typeface="Wingdings" panose="05000000000000000000" pitchFamily="2" charset="2"/>
+              <a:buChar char="ü"/>
+            </a:pPr>
+            <a:endParaRPr lang="en-IN" sz="2300" dirty="0"/>
+          </a:p>
+          <a:p>
+            <a:pPr>
+              <a:buFont typeface="Wingdings" panose="05000000000000000000" pitchFamily="2" charset="2"/>
+              <a:buChar char="ü"/>
+            </a:pPr>
+            <a:r>
+              <a:rPr lang="en-IN" sz="2300" dirty="0" smtClean="0"/>
+              <a:t>Date Columns were converted to date time format.</a:t>
+            </a:r>
+          </a:p>
+          <a:p>
+            <a:pPr>
+              <a:buFont typeface="Wingdings" panose="05000000000000000000" pitchFamily="2" charset="2"/>
+              <a:buChar char="ü"/>
+            </a:pPr>
+            <a:r>
+              <a:rPr lang="en-IN" sz="2300" dirty="0" smtClean="0"/>
+              <a:t>Price Related Columns were stored as string with dollar signs and comma separated values.</a:t>
+            </a:r>
+          </a:p>
+          <a:p>
+            <a:pPr>
+              <a:buFont typeface="Wingdings" panose="05000000000000000000" pitchFamily="2" charset="2"/>
+              <a:buChar char="ü"/>
+            </a:pPr>
+            <a:r>
+              <a:rPr lang="en-IN" sz="2300" dirty="0" smtClean="0"/>
+              <a:t>Similar column values were replaced with the respective values for a better plot. (for ex. Property type, Cancellation policy”)</a:t>
+            </a:r>
+          </a:p>
+          <a:p>
+            <a:pPr>
+              <a:buFont typeface="Wingdings" panose="05000000000000000000" pitchFamily="2" charset="2"/>
+              <a:buChar char="ü"/>
+            </a:pPr>
+            <a:r>
+              <a:rPr lang="en-IN" sz="2300" dirty="0" smtClean="0"/>
+              <a:t>Used Reverse Geocoder to retrieve the exact place name using Latitude &amp; Longitude</a:t>
+            </a:r>
+            <a:endParaRPr lang="en-IN" sz="2300" dirty="0"/>
+          </a:p>
+        </p:txBody>
+      </p:sp>
+      <p:pic>
+        <p:nvPicPr>
+          <p:cNvPr id="18" name="Picture 17"/>
+          <p:cNvPicPr>
+            <a:picLocks noChangeAspect="1"/>
+          </p:cNvPicPr>
+          <p:nvPr/>
+        </p:nvPicPr>
+        <p:blipFill>
+          <a:blip r:embed="rId3"/>
+          <a:stretch>
+            <a:fillRect/>
+          </a:stretch>
+        </p:blipFill>
+        <p:spPr>
+          <a:xfrm>
+            <a:off x="1085850" y="1745059"/>
+            <a:ext cx="8277225" cy="1323182"/>
+          </a:xfrm>
+          <a:prstGeom prst="rect">
+            <a:avLst/>
+          </a:prstGeom>
+        </p:spPr>
+      </p:pic>
+    </p:spTree>
+    <p:extLst>
+      <p:ext uri="{BB962C8B-B14F-4D97-AF65-F5344CB8AC3E}">
+        <p14:creationId xmlns:p14="http://schemas.microsoft.com/office/powerpoint/2010/main" val="2970365667"/>
+      </p:ext>
+    </p:extLst>
+  </p:cSld>
+  <p:clrMapOvr>
+    <a:masterClrMapping/>
+  </p:clrMapOvr>
+  <p:timing>
+    <p:tnLst>
+      <p:par>
+        <p:cTn id="1" dur="indefinite" restart="never" nodeType="tmRoot"/>
+      </p:par>
+    </p:tnLst>
+  </p:timing>
+</p:sld>
+</file>
+
+<file path=ppt/slides/slide9.xml><?xml version="1.0" encoding="utf-8"?>
+<p:sld xmlns:a="http://schemas.openxmlformats.org/drawingml/2006/main" xmlns:r="http://schemas.openxmlformats.org/officeDocument/2006/relationships" xmlns:p="http://schemas.openxmlformats.org/presentationml/2006/main">
+  <p:cSld>
+    <p:spTree>
+      <p:nvGrpSpPr>
+        <p:cNvPr id="1" name=""/>
+        <p:cNvGrpSpPr/>
+        <p:nvPr/>
+      </p:nvGrpSpPr>
+      <p:grpSpPr>
+        <a:xfrm>
+          <a:off x="0" y="0"/>
+          <a:ext cx="0" cy="0"/>
+          <a:chOff x="0" y="0"/>
+          <a:chExt cx="0" cy="0"/>
+        </a:xfrm>
+      </p:grpSpPr>
+      <p:sp>
+        <p:nvSpPr>
+          <p:cNvPr id="5" name="Title 6"/>
+          <p:cNvSpPr>
+            <a:spLocks noGrp="1"/>
+          </p:cNvSpPr>
+          <p:nvPr>
+            <p:ph type="title"/>
+          </p:nvPr>
+        </p:nvSpPr>
+        <p:spPr>
+          <a:xfrm>
+            <a:off x="838200" y="365125"/>
+            <a:ext cx="10515600" cy="1006475"/>
+          </a:xfrm>
+          <a:gradFill flip="none" rotWithShape="1">
+            <a:gsLst>
+              <a:gs pos="0">
+                <a:schemeClr val="accent2">
+                  <a:lumMod val="67000"/>
+                </a:schemeClr>
+              </a:gs>
+              <a:gs pos="48000">
+                <a:schemeClr val="accent2">
+                  <a:lumMod val="97000"/>
+                  <a:lumOff val="3000"/>
+                </a:schemeClr>
+              </a:gs>
+              <a:gs pos="100000">
+                <a:schemeClr val="accent2">
+                  <a:lumMod val="60000"/>
+                  <a:lumOff val="40000"/>
+                </a:schemeClr>
+              </a:gs>
+            </a:gsLst>
+            <a:lin ang="16200000" scaled="1"/>
+            <a:tileRect/>
+          </a:gradFill>
+          <a:ln w="28575">
+            <a:solidFill>
+              <a:schemeClr val="accent2">
+                <a:lumMod val="75000"/>
+              </a:schemeClr>
+            </a:solidFill>
+          </a:ln>
+        </p:spPr>
+        <p:style>
+          <a:lnRef idx="0">
+            <a:scrgbClr r="0" g="0" b="0"/>
+          </a:lnRef>
+          <a:fillRef idx="0">
+            <a:scrgbClr r="0" g="0" b="0"/>
+          </a:fillRef>
+          <a:effectRef idx="0">
+            <a:scrgbClr r="0" g="0" b="0"/>
+          </a:effectRef>
+          <a:fontRef idx="minor">
+            <a:schemeClr val="lt1"/>
+          </a:fontRef>
+        </p:style>
+        <p:txBody>
+          <a:bodyPr>
+            <a:normAutofit fontScale="90000"/>
+          </a:bodyPr>
+          <a:lstStyle/>
+          <a:p>
+            <a:pPr algn="ctr">
+              <a:lnSpc>
+                <a:spcPct val="100000"/>
+              </a:lnSpc>
+            </a:pPr>
+            <a:r>
+              <a:rPr lang="en-IN" b="1" dirty="0" smtClean="0">
+                <a:ln w="0"/>
+                <a:solidFill>
+                  <a:schemeClr val="bg1"/>
+                </a:solidFill>
+                <a:effectLst>
+                  <a:outerShdw blurRad="38100" dist="25400" dir="5400000" algn="ctr" rotWithShape="0">
+                    <a:srgbClr val="6E747A">
+                      <a:alpha val="43000"/>
+                    </a:srgbClr>
+                  </a:outerShdw>
+                </a:effectLst>
+                <a:latin typeface="Britannic Bold" panose="020B0903060703020204" pitchFamily="34" charset="0"/>
+              </a:rPr>
+              <a:t/>
+            </a:r>
+            <a:br>
+              <a:rPr lang="en-IN" b="1" dirty="0" smtClean="0">
+                <a:ln w="0"/>
+                <a:solidFill>
+                  <a:schemeClr val="bg1"/>
+                </a:solidFill>
+                <a:effectLst>
+                  <a:outerShdw blurRad="38100" dist="25400" dir="5400000" algn="ctr" rotWithShape="0">
+                    <a:srgbClr val="6E747A">
+                      <a:alpha val="43000"/>
+                    </a:srgbClr>
+                  </a:outerShdw>
+                </a:effectLst>
+                <a:latin typeface="Britannic Bold" panose="020B0903060703020204" pitchFamily="34" charset="0"/>
+              </a:rPr>
+            </a:br>
+            <a:r>
+              <a:rPr lang="en-IN" b="1" dirty="0" smtClean="0">
+                <a:ln w="0"/>
+                <a:solidFill>
+                  <a:schemeClr val="bg1"/>
+                </a:solidFill>
+                <a:effectLst>
+                  <a:outerShdw blurRad="38100" dist="25400" dir="5400000" algn="ctr" rotWithShape="0">
+                    <a:srgbClr val="6E747A">
+                      <a:alpha val="43000"/>
+                    </a:srgbClr>
+                  </a:outerShdw>
+                </a:effectLst>
+                <a:latin typeface="Britannic Bold" panose="020B0903060703020204" pitchFamily="34" charset="0"/>
+              </a:rPr>
+              <a:t>Factors for Business Growth</a:t>
+            </a:r>
+            <a:r>
+              <a:rPr lang="en-IN" b="1" dirty="0">
+                <a:ln w="0"/>
+                <a:solidFill>
+                  <a:schemeClr val="bg1"/>
+                </a:solidFill>
+                <a:effectLst>
+                  <a:outerShdw blurRad="38100" dist="25400" dir="5400000" algn="ctr" rotWithShape="0">
+                    <a:srgbClr val="6E747A">
+                      <a:alpha val="43000"/>
+                    </a:srgbClr>
+                  </a:outerShdw>
+                </a:effectLst>
+                <a:latin typeface="Britannic Bold" panose="020B0903060703020204" pitchFamily="34" charset="0"/>
+              </a:rPr>
+              <a:t/>
+            </a:r>
+            <a:br>
+              <a:rPr lang="en-IN" b="1" dirty="0">
+                <a:ln w="0"/>
+                <a:solidFill>
+                  <a:schemeClr val="bg1"/>
+                </a:solidFill>
+                <a:effectLst>
+                  <a:outerShdw blurRad="38100" dist="25400" dir="5400000" algn="ctr" rotWithShape="0">
+                    <a:srgbClr val="6E747A">
+                      <a:alpha val="43000"/>
+                    </a:srgbClr>
+                  </a:outerShdw>
+                </a:effectLst>
+                <a:latin typeface="Britannic Bold" panose="020B0903060703020204" pitchFamily="34" charset="0"/>
+              </a:rPr>
+            </a:br>
+            <a:endParaRPr lang="en-IN" dirty="0"/>
+          </a:p>
+        </p:txBody>
+      </p:sp>
+      <p:sp>
+        <p:nvSpPr>
+          <p:cNvPr id="4" name="Content Placeholder 3"/>
+          <p:cNvSpPr>
+            <a:spLocks noGrp="1"/>
+          </p:cNvSpPr>
+          <p:nvPr>
+            <p:ph idx="1"/>
+          </p:nvPr>
+        </p:nvSpPr>
+        <p:spPr>
+          <a:xfrm>
+            <a:off x="838200" y="1371599"/>
+            <a:ext cx="10515600" cy="4657725"/>
+          </a:xfrm>
+          <a:ln>
+            <a:solidFill>
+              <a:schemeClr val="accent2">
+                <a:lumMod val="75000"/>
+              </a:schemeClr>
+            </a:solidFill>
+          </a:ln>
+        </p:spPr>
+        <p:txBody>
+          <a:bodyPr/>
+          <a:lstStyle/>
+          <a:p>
+            <a:endParaRPr lang="en-IN" dirty="0" smtClean="0"/>
+          </a:p>
+          <a:p>
+            <a:endParaRPr lang="en-IN" dirty="0"/>
+          </a:p>
+          <a:p>
+            <a:endParaRPr lang="en-IN" dirty="0" smtClean="0"/>
+          </a:p>
+          <a:p>
+            <a:endParaRPr lang="en-IN" dirty="0"/>
+          </a:p>
+          <a:p>
+            <a:endParaRPr lang="en-IN" dirty="0" smtClean="0"/>
+          </a:p>
+          <a:p>
+            <a:endParaRPr lang="en-IN" dirty="0"/>
+          </a:p>
+          <a:p>
+            <a:endParaRPr lang="en-IN" dirty="0" smtClean="0"/>
+          </a:p>
+          <a:p>
+            <a:pPr marL="0" indent="0">
+              <a:buNone/>
+            </a:pPr>
+            <a:endParaRPr lang="en-IN" dirty="0"/>
+          </a:p>
+        </p:txBody>
+      </p:sp>
+      <p:pic>
+        <p:nvPicPr>
+          <p:cNvPr id="7" name="Picture 6"/>
+          <p:cNvPicPr>
+            <a:picLocks noChangeAspect="1"/>
+          </p:cNvPicPr>
+          <p:nvPr/>
+        </p:nvPicPr>
+        <p:blipFill>
+          <a:blip r:embed="rId2"/>
+          <a:stretch>
+            <a:fillRect/>
+          </a:stretch>
+        </p:blipFill>
+        <p:spPr>
+          <a:xfrm>
+            <a:off x="1395412" y="1514474"/>
+            <a:ext cx="9401175" cy="4208463"/>
+          </a:xfrm>
+          <a:prstGeom prst="rect">
+            <a:avLst/>
+          </a:prstGeom>
+        </p:spPr>
+      </p:pic>
+    </p:spTree>
+    <p:extLst>
+      <p:ext uri="{BB962C8B-B14F-4D97-AF65-F5344CB8AC3E}">
+        <p14:creationId xmlns:p14="http://schemas.microsoft.com/office/powerpoint/2010/main" val="652367216"/>
       </p:ext>
     </p:extLst>
   </p:cSld>

</xml_diff>

<commit_message>
Presentation and updated the code with few more analysis
</commit_message>
<xml_diff>
--- a/Futuristic_Airbnb.pptx
+++ b/Futuristic_Airbnb.pptx
@@ -14,15 +14,15 @@
     <p:sldId id="264" r:id="rId8"/>
     <p:sldId id="265" r:id="rId9"/>
     <p:sldId id="267" r:id="rId10"/>
-    <p:sldId id="268" r:id="rId11"/>
-    <p:sldId id="269" r:id="rId12"/>
-    <p:sldId id="270" r:id="rId13"/>
-    <p:sldId id="271" r:id="rId14"/>
-    <p:sldId id="272" r:id="rId15"/>
+    <p:sldId id="269" r:id="rId11"/>
+    <p:sldId id="268" r:id="rId12"/>
+    <p:sldId id="272" r:id="rId13"/>
+    <p:sldId id="270" r:id="rId14"/>
+    <p:sldId id="271" r:id="rId15"/>
     <p:sldId id="273" r:id="rId16"/>
     <p:sldId id="278" r:id="rId17"/>
-    <p:sldId id="275" r:id="rId18"/>
-    <p:sldId id="276" r:id="rId19"/>
+    <p:sldId id="276" r:id="rId18"/>
+    <p:sldId id="275" r:id="rId19"/>
     <p:sldId id="277" r:id="rId20"/>
     <p:sldId id="279" r:id="rId21"/>
     <p:sldId id="280" r:id="rId22"/>
@@ -141,19 +141,19 @@
             <p14:sldId id="264"/>
             <p14:sldId id="265"/>
             <p14:sldId id="267"/>
+            <p14:sldId id="269"/>
             <p14:sldId id="268"/>
-            <p14:sldId id="269"/>
           </p14:sldIdLst>
         </p14:section>
         <p14:section name="Untitled Section" id="{75BBEA76-09CC-4CA7-95B8-C1BD3CCCB2BD}">
           <p14:sldIdLst>
+            <p14:sldId id="272"/>
             <p14:sldId id="270"/>
             <p14:sldId id="271"/>
-            <p14:sldId id="272"/>
             <p14:sldId id="273"/>
             <p14:sldId id="278"/>
+            <p14:sldId id="276"/>
             <p14:sldId id="275"/>
-            <p14:sldId id="276"/>
             <p14:sldId id="277"/>
             <p14:sldId id="279"/>
             <p14:sldId id="280"/>
@@ -3237,7 +3237,7 @@
       </p:grpSpPr>
       <p:pic>
         <p:nvPicPr>
-          <p:cNvPr id="5" name="Picture 4"/>
+          <p:cNvPr id="2" name="Picture 1"/>
           <p:cNvPicPr>
             <a:picLocks noChangeAspect="1"/>
           </p:cNvPicPr>
@@ -3251,8 +3251,8 @@
         </p:blipFill>
         <p:spPr>
           <a:xfrm>
-            <a:off x="10106024" y="6167439"/>
-            <a:ext cx="2085975" cy="690561"/>
+            <a:off x="985838" y="1557337"/>
+            <a:ext cx="5843587" cy="4600575"/>
           </a:xfrm>
           <a:prstGeom prst="rect">
             <a:avLst/>
@@ -3275,17 +3275,81 @@
         </p:blipFill>
         <p:spPr>
           <a:xfrm>
-            <a:off x="1500187" y="1900236"/>
-            <a:ext cx="9191625" cy="4043363"/>
+            <a:off x="6286499" y="1557337"/>
+            <a:ext cx="5905500" cy="5300663"/>
           </a:xfrm>
           <a:prstGeom prst="rect">
             <a:avLst/>
           </a:prstGeom>
         </p:spPr>
       </p:pic>
+      <p:pic>
+        <p:nvPicPr>
+          <p:cNvPr id="4" name="Picture 3"/>
+          <p:cNvPicPr>
+            <a:picLocks noChangeAspect="1"/>
+          </p:cNvPicPr>
+          <p:nvPr/>
+        </p:nvPicPr>
+        <p:blipFill>
+          <a:blip r:embed="rId4"/>
+          <a:stretch>
+            <a:fillRect/>
+          </a:stretch>
+        </p:blipFill>
+        <p:spPr>
+          <a:xfrm>
+            <a:off x="10106024" y="6167439"/>
+            <a:ext cx="2085975" cy="690561"/>
+          </a:xfrm>
+          <a:prstGeom prst="rect">
+            <a:avLst/>
+          </a:prstGeom>
+        </p:spPr>
+      </p:pic>
       <p:sp>
         <p:nvSpPr>
-          <p:cNvPr id="4" name="Title 6"/>
+          <p:cNvPr id="6" name="Content Placeholder 5"/>
+          <p:cNvSpPr>
+            <a:spLocks noGrp="1"/>
+          </p:cNvSpPr>
+          <p:nvPr>
+            <p:ph idx="1"/>
+          </p:nvPr>
+        </p:nvSpPr>
+        <p:spPr>
+          <a:xfrm>
+            <a:off x="838200" y="1085850"/>
+            <a:ext cx="10515600" cy="5048250"/>
+          </a:xfrm>
+          <a:ln w="28575">
+            <a:solidFill>
+              <a:schemeClr val="accent2">
+                <a:lumMod val="75000"/>
+              </a:schemeClr>
+            </a:solidFill>
+          </a:ln>
+        </p:spPr>
+        <p:txBody>
+          <a:bodyPr>
+            <a:normAutofit/>
+          </a:bodyPr>
+          <a:lstStyle/>
+          <a:p>
+            <a:pPr marL="0" indent="0" algn="ctr">
+              <a:buNone/>
+            </a:pPr>
+            <a:r>
+              <a:rPr lang="en-IN" sz="2400" dirty="0" smtClean="0"/>
+              <a:t>Does the Hosts really need the below Features? </a:t>
+            </a:r>
+            <a:endParaRPr lang="en-IN" sz="2400" dirty="0"/>
+          </a:p>
+        </p:txBody>
+      </p:sp>
+      <p:sp>
+        <p:nvSpPr>
+          <p:cNvPr id="7" name="Title 6"/>
           <p:cNvSpPr>
             <a:spLocks noGrp="1"/>
           </p:cNvSpPr>
@@ -3296,7 +3360,7 @@
         <p:spPr>
           <a:xfrm>
             <a:off x="838200" y="365126"/>
-            <a:ext cx="10515600" cy="992188"/>
+            <a:ext cx="10515600" cy="720724"/>
           </a:xfrm>
           <a:gradFill flip="none" rotWithShape="1">
             <a:gsLst>
@@ -3402,10 +3466,10 @@
                 </a:effectLst>
                 <a:latin typeface="Britannic Bold" panose="020B0903060703020204" pitchFamily="34" charset="0"/>
               </a:rPr>
-              <a:t>Top 20 Berlin Airbnb Locations </a:t>
-            </a:r>
-            <a:r>
-              <a:rPr lang="en-IN" b="1" dirty="0">
+              <a:t>Boolean </a:t>
+            </a:r>
+            <a:r>
+              <a:rPr lang="en-IN" b="1" dirty="0" smtClean="0">
                 <a:ln w="0"/>
                 <a:solidFill>
                   <a:schemeClr val="bg1"/>
@@ -3419,10 +3483,10 @@
                 </a:effectLst>
                 <a:latin typeface="Britannic Bold" panose="020B0903060703020204" pitchFamily="34" charset="0"/>
               </a:rPr>
-              <a:t/>
+              <a:t>Features Vs Price </a:t>
             </a:r>
             <a:br>
-              <a:rPr lang="en-IN" b="1" dirty="0">
+              <a:rPr lang="en-IN" b="1" dirty="0" smtClean="0">
                 <a:ln w="0"/>
                 <a:solidFill>
                   <a:schemeClr val="bg1"/>
@@ -3441,45 +3505,10 @@
           </a:p>
         </p:txBody>
       </p:sp>
-      <p:sp>
-        <p:nvSpPr>
-          <p:cNvPr id="6" name="Content Placeholder 5"/>
-          <p:cNvSpPr>
-            <a:spLocks noGrp="1"/>
-          </p:cNvSpPr>
-          <p:nvPr>
-            <p:ph idx="1"/>
-          </p:nvPr>
-        </p:nvSpPr>
-        <p:spPr>
-          <a:xfrm>
-            <a:off x="838200" y="1357314"/>
-            <a:ext cx="10515600" cy="4819649"/>
-          </a:xfrm>
-          <a:ln w="28575">
-            <a:solidFill>
-              <a:schemeClr val="accent2">
-                <a:lumMod val="75000"/>
-              </a:schemeClr>
-            </a:solidFill>
-          </a:ln>
-        </p:spPr>
-        <p:txBody>
-          <a:bodyPr/>
-          <a:lstStyle/>
-          <a:p>
-            <a:r>
-              <a:rPr lang="en-IN" dirty="0" smtClean="0"/>
-              <a:t>Based on Property Ratings</a:t>
-            </a:r>
-            <a:endParaRPr lang="en-IN" dirty="0"/>
-          </a:p>
-        </p:txBody>
-      </p:sp>
     </p:spTree>
     <p:extLst>
       <p:ext uri="{BB962C8B-B14F-4D97-AF65-F5344CB8AC3E}">
-        <p14:creationId xmlns:p14="http://schemas.microsoft.com/office/powerpoint/2010/main" val="180897005"/>
+        <p14:creationId xmlns:p14="http://schemas.microsoft.com/office/powerpoint/2010/main" val="1843385309"/>
       </p:ext>
     </p:extLst>
   </p:cSld>
@@ -3515,7 +3544,7 @@
       </p:grpSpPr>
       <p:pic>
         <p:nvPicPr>
-          <p:cNvPr id="2" name="Picture 1"/>
+          <p:cNvPr id="5" name="Picture 4"/>
           <p:cNvPicPr>
             <a:picLocks noChangeAspect="1"/>
           </p:cNvPicPr>
@@ -3529,8 +3558,8 @@
         </p:blipFill>
         <p:spPr>
           <a:xfrm>
-            <a:off x="985838" y="1557337"/>
-            <a:ext cx="5843587" cy="4600575"/>
+            <a:off x="10106024" y="6167439"/>
+            <a:ext cx="2085975" cy="690561"/>
           </a:xfrm>
           <a:prstGeom prst="rect">
             <a:avLst/>
@@ -3553,81 +3582,17 @@
         </p:blipFill>
         <p:spPr>
           <a:xfrm>
-            <a:off x="6286499" y="1557337"/>
-            <a:ext cx="5905500" cy="5300663"/>
+            <a:off x="1500187" y="1900236"/>
+            <a:ext cx="9191625" cy="4043363"/>
           </a:xfrm>
           <a:prstGeom prst="rect">
             <a:avLst/>
           </a:prstGeom>
         </p:spPr>
       </p:pic>
-      <p:pic>
-        <p:nvPicPr>
-          <p:cNvPr id="4" name="Picture 3"/>
-          <p:cNvPicPr>
-            <a:picLocks noChangeAspect="1"/>
-          </p:cNvPicPr>
-          <p:nvPr/>
-        </p:nvPicPr>
-        <p:blipFill>
-          <a:blip r:embed="rId4"/>
-          <a:stretch>
-            <a:fillRect/>
-          </a:stretch>
-        </p:blipFill>
-        <p:spPr>
-          <a:xfrm>
-            <a:off x="10106024" y="6167439"/>
-            <a:ext cx="2085975" cy="690561"/>
-          </a:xfrm>
-          <a:prstGeom prst="rect">
-            <a:avLst/>
-          </a:prstGeom>
-        </p:spPr>
-      </p:pic>
       <p:sp>
         <p:nvSpPr>
-          <p:cNvPr id="6" name="Content Placeholder 5"/>
-          <p:cNvSpPr>
-            <a:spLocks noGrp="1"/>
-          </p:cNvSpPr>
-          <p:nvPr>
-            <p:ph idx="1"/>
-          </p:nvPr>
-        </p:nvSpPr>
-        <p:spPr>
-          <a:xfrm>
-            <a:off x="838200" y="1085850"/>
-            <a:ext cx="10515600" cy="5048250"/>
-          </a:xfrm>
-          <a:ln w="28575">
-            <a:solidFill>
-              <a:schemeClr val="accent2">
-                <a:lumMod val="75000"/>
-              </a:schemeClr>
-            </a:solidFill>
-          </a:ln>
-        </p:spPr>
-        <p:txBody>
-          <a:bodyPr>
-            <a:normAutofit/>
-          </a:bodyPr>
-          <a:lstStyle/>
-          <a:p>
-            <a:pPr marL="0" indent="0" algn="ctr">
-              <a:buNone/>
-            </a:pPr>
-            <a:r>
-              <a:rPr lang="en-IN" sz="2400" dirty="0" smtClean="0"/>
-              <a:t>Does the Hosts really need the below Features? </a:t>
-            </a:r>
-            <a:endParaRPr lang="en-IN" sz="2400" dirty="0"/>
-          </a:p>
-        </p:txBody>
-      </p:sp>
-      <p:sp>
-        <p:nvSpPr>
-          <p:cNvPr id="7" name="Title 6"/>
+          <p:cNvPr id="4" name="Title 6"/>
           <p:cNvSpPr>
             <a:spLocks noGrp="1"/>
           </p:cNvSpPr>
@@ -3638,7 +3603,7 @@
         <p:spPr>
           <a:xfrm>
             <a:off x="838200" y="365126"/>
-            <a:ext cx="10515600" cy="720724"/>
+            <a:ext cx="10515600" cy="992188"/>
           </a:xfrm>
           <a:gradFill flip="none" rotWithShape="1">
             <a:gsLst>
@@ -3744,10 +3709,10 @@
                 </a:effectLst>
                 <a:latin typeface="Britannic Bold" panose="020B0903060703020204" pitchFamily="34" charset="0"/>
               </a:rPr>
-              <a:t>Boolean </a:t>
-            </a:r>
-            <a:r>
-              <a:rPr lang="en-IN" b="1" dirty="0" smtClean="0">
+              <a:t>Top 20 Berlin Airbnb Locations </a:t>
+            </a:r>
+            <a:r>
+              <a:rPr lang="en-IN" b="1" dirty="0">
                 <a:ln w="0"/>
                 <a:solidFill>
                   <a:schemeClr val="bg1"/>
@@ -3761,10 +3726,10 @@
                 </a:effectLst>
                 <a:latin typeface="Britannic Bold" panose="020B0903060703020204" pitchFamily="34" charset="0"/>
               </a:rPr>
-              <a:t>Features Vs Price </a:t>
+              <a:t/>
             </a:r>
             <a:br>
-              <a:rPr lang="en-IN" b="1" dirty="0" smtClean="0">
+              <a:rPr lang="en-IN" b="1" dirty="0">
                 <a:ln w="0"/>
                 <a:solidFill>
                   <a:schemeClr val="bg1"/>
@@ -3783,10 +3748,45 @@
           </a:p>
         </p:txBody>
       </p:sp>
+      <p:sp>
+        <p:nvSpPr>
+          <p:cNvPr id="6" name="Content Placeholder 5"/>
+          <p:cNvSpPr>
+            <a:spLocks noGrp="1"/>
+          </p:cNvSpPr>
+          <p:nvPr>
+            <p:ph idx="1"/>
+          </p:nvPr>
+        </p:nvSpPr>
+        <p:spPr>
+          <a:xfrm>
+            <a:off x="838200" y="1357314"/>
+            <a:ext cx="10515600" cy="4819649"/>
+          </a:xfrm>
+          <a:ln w="28575">
+            <a:solidFill>
+              <a:schemeClr val="accent2">
+                <a:lumMod val="75000"/>
+              </a:schemeClr>
+            </a:solidFill>
+          </a:ln>
+        </p:spPr>
+        <p:txBody>
+          <a:bodyPr/>
+          <a:lstStyle/>
+          <a:p>
+            <a:r>
+              <a:rPr lang="en-IN" dirty="0" smtClean="0"/>
+              <a:t>Based on Property Ratings</a:t>
+            </a:r>
+            <a:endParaRPr lang="en-IN" dirty="0"/>
+          </a:p>
+        </p:txBody>
+      </p:sp>
     </p:spTree>
     <p:extLst>
       <p:ext uri="{BB962C8B-B14F-4D97-AF65-F5344CB8AC3E}">
-        <p14:creationId xmlns:p14="http://schemas.microsoft.com/office/powerpoint/2010/main" val="1843385309"/>
+        <p14:creationId xmlns:p14="http://schemas.microsoft.com/office/powerpoint/2010/main" val="180897005"/>
       </p:ext>
     </p:extLst>
   </p:cSld>
@@ -3822,21 +3822,69 @@
       </p:grpSpPr>
       <p:pic>
         <p:nvPicPr>
-          <p:cNvPr id="2" name="Picture 1"/>
+          <p:cNvPr id="21" name="Picture 20"/>
+          <p:cNvPicPr>
+            <a:picLocks noChangeAspect="1"/>
+          </p:cNvPicPr>
+          <p:nvPr/>
+        </p:nvPicPr>
+        <p:blipFill>
+          <a:blip r:embed="rId2"/>
+          <a:stretch>
+            <a:fillRect/>
+          </a:stretch>
+        </p:blipFill>
+        <p:spPr>
+          <a:xfrm>
+            <a:off x="10401300" y="1690688"/>
+            <a:ext cx="1600200" cy="3338512"/>
+          </a:xfrm>
+          <a:prstGeom prst="rect">
+            <a:avLst/>
+          </a:prstGeom>
+        </p:spPr>
+      </p:pic>
+      <p:pic>
+        <p:nvPicPr>
+          <p:cNvPr id="17" name="Picture 16"/>
+          <p:cNvPicPr>
+            <a:picLocks noChangeAspect="1"/>
+          </p:cNvPicPr>
+          <p:nvPr/>
+        </p:nvPicPr>
+        <p:blipFill>
+          <a:blip r:embed="rId3"/>
+          <a:stretch>
+            <a:fillRect/>
+          </a:stretch>
+        </p:blipFill>
+        <p:spPr>
+          <a:xfrm>
+            <a:off x="10229850" y="6167439"/>
+            <a:ext cx="1962149" cy="690561"/>
+          </a:xfrm>
+          <a:prstGeom prst="rect">
+            <a:avLst/>
+          </a:prstGeom>
+        </p:spPr>
+      </p:pic>
+      <p:pic>
+        <p:nvPicPr>
+          <p:cNvPr id="13" name="Picture 12"/>
           <p:cNvPicPr>
             <a:picLocks noChangeAspect="1"/>
           </p:cNvPicPr>
           <p:nvPr/>
         </p:nvPicPr>
         <p:blipFill rotWithShape="1">
-          <a:blip r:embed="rId2"/>
-          <a:srcRect b="4750"/>
+          <a:blip r:embed="rId4"/>
+          <a:srcRect r="48071"/>
           <a:stretch/>
         </p:blipFill>
         <p:spPr>
           <a:xfrm>
-            <a:off x="576261" y="557213"/>
-            <a:ext cx="9020177" cy="3086101"/>
+            <a:off x="923924" y="433387"/>
+            <a:ext cx="4743451" cy="3305175"/>
           </a:xfrm>
           <a:prstGeom prst="rect">
             <a:avLst/>
@@ -3845,61 +3893,7 @@
       </p:pic>
       <p:pic>
         <p:nvPicPr>
-          <p:cNvPr id="3" name="Picture 2"/>
-          <p:cNvPicPr>
-            <a:picLocks noChangeAspect="1"/>
-          </p:cNvPicPr>
-          <p:nvPr/>
-        </p:nvPicPr>
-        <p:blipFill rotWithShape="1">
-          <a:blip r:embed="rId3"/>
-          <a:srcRect b="12722"/>
-          <a:stretch/>
-        </p:blipFill>
-        <p:spPr>
-          <a:xfrm>
-            <a:off x="552448" y="3557589"/>
-            <a:ext cx="9043990" cy="3240000"/>
-          </a:xfrm>
-          <a:prstGeom prst="rect">
-            <a:avLst/>
-          </a:prstGeom>
-        </p:spPr>
-      </p:pic>
-      <p:pic>
-        <p:nvPicPr>
-          <p:cNvPr id="5" name="Picture 4"/>
-          <p:cNvPicPr>
-            <a:picLocks noChangeAspect="1"/>
-          </p:cNvPicPr>
-          <p:nvPr/>
-        </p:nvPicPr>
-        <p:blipFill>
-          <a:blip r:embed="rId4"/>
-          <a:stretch>
-            <a:fillRect/>
-          </a:stretch>
-        </p:blipFill>
-        <p:spPr>
-          <a:xfrm>
-            <a:off x="9596438" y="1042989"/>
-            <a:ext cx="2247900" cy="5029200"/>
-          </a:xfrm>
-          <a:prstGeom prst="rect">
-            <a:avLst/>
-          </a:prstGeom>
-          <a:ln>
-            <a:solidFill>
-              <a:schemeClr val="accent2">
-                <a:lumMod val="75000"/>
-              </a:schemeClr>
-            </a:solidFill>
-          </a:ln>
-        </p:spPr>
-      </p:pic>
-      <p:pic>
-        <p:nvPicPr>
-          <p:cNvPr id="6" name="Picture 5"/>
+          <p:cNvPr id="14" name="Picture 13"/>
           <p:cNvPicPr>
             <a:picLocks noChangeAspect="1"/>
           </p:cNvPicPr>
@@ -3913,187 +3907,66 @@
         </p:blipFill>
         <p:spPr>
           <a:xfrm>
-            <a:off x="10106024" y="6167439"/>
-            <a:ext cx="2085975" cy="690561"/>
+            <a:off x="5876925" y="433387"/>
+            <a:ext cx="4524375" cy="3162300"/>
           </a:xfrm>
           <a:prstGeom prst="rect">
             <a:avLst/>
           </a:prstGeom>
         </p:spPr>
       </p:pic>
-      <p:sp>
-        <p:nvSpPr>
-          <p:cNvPr id="9" name="Title 6"/>
-          <p:cNvSpPr>
-            <a:spLocks noGrp="1"/>
-          </p:cNvSpPr>
-          <p:nvPr>
-            <p:ph type="title"/>
-          </p:nvPr>
-        </p:nvSpPr>
-        <p:spPr>
-          <a:xfrm>
-            <a:off x="633411" y="69055"/>
-            <a:ext cx="10515600" cy="659607"/>
-          </a:xfrm>
-          <a:gradFill flip="none" rotWithShape="1">
-            <a:gsLst>
-              <a:gs pos="0">
-                <a:schemeClr val="accent2">
-                  <a:lumMod val="67000"/>
-                </a:schemeClr>
-              </a:gs>
-              <a:gs pos="48000">
-                <a:schemeClr val="accent2">
-                  <a:lumMod val="97000"/>
-                  <a:lumOff val="3000"/>
-                </a:schemeClr>
-              </a:gs>
-              <a:gs pos="100000">
-                <a:schemeClr val="accent2">
-                  <a:lumMod val="60000"/>
-                  <a:lumOff val="40000"/>
-                </a:schemeClr>
-              </a:gs>
-            </a:gsLst>
-            <a:lin ang="16200000" scaled="1"/>
-            <a:tileRect/>
-          </a:gradFill>
-          <a:ln w="28575">
-            <a:solidFill>
-              <a:schemeClr val="accent2">
-                <a:lumMod val="75000"/>
-              </a:schemeClr>
-            </a:solidFill>
-          </a:ln>
-        </p:spPr>
-        <p:style>
-          <a:lnRef idx="0">
-            <a:scrgbClr r="0" g="0" b="0"/>
-          </a:lnRef>
-          <a:fillRef idx="0">
-            <a:scrgbClr r="0" g="0" b="0"/>
-          </a:fillRef>
-          <a:effectRef idx="0">
-            <a:scrgbClr r="0" g="0" b="0"/>
-          </a:effectRef>
-          <a:fontRef idx="minor">
-            <a:schemeClr val="lt1"/>
-          </a:fontRef>
-        </p:style>
-        <p:txBody>
-          <a:bodyPr>
-            <a:normAutofit fontScale="90000"/>
-          </a:bodyPr>
-          <a:lstStyle/>
-          <a:p>
-            <a:pPr algn="ctr">
-              <a:lnSpc>
-                <a:spcPct val="100000"/>
-              </a:lnSpc>
-            </a:pPr>
-            <a:r>
-              <a:rPr lang="en-IN" b="1" dirty="0" smtClean="0">
-                <a:ln w="0"/>
-                <a:solidFill>
-                  <a:schemeClr val="bg1"/>
-                </a:solidFill>
-                <a:effectLst>
-                  <a:outerShdw blurRad="38100" dist="25400" dir="5400000" algn="ctr" rotWithShape="0">
-                    <a:srgbClr val="6E747A">
-                      <a:alpha val="43000"/>
-                    </a:srgbClr>
-                  </a:outerShdw>
-                </a:effectLst>
-                <a:latin typeface="Britannic Bold" panose="020B0903060703020204" pitchFamily="34" charset="0"/>
-              </a:rPr>
-              <a:t/>
-            </a:r>
-            <a:br>
-              <a:rPr lang="en-IN" b="1" dirty="0" smtClean="0">
-                <a:ln w="0"/>
-                <a:solidFill>
-                  <a:schemeClr val="bg1"/>
-                </a:solidFill>
-                <a:effectLst>
-                  <a:outerShdw blurRad="38100" dist="25400" dir="5400000" algn="ctr" rotWithShape="0">
-                    <a:srgbClr val="6E747A">
-                      <a:alpha val="43000"/>
-                    </a:srgbClr>
-                  </a:outerShdw>
-                </a:effectLst>
-                <a:latin typeface="Britannic Bold" panose="020B0903060703020204" pitchFamily="34" charset="0"/>
-              </a:rPr>
-            </a:br>
-            <a:r>
-              <a:rPr lang="en-IN" b="1" dirty="0"/>
-              <a:t>H</a:t>
-            </a:r>
-            <a:r>
-              <a:rPr lang="en-IN" b="1" dirty="0" smtClean="0"/>
-              <a:t>ow </a:t>
-            </a:r>
-            <a:r>
-              <a:rPr lang="en-IN" b="1" dirty="0"/>
-              <a:t>H</a:t>
-            </a:r>
-            <a:r>
-              <a:rPr lang="en-IN" b="1" dirty="0" smtClean="0"/>
-              <a:t>ave Prices </a:t>
-            </a:r>
-            <a:r>
-              <a:rPr lang="en-IN" b="1" dirty="0"/>
-              <a:t>C</a:t>
-            </a:r>
-            <a:r>
-              <a:rPr lang="en-IN" b="1" dirty="0" smtClean="0"/>
-              <a:t>hanged </a:t>
-            </a:r>
-            <a:r>
-              <a:rPr lang="en-IN" b="1" dirty="0"/>
-              <a:t>over time?</a:t>
-            </a:r>
-            <a:r>
-              <a:rPr lang="en-IN" b="1" dirty="0" smtClean="0">
-                <a:ln w="0"/>
-                <a:solidFill>
-                  <a:schemeClr val="bg1"/>
-                </a:solidFill>
-                <a:effectLst>
-                  <a:outerShdw blurRad="38100" dist="25400" dir="5400000" algn="ctr" rotWithShape="0">
-                    <a:srgbClr val="6E747A">
-                      <a:alpha val="43000"/>
-                    </a:srgbClr>
-                  </a:outerShdw>
-                </a:effectLst>
-                <a:latin typeface="Britannic Bold" panose="020B0903060703020204" pitchFamily="34" charset="0"/>
-              </a:rPr>
-              <a:t> </a:t>
-            </a:r>
-            <a:br>
-              <a:rPr lang="en-IN" b="1" dirty="0" smtClean="0">
-                <a:ln w="0"/>
-                <a:solidFill>
-                  <a:schemeClr val="bg1"/>
-                </a:solidFill>
-                <a:effectLst>
-                  <a:outerShdw blurRad="38100" dist="25400" dir="5400000" algn="ctr" rotWithShape="0">
-                    <a:srgbClr val="6E747A">
-                      <a:alpha val="43000"/>
-                    </a:srgbClr>
-                  </a:outerShdw>
-                </a:effectLst>
-                <a:latin typeface="Britannic Bold" panose="020B0903060703020204" pitchFamily="34" charset="0"/>
-              </a:rPr>
-            </a:br>
-            <a:endParaRPr lang="en-IN" dirty="0"/>
-          </a:p>
-        </p:txBody>
-      </p:sp>
+      <p:pic>
+        <p:nvPicPr>
+          <p:cNvPr id="15" name="Picture 14"/>
+          <p:cNvPicPr>
+            <a:picLocks noChangeAspect="1"/>
+          </p:cNvPicPr>
+          <p:nvPr/>
+        </p:nvPicPr>
+        <p:blipFill>
+          <a:blip r:embed="rId6"/>
+          <a:stretch>
+            <a:fillRect/>
+          </a:stretch>
+        </p:blipFill>
+        <p:spPr>
+          <a:xfrm>
+            <a:off x="1095375" y="3819525"/>
+            <a:ext cx="4572000" cy="3124200"/>
+          </a:xfrm>
+          <a:prstGeom prst="rect">
+            <a:avLst/>
+          </a:prstGeom>
+        </p:spPr>
+      </p:pic>
+      <p:pic>
+        <p:nvPicPr>
+          <p:cNvPr id="16" name="Picture 15"/>
+          <p:cNvPicPr>
+            <a:picLocks noChangeAspect="1"/>
+          </p:cNvPicPr>
+          <p:nvPr/>
+        </p:nvPicPr>
+        <p:blipFill>
+          <a:blip r:embed="rId7"/>
+          <a:stretch>
+            <a:fillRect/>
+          </a:stretch>
+        </p:blipFill>
+        <p:spPr>
+          <a:xfrm>
+            <a:off x="5876925" y="3595687"/>
+            <a:ext cx="4552950" cy="3095625"/>
+          </a:xfrm>
+          <a:prstGeom prst="rect">
+            <a:avLst/>
+          </a:prstGeom>
+        </p:spPr>
+      </p:pic>
     </p:spTree>
     <p:extLst>
       <p:ext uri="{BB962C8B-B14F-4D97-AF65-F5344CB8AC3E}">
-        <p14:creationId xmlns:p14="http://schemas.microsoft.com/office/powerpoint/2010/main" val="1229603811"/>
+        <p14:creationId xmlns:p14="http://schemas.microsoft.com/office/powerpoint/2010/main" val="2474232928"/>
       </p:ext>
     </p:extLst>
   </p:cSld>
@@ -4135,16 +4008,15 @@
           </p:cNvPicPr>
           <p:nvPr/>
         </p:nvPicPr>
-        <p:blipFill>
+        <p:blipFill rotWithShape="1">
           <a:blip r:embed="rId2"/>
-          <a:stretch>
-            <a:fillRect/>
-          </a:stretch>
+          <a:srcRect b="4750"/>
+          <a:stretch/>
         </p:blipFill>
         <p:spPr>
           <a:xfrm>
-            <a:off x="357187" y="1390650"/>
-            <a:ext cx="9248775" cy="3733800"/>
+            <a:off x="576261" y="557213"/>
+            <a:ext cx="9020177" cy="3086101"/>
           </a:xfrm>
           <a:prstGeom prst="rect">
             <a:avLst/>
@@ -4159,32 +4031,24 @@
           </p:cNvPicPr>
           <p:nvPr/>
         </p:nvPicPr>
-        <p:blipFill>
+        <p:blipFill rotWithShape="1">
           <a:blip r:embed="rId3"/>
-          <a:stretch>
-            <a:fillRect/>
-          </a:stretch>
+          <a:srcRect b="12722"/>
+          <a:stretch/>
         </p:blipFill>
         <p:spPr>
           <a:xfrm>
-            <a:off x="9829801" y="1390650"/>
-            <a:ext cx="1681162" cy="3733800"/>
+            <a:off x="552448" y="3557589"/>
+            <a:ext cx="9043990" cy="3240000"/>
           </a:xfrm>
           <a:prstGeom prst="rect">
             <a:avLst/>
           </a:prstGeom>
-          <a:ln>
-            <a:solidFill>
-              <a:schemeClr val="accent2">
-                <a:lumMod val="75000"/>
-              </a:schemeClr>
-            </a:solidFill>
-          </a:ln>
         </p:spPr>
       </p:pic>
       <p:pic>
         <p:nvPicPr>
-          <p:cNvPr id="4" name="Picture 3"/>
+          <p:cNvPr id="5" name="Picture 4"/>
           <p:cNvPicPr>
             <a:picLocks noChangeAspect="1"/>
           </p:cNvPicPr>
@@ -4198,30 +4062,60 @@
         </p:blipFill>
         <p:spPr>
           <a:xfrm>
-            <a:off x="10106024" y="6167439"/>
-            <a:ext cx="2085975" cy="690561"/>
+            <a:off x="9596438" y="1042989"/>
+            <a:ext cx="2247900" cy="5029200"/>
           </a:xfrm>
           <a:prstGeom prst="rect">
             <a:avLst/>
           </a:prstGeom>
+          <a:ln>
+            <a:solidFill>
+              <a:schemeClr val="accent2">
+                <a:lumMod val="75000"/>
+              </a:schemeClr>
+            </a:solidFill>
+          </a:ln>
+        </p:spPr>
+      </p:pic>
+      <p:pic>
+        <p:nvPicPr>
+          <p:cNvPr id="6" name="Picture 5"/>
+          <p:cNvPicPr>
+            <a:picLocks noChangeAspect="1"/>
+          </p:cNvPicPr>
+          <p:nvPr/>
+        </p:nvPicPr>
+        <p:blipFill>
+          <a:blip r:embed="rId5"/>
+          <a:stretch>
+            <a:fillRect/>
+          </a:stretch>
+        </p:blipFill>
+        <p:spPr>
+          <a:xfrm>
+            <a:off x="10106024" y="6167439"/>
+            <a:ext cx="2085975" cy="690561"/>
+          </a:xfrm>
+          <a:prstGeom prst="rect">
+            <a:avLst/>
+          </a:prstGeom>
         </p:spPr>
       </p:pic>
       <p:sp>
         <p:nvSpPr>
-          <p:cNvPr id="5" name="Title 6"/>
-          <p:cNvSpPr txBox="1">
-            <a:spLocks/>
+          <p:cNvPr id="9" name="Title 6"/>
+          <p:cNvSpPr>
+            <a:spLocks noGrp="1"/>
           </p:cNvSpPr>
-          <p:nvPr/>
+          <p:nvPr>
+            <p:ph type="title"/>
+          </p:nvPr>
         </p:nvSpPr>
         <p:spPr>
           <a:xfrm>
             <a:off x="633411" y="69055"/>
-            <a:ext cx="10515600" cy="945358"/>
-          </a:xfrm>
-          <a:prstGeom prst="rect">
-            <a:avLst/>
-          </a:prstGeom>
+            <a:ext cx="10515600" cy="659607"/>
+          </a:xfrm>
           <a:gradFill flip="none" rotWithShape="1">
             <a:gsLst>
               <a:gs pos="0">
@@ -4269,107 +4163,9 @@
         </p:style>
         <p:txBody>
           <a:bodyPr>
-            <a:noAutofit/>
+            <a:normAutofit fontScale="90000"/>
           </a:bodyPr>
-          <a:lstStyle>
-            <a:lvl1pPr algn="l" defTabSz="914400" rtl="0" eaLnBrk="1" latinLnBrk="0" hangingPunct="1">
-              <a:lnSpc>
-                <a:spcPct val="90000"/>
-              </a:lnSpc>
-              <a:spcBef>
-                <a:spcPct val="0"/>
-              </a:spcBef>
-              <a:buNone/>
-              <a:defRPr sz="4400" kern="1200">
-                <a:solidFill>
-                  <a:schemeClr val="lt1"/>
-                </a:solidFill>
-                <a:latin typeface="+mn-lt"/>
-                <a:ea typeface="+mn-ea"/>
-                <a:cs typeface="+mn-cs"/>
-              </a:defRPr>
-            </a:lvl1pPr>
-            <a:lvl2pPr>
-              <a:defRPr>
-                <a:solidFill>
-                  <a:schemeClr val="lt1"/>
-                </a:solidFill>
-                <a:latin typeface="+mn-lt"/>
-                <a:ea typeface="+mn-ea"/>
-                <a:cs typeface="+mn-cs"/>
-              </a:defRPr>
-            </a:lvl2pPr>
-            <a:lvl3pPr>
-              <a:defRPr>
-                <a:solidFill>
-                  <a:schemeClr val="lt1"/>
-                </a:solidFill>
-                <a:latin typeface="+mn-lt"/>
-                <a:ea typeface="+mn-ea"/>
-                <a:cs typeface="+mn-cs"/>
-              </a:defRPr>
-            </a:lvl3pPr>
-            <a:lvl4pPr>
-              <a:defRPr>
-                <a:solidFill>
-                  <a:schemeClr val="lt1"/>
-                </a:solidFill>
-                <a:latin typeface="+mn-lt"/>
-                <a:ea typeface="+mn-ea"/>
-                <a:cs typeface="+mn-cs"/>
-              </a:defRPr>
-            </a:lvl4pPr>
-            <a:lvl5pPr>
-              <a:defRPr>
-                <a:solidFill>
-                  <a:schemeClr val="lt1"/>
-                </a:solidFill>
-                <a:latin typeface="+mn-lt"/>
-                <a:ea typeface="+mn-ea"/>
-                <a:cs typeface="+mn-cs"/>
-              </a:defRPr>
-            </a:lvl5pPr>
-            <a:lvl6pPr>
-              <a:defRPr>
-                <a:solidFill>
-                  <a:schemeClr val="lt1"/>
-                </a:solidFill>
-                <a:latin typeface="+mn-lt"/>
-                <a:ea typeface="+mn-ea"/>
-                <a:cs typeface="+mn-cs"/>
-              </a:defRPr>
-            </a:lvl6pPr>
-            <a:lvl7pPr>
-              <a:defRPr>
-                <a:solidFill>
-                  <a:schemeClr val="lt1"/>
-                </a:solidFill>
-                <a:latin typeface="+mn-lt"/>
-                <a:ea typeface="+mn-ea"/>
-                <a:cs typeface="+mn-cs"/>
-              </a:defRPr>
-            </a:lvl7pPr>
-            <a:lvl8pPr>
-              <a:defRPr>
-                <a:solidFill>
-                  <a:schemeClr val="lt1"/>
-                </a:solidFill>
-                <a:latin typeface="+mn-lt"/>
-                <a:ea typeface="+mn-ea"/>
-                <a:cs typeface="+mn-cs"/>
-              </a:defRPr>
-            </a:lvl8pPr>
-            <a:lvl9pPr>
-              <a:defRPr>
-                <a:solidFill>
-                  <a:schemeClr val="lt1"/>
-                </a:solidFill>
-                <a:latin typeface="+mn-lt"/>
-                <a:ea typeface="+mn-ea"/>
-                <a:cs typeface="+mn-cs"/>
-              </a:defRPr>
-            </a:lvl9pPr>
-          </a:lstStyle>
+          <a:lstStyle/>
           <a:p>
             <a:pPr algn="ctr">
               <a:lnSpc>
@@ -4377,15 +4173,7 @@
               </a:lnSpc>
             </a:pPr>
             <a:r>
-              <a:rPr lang="en-IN" sz="2800" b="1" dirty="0" smtClean="0"/>
-              <a:t>Change </a:t>
-            </a:r>
-            <a:r>
-              <a:rPr lang="en-IN" sz="2800" b="1" dirty="0"/>
-              <a:t>per year in the number of listings per host on Airbnb in Berlin</a:t>
-            </a:r>
-            <a:r>
-              <a:rPr lang="en-IN" sz="2800" b="1" dirty="0" smtClean="0">
+              <a:rPr lang="en-IN" b="1" dirty="0" smtClean="0">
                 <a:ln w="0"/>
                 <a:solidFill>
                   <a:schemeClr val="bg1"/>
@@ -4399,10 +4187,10 @@
                 </a:effectLst>
                 <a:latin typeface="Britannic Bold" panose="020B0903060703020204" pitchFamily="34" charset="0"/>
               </a:rPr>
-              <a:t> </a:t>
+              <a:t/>
             </a:r>
             <a:br>
-              <a:rPr lang="en-IN" sz="2800" b="1" dirty="0" smtClean="0">
+              <a:rPr lang="en-IN" b="1" dirty="0" smtClean="0">
                 <a:ln w="0"/>
                 <a:solidFill>
                   <a:schemeClr val="bg1"/>
@@ -4417,14 +4205,75 @@
                 <a:latin typeface="Britannic Bold" panose="020B0903060703020204" pitchFamily="34" charset="0"/>
               </a:rPr>
             </a:br>
-            <a:endParaRPr lang="en-IN" sz="2800" dirty="0"/>
+            <a:r>
+              <a:rPr lang="en-IN" b="1" dirty="0"/>
+              <a:t>H</a:t>
+            </a:r>
+            <a:r>
+              <a:rPr lang="en-IN" b="1" dirty="0" smtClean="0"/>
+              <a:t>ow </a:t>
+            </a:r>
+            <a:r>
+              <a:rPr lang="en-IN" b="1" dirty="0"/>
+              <a:t>H</a:t>
+            </a:r>
+            <a:r>
+              <a:rPr lang="en-IN" b="1" dirty="0" smtClean="0"/>
+              <a:t>ave Prices </a:t>
+            </a:r>
+            <a:r>
+              <a:rPr lang="en-IN" b="1" dirty="0"/>
+              <a:t>C</a:t>
+            </a:r>
+            <a:r>
+              <a:rPr lang="en-IN" b="1" dirty="0" smtClean="0"/>
+              <a:t>hanged </a:t>
+            </a:r>
+            <a:r>
+              <a:rPr lang="en-IN" b="1" dirty="0"/>
+              <a:t>over time?</a:t>
+            </a:r>
+            <a:r>
+              <a:rPr lang="en-IN" b="1" dirty="0" smtClean="0">
+                <a:ln w="0"/>
+                <a:solidFill>
+                  <a:schemeClr val="bg1"/>
+                </a:solidFill>
+                <a:effectLst>
+                  <a:outerShdw blurRad="38100" dist="25400" dir="5400000" algn="ctr" rotWithShape="0">
+                    <a:srgbClr val="6E747A">
+                      <a:alpha val="43000"/>
+                    </a:srgbClr>
+                  </a:outerShdw>
+                </a:effectLst>
+                <a:latin typeface="Britannic Bold" panose="020B0903060703020204" pitchFamily="34" charset="0"/>
+              </a:rPr>
+              <a:t> </a:t>
+            </a:r>
+            <a:br>
+              <a:rPr lang="en-IN" b="1" dirty="0" smtClean="0">
+                <a:ln w="0"/>
+                <a:solidFill>
+                  <a:schemeClr val="bg1"/>
+                </a:solidFill>
+                <a:effectLst>
+                  <a:outerShdw blurRad="38100" dist="25400" dir="5400000" algn="ctr" rotWithShape="0">
+                    <a:srgbClr val="6E747A">
+                      <a:alpha val="43000"/>
+                    </a:srgbClr>
+                  </a:outerShdw>
+                </a:effectLst>
+                <a:latin typeface="Britannic Bold" panose="020B0903060703020204" pitchFamily="34" charset="0"/>
+              </a:rPr>
+            </a:br>
+            <a:endParaRPr lang="en-IN" dirty="0"/>
           </a:p>
         </p:txBody>
       </p:sp>
     </p:spTree>
     <p:extLst>
       <p:ext uri="{BB962C8B-B14F-4D97-AF65-F5344CB8AC3E}">
-        <p14:creationId xmlns:p14="http://schemas.microsoft.com/office/powerpoint/2010/main" val="2586965981"/>
+        <p14:creationId xmlns:p14="http://schemas.microsoft.com/office/powerpoint/2010/main" val="1229603811"/>
       </p:ext>
     </p:extLst>
   </p:cSld>
@@ -4460,7 +4309,7 @@
       </p:grpSpPr>
       <p:pic>
         <p:nvPicPr>
-          <p:cNvPr id="21" name="Picture 20"/>
+          <p:cNvPr id="2" name="Picture 1"/>
           <p:cNvPicPr>
             <a:picLocks noChangeAspect="1"/>
           </p:cNvPicPr>
@@ -4474,8 +4323,8 @@
         </p:blipFill>
         <p:spPr>
           <a:xfrm>
-            <a:off x="10401300" y="1690688"/>
-            <a:ext cx="1600200" cy="3338512"/>
+            <a:off x="357187" y="1390650"/>
+            <a:ext cx="9248775" cy="3733800"/>
           </a:xfrm>
           <a:prstGeom prst="rect">
             <a:avLst/>
@@ -4484,7 +4333,7 @@
       </p:pic>
       <p:pic>
         <p:nvPicPr>
-          <p:cNvPr id="17" name="Picture 16"/>
+          <p:cNvPr id="3" name="Picture 2"/>
           <p:cNvPicPr>
             <a:picLocks noChangeAspect="1"/>
           </p:cNvPicPr>
@@ -4498,113 +4347,264 @@
         </p:blipFill>
         <p:spPr>
           <a:xfrm>
-            <a:off x="10229850" y="6167439"/>
-            <a:ext cx="1962149" cy="690561"/>
+            <a:off x="9829801" y="1390650"/>
+            <a:ext cx="1681162" cy="3733800"/>
           </a:xfrm>
           <a:prstGeom prst="rect">
             <a:avLst/>
           </a:prstGeom>
+          <a:ln>
+            <a:solidFill>
+              <a:schemeClr val="accent2">
+                <a:lumMod val="75000"/>
+              </a:schemeClr>
+            </a:solidFill>
+          </a:ln>
         </p:spPr>
       </p:pic>
       <p:pic>
         <p:nvPicPr>
-          <p:cNvPr id="13" name="Picture 12"/>
-          <p:cNvPicPr>
-            <a:picLocks noChangeAspect="1"/>
-          </p:cNvPicPr>
-          <p:nvPr/>
-        </p:nvPicPr>
-        <p:blipFill rotWithShape="1">
-          <a:blip r:embed="rId4"/>
-          <a:srcRect r="48071"/>
-          <a:stretch/>
-        </p:blipFill>
-        <p:spPr>
-          <a:xfrm>
-            <a:off x="923924" y="433387"/>
-            <a:ext cx="4743451" cy="3305175"/>
-          </a:xfrm>
-          <a:prstGeom prst="rect">
-            <a:avLst/>
-          </a:prstGeom>
-        </p:spPr>
-      </p:pic>
-      <p:pic>
-        <p:nvPicPr>
-          <p:cNvPr id="14" name="Picture 13"/>
+          <p:cNvPr id="4" name="Picture 3"/>
           <p:cNvPicPr>
             <a:picLocks noChangeAspect="1"/>
           </p:cNvPicPr>
           <p:nvPr/>
         </p:nvPicPr>
         <p:blipFill>
-          <a:blip r:embed="rId5"/>
+          <a:blip r:embed="rId4"/>
           <a:stretch>
             <a:fillRect/>
           </a:stretch>
         </p:blipFill>
         <p:spPr>
           <a:xfrm>
-            <a:off x="5876925" y="433387"/>
-            <a:ext cx="4524375" cy="3162300"/>
+            <a:off x="10106024" y="6167439"/>
+            <a:ext cx="2085975" cy="690561"/>
           </a:xfrm>
           <a:prstGeom prst="rect">
             <a:avLst/>
           </a:prstGeom>
         </p:spPr>
       </p:pic>
-      <p:pic>
-        <p:nvPicPr>
-          <p:cNvPr id="15" name="Picture 14"/>
-          <p:cNvPicPr>
-            <a:picLocks noChangeAspect="1"/>
-          </p:cNvPicPr>
+      <p:sp>
+        <p:nvSpPr>
+          <p:cNvPr id="5" name="Title 6"/>
+          <p:cNvSpPr txBox="1">
+            <a:spLocks/>
+          </p:cNvSpPr>
           <p:nvPr/>
-        </p:nvPicPr>
-        <p:blipFill>
-          <a:blip r:embed="rId6"/>
-          <a:stretch>
-            <a:fillRect/>
-          </a:stretch>
-        </p:blipFill>
-        <p:spPr>
-          <a:xfrm>
-            <a:off x="1095375" y="3819525"/>
-            <a:ext cx="4572000" cy="3124200"/>
+        </p:nvSpPr>
+        <p:spPr>
+          <a:xfrm>
+            <a:off x="633411" y="69055"/>
+            <a:ext cx="10515600" cy="945358"/>
           </a:xfrm>
           <a:prstGeom prst="rect">
             <a:avLst/>
           </a:prstGeom>
-        </p:spPr>
-      </p:pic>
-      <p:pic>
-        <p:nvPicPr>
-          <p:cNvPr id="16" name="Picture 15"/>
-          <p:cNvPicPr>
-            <a:picLocks noChangeAspect="1"/>
-          </p:cNvPicPr>
-          <p:nvPr/>
-        </p:nvPicPr>
-        <p:blipFill>
-          <a:blip r:embed="rId7"/>
-          <a:stretch>
-            <a:fillRect/>
-          </a:stretch>
-        </p:blipFill>
-        <p:spPr>
-          <a:xfrm>
-            <a:off x="5876925" y="3595687"/>
-            <a:ext cx="4552950" cy="3095625"/>
-          </a:xfrm>
-          <a:prstGeom prst="rect">
-            <a:avLst/>
-          </a:prstGeom>
-        </p:spPr>
-      </p:pic>
+          <a:gradFill flip="none" rotWithShape="1">
+            <a:gsLst>
+              <a:gs pos="0">
+                <a:schemeClr val="accent2">
+                  <a:lumMod val="67000"/>
+                </a:schemeClr>
+              </a:gs>
+              <a:gs pos="48000">
+                <a:schemeClr val="accent2">
+                  <a:lumMod val="97000"/>
+                  <a:lumOff val="3000"/>
+                </a:schemeClr>
+              </a:gs>
+              <a:gs pos="100000">
+                <a:schemeClr val="accent2">
+                  <a:lumMod val="60000"/>
+                  <a:lumOff val="40000"/>
+                </a:schemeClr>
+              </a:gs>
+            </a:gsLst>
+            <a:lin ang="16200000" scaled="1"/>
+            <a:tileRect/>
+          </a:gradFill>
+          <a:ln w="28575">
+            <a:solidFill>
+              <a:schemeClr val="accent2">
+                <a:lumMod val="75000"/>
+              </a:schemeClr>
+            </a:solidFill>
+          </a:ln>
+        </p:spPr>
+        <p:style>
+          <a:lnRef idx="0">
+            <a:scrgbClr r="0" g="0" b="0"/>
+          </a:lnRef>
+          <a:fillRef idx="0">
+            <a:scrgbClr r="0" g="0" b="0"/>
+          </a:fillRef>
+          <a:effectRef idx="0">
+            <a:scrgbClr r="0" g="0" b="0"/>
+          </a:effectRef>
+          <a:fontRef idx="minor">
+            <a:schemeClr val="lt1"/>
+          </a:fontRef>
+        </p:style>
+        <p:txBody>
+          <a:bodyPr>
+            <a:noAutofit/>
+          </a:bodyPr>
+          <a:lstStyle>
+            <a:lvl1pPr algn="l" defTabSz="914400" rtl="0" eaLnBrk="1" latinLnBrk="0" hangingPunct="1">
+              <a:lnSpc>
+                <a:spcPct val="90000"/>
+              </a:lnSpc>
+              <a:spcBef>
+                <a:spcPct val="0"/>
+              </a:spcBef>
+              <a:buNone/>
+              <a:defRPr sz="4400" kern="1200">
+                <a:solidFill>
+                  <a:schemeClr val="lt1"/>
+                </a:solidFill>
+                <a:latin typeface="+mn-lt"/>
+                <a:ea typeface="+mn-ea"/>
+                <a:cs typeface="+mn-cs"/>
+              </a:defRPr>
+            </a:lvl1pPr>
+            <a:lvl2pPr>
+              <a:defRPr>
+                <a:solidFill>
+                  <a:schemeClr val="lt1"/>
+                </a:solidFill>
+                <a:latin typeface="+mn-lt"/>
+                <a:ea typeface="+mn-ea"/>
+                <a:cs typeface="+mn-cs"/>
+              </a:defRPr>
+            </a:lvl2pPr>
+            <a:lvl3pPr>
+              <a:defRPr>
+                <a:solidFill>
+                  <a:schemeClr val="lt1"/>
+                </a:solidFill>
+                <a:latin typeface="+mn-lt"/>
+                <a:ea typeface="+mn-ea"/>
+                <a:cs typeface="+mn-cs"/>
+              </a:defRPr>
+            </a:lvl3pPr>
+            <a:lvl4pPr>
+              <a:defRPr>
+                <a:solidFill>
+                  <a:schemeClr val="lt1"/>
+                </a:solidFill>
+                <a:latin typeface="+mn-lt"/>
+                <a:ea typeface="+mn-ea"/>
+                <a:cs typeface="+mn-cs"/>
+              </a:defRPr>
+            </a:lvl4pPr>
+            <a:lvl5pPr>
+              <a:defRPr>
+                <a:solidFill>
+                  <a:schemeClr val="lt1"/>
+                </a:solidFill>
+                <a:latin typeface="+mn-lt"/>
+                <a:ea typeface="+mn-ea"/>
+                <a:cs typeface="+mn-cs"/>
+              </a:defRPr>
+            </a:lvl5pPr>
+            <a:lvl6pPr>
+              <a:defRPr>
+                <a:solidFill>
+                  <a:schemeClr val="lt1"/>
+                </a:solidFill>
+                <a:latin typeface="+mn-lt"/>
+                <a:ea typeface="+mn-ea"/>
+                <a:cs typeface="+mn-cs"/>
+              </a:defRPr>
+            </a:lvl6pPr>
+            <a:lvl7pPr>
+              <a:defRPr>
+                <a:solidFill>
+                  <a:schemeClr val="lt1"/>
+                </a:solidFill>
+                <a:latin typeface="+mn-lt"/>
+                <a:ea typeface="+mn-ea"/>
+                <a:cs typeface="+mn-cs"/>
+              </a:defRPr>
+            </a:lvl7pPr>
+            <a:lvl8pPr>
+              <a:defRPr>
+                <a:solidFill>
+                  <a:schemeClr val="lt1"/>
+                </a:solidFill>
+                <a:latin typeface="+mn-lt"/>
+                <a:ea typeface="+mn-ea"/>
+                <a:cs typeface="+mn-cs"/>
+              </a:defRPr>
+            </a:lvl8pPr>
+            <a:lvl9pPr>
+              <a:defRPr>
+                <a:solidFill>
+                  <a:schemeClr val="lt1"/>
+                </a:solidFill>
+                <a:latin typeface="+mn-lt"/>
+                <a:ea typeface="+mn-ea"/>
+                <a:cs typeface="+mn-cs"/>
+              </a:defRPr>
+            </a:lvl9pPr>
+          </a:lstStyle>
+          <a:p>
+            <a:pPr algn="ctr">
+              <a:lnSpc>
+                <a:spcPct val="100000"/>
+              </a:lnSpc>
+            </a:pPr>
+            <a:r>
+              <a:rPr lang="en-IN" sz="2800" b="1" dirty="0" smtClean="0"/>
+              <a:t>Change </a:t>
+            </a:r>
+            <a:r>
+              <a:rPr lang="en-IN" sz="2800" b="1" dirty="0"/>
+              <a:t>per year in the number of listings per host on Airbnb in Berlin</a:t>
+            </a:r>
+            <a:r>
+              <a:rPr lang="en-IN" sz="2800" b="1" dirty="0" smtClean="0">
+                <a:ln w="0"/>
+                <a:solidFill>
+                  <a:schemeClr val="bg1"/>
+                </a:solidFill>
+                <a:effectLst>
+                  <a:outerShdw blurRad="38100" dist="25400" dir="5400000" algn="ctr" rotWithShape="0">
+                    <a:srgbClr val="6E747A">
+                      <a:alpha val="43000"/>
+                    </a:srgbClr>
+                  </a:outerShdw>
+                </a:effectLst>
+                <a:latin typeface="Britannic Bold" panose="020B0903060703020204" pitchFamily="34" charset="0"/>
+              </a:rPr>
+              <a:t> </a:t>
+            </a:r>
+            <a:br>
+              <a:rPr lang="en-IN" sz="2800" b="1" dirty="0" smtClean="0">
+                <a:ln w="0"/>
+                <a:solidFill>
+                  <a:schemeClr val="bg1"/>
+                </a:solidFill>
+                <a:effectLst>
+                  <a:outerShdw blurRad="38100" dist="25400" dir="5400000" algn="ctr" rotWithShape="0">
+                    <a:srgbClr val="6E747A">
+                      <a:alpha val="43000"/>
+                    </a:srgbClr>
+                  </a:outerShdw>
+                </a:effectLst>
+                <a:latin typeface="Britannic Bold" panose="020B0903060703020204" pitchFamily="34" charset="0"/>
+              </a:rPr>
+            </a:br>
+            <a:endParaRPr lang="en-IN" sz="2800" dirty="0"/>
+          </a:p>
+        </p:txBody>
+      </p:sp>
     </p:spTree>
     <p:extLst>
       <p:ext uri="{BB962C8B-B14F-4D97-AF65-F5344CB8AC3E}">
-        <p14:creationId xmlns:p14="http://schemas.microsoft.com/office/powerpoint/2010/main" val="2474232928"/>
+        <p14:creationId xmlns:p14="http://schemas.microsoft.com/office/powerpoint/2010/main" val="2586965981"/>
       </p:ext>
     </p:extLst>
   </p:cSld>
@@ -5376,200 +5376,6 @@
       </p:grpSpPr>
       <p:pic>
         <p:nvPicPr>
-          <p:cNvPr id="13" name="Picture 12"/>
-          <p:cNvPicPr>
-            <a:picLocks noChangeAspect="1"/>
-          </p:cNvPicPr>
-          <p:nvPr/>
-        </p:nvPicPr>
-        <p:blipFill>
-          <a:blip r:embed="rId2"/>
-          <a:stretch>
-            <a:fillRect/>
-          </a:stretch>
-        </p:blipFill>
-        <p:spPr>
-          <a:xfrm>
-            <a:off x="10532138" y="1024654"/>
-            <a:ext cx="1659861" cy="4076700"/>
-          </a:xfrm>
-          <a:prstGeom prst="rect">
-            <a:avLst/>
-          </a:prstGeom>
-        </p:spPr>
-      </p:pic>
-      <p:pic>
-        <p:nvPicPr>
-          <p:cNvPr id="8" name="Picture 7"/>
-          <p:cNvPicPr>
-            <a:picLocks noChangeAspect="1"/>
-          </p:cNvPicPr>
-          <p:nvPr/>
-        </p:nvPicPr>
-        <p:blipFill rotWithShape="1">
-          <a:blip r:embed="rId3">
-            <a:extLst>
-              <a:ext uri="{28A0092B-C50C-407E-A947-70E740481C1C}">
-                <a14:useLocalDpi xmlns:a14="http://schemas.microsoft.com/office/drawing/2010/main" val="0"/>
-              </a:ext>
-            </a:extLst>
-          </a:blip>
-          <a:srcRect l="3970" r="6615"/>
-          <a:stretch/>
-        </p:blipFill>
-        <p:spPr>
-          <a:xfrm>
-            <a:off x="5486400" y="106366"/>
-            <a:ext cx="4860000" cy="2717710"/>
-          </a:xfrm>
-          <a:prstGeom prst="rect">
-            <a:avLst/>
-          </a:prstGeom>
-        </p:spPr>
-      </p:pic>
-      <p:pic>
-        <p:nvPicPr>
-          <p:cNvPr id="9" name="Picture 8"/>
-          <p:cNvPicPr>
-            <a:picLocks noChangeAspect="1"/>
-          </p:cNvPicPr>
-          <p:nvPr/>
-        </p:nvPicPr>
-        <p:blipFill rotWithShape="1">
-          <a:blip r:embed="rId4">
-            <a:extLst>
-              <a:ext uri="{28A0092B-C50C-407E-A947-70E740481C1C}">
-                <a14:useLocalDpi xmlns:a14="http://schemas.microsoft.com/office/drawing/2010/main" val="0"/>
-              </a:ext>
-            </a:extLst>
-          </a:blip>
-          <a:srcRect l="4298" t="1401" r="5588" b="-1401"/>
-          <a:stretch/>
-        </p:blipFill>
-        <p:spPr>
-          <a:xfrm>
-            <a:off x="300038" y="3528501"/>
-            <a:ext cx="4860000" cy="2696580"/>
-          </a:xfrm>
-          <a:prstGeom prst="rect">
-            <a:avLst/>
-          </a:prstGeom>
-        </p:spPr>
-      </p:pic>
-      <p:pic>
-        <p:nvPicPr>
-          <p:cNvPr id="10" name="Picture 9"/>
-          <p:cNvPicPr>
-            <a:picLocks noChangeAspect="1"/>
-          </p:cNvPicPr>
-          <p:nvPr/>
-        </p:nvPicPr>
-        <p:blipFill rotWithShape="1">
-          <a:blip r:embed="rId5">
-            <a:extLst>
-              <a:ext uri="{28A0092B-C50C-407E-A947-70E740481C1C}">
-                <a14:useLocalDpi xmlns:a14="http://schemas.microsoft.com/office/drawing/2010/main" val="0"/>
-              </a:ext>
-            </a:extLst>
-          </a:blip>
-          <a:srcRect l="5582" t="-467" r="6499" b="467"/>
-          <a:stretch/>
-        </p:blipFill>
-        <p:spPr>
-          <a:xfrm>
-            <a:off x="371475" y="149228"/>
-            <a:ext cx="4860000" cy="2753665"/>
-          </a:xfrm>
-          <a:prstGeom prst="rect">
-            <a:avLst/>
-          </a:prstGeom>
-        </p:spPr>
-      </p:pic>
-      <p:pic>
-        <p:nvPicPr>
-          <p:cNvPr id="11" name="Picture 10"/>
-          <p:cNvPicPr>
-            <a:picLocks noChangeAspect="1"/>
-          </p:cNvPicPr>
-          <p:nvPr/>
-        </p:nvPicPr>
-        <p:blipFill rotWithShape="1">
-          <a:blip r:embed="rId6">
-            <a:extLst>
-              <a:ext uri="{28A0092B-C50C-407E-A947-70E740481C1C}">
-                <a14:useLocalDpi xmlns:a14="http://schemas.microsoft.com/office/drawing/2010/main" val="0"/>
-              </a:ext>
-            </a:extLst>
-          </a:blip>
-          <a:srcRect l="5230" t="-467" r="8390" b="467"/>
-          <a:stretch/>
-        </p:blipFill>
-        <p:spPr>
-          <a:xfrm>
-            <a:off x="5672138" y="3485630"/>
-            <a:ext cx="4860000" cy="2813198"/>
-          </a:xfrm>
-          <a:prstGeom prst="rect">
-            <a:avLst/>
-          </a:prstGeom>
-        </p:spPr>
-      </p:pic>
-      <p:pic>
-        <p:nvPicPr>
-          <p:cNvPr id="12" name="Picture 11"/>
-          <p:cNvPicPr>
-            <a:picLocks noChangeAspect="1"/>
-          </p:cNvPicPr>
-          <p:nvPr/>
-        </p:nvPicPr>
-        <p:blipFill>
-          <a:blip r:embed="rId7"/>
-          <a:stretch>
-            <a:fillRect/>
-          </a:stretch>
-        </p:blipFill>
-        <p:spPr>
-          <a:xfrm>
-            <a:off x="10301288" y="6400800"/>
-            <a:ext cx="1890711" cy="457200"/>
-          </a:xfrm>
-          <a:prstGeom prst="rect">
-            <a:avLst/>
-          </a:prstGeom>
-        </p:spPr>
-      </p:pic>
-    </p:spTree>
-    <p:extLst>
-      <p:ext uri="{BB962C8B-B14F-4D97-AF65-F5344CB8AC3E}">
-        <p14:creationId xmlns:p14="http://schemas.microsoft.com/office/powerpoint/2010/main" val="3879019294"/>
-      </p:ext>
-    </p:extLst>
-  </p:cSld>
-  <p:clrMapOvr>
-    <a:masterClrMapping/>
-  </p:clrMapOvr>
-</p:sld>
-</file>
-
-<file path=ppt/slides/slide18.xml><?xml version="1.0" encoding="utf-8"?>
-<p:sld xmlns:a="http://schemas.openxmlformats.org/drawingml/2006/main" xmlns:r="http://schemas.openxmlformats.org/officeDocument/2006/relationships" xmlns:p="http://schemas.openxmlformats.org/presentationml/2006/main">
-  <p:cSld>
-    <p:spTree>
-      <p:nvGrpSpPr>
-        <p:cNvPr id="1" name=""/>
-        <p:cNvGrpSpPr/>
-        <p:nvPr/>
-      </p:nvGrpSpPr>
-      <p:grpSpPr>
-        <a:xfrm>
-          <a:off x="0" y="0"/>
-          <a:ext cx="0" cy="0"/>
-          <a:chOff x="0" y="0"/>
-          <a:chExt cx="0" cy="0"/>
-        </a:xfrm>
-      </p:grpSpPr>
-      <p:pic>
-        <p:nvPicPr>
           <p:cNvPr id="3" name="Picture 2"/>
           <p:cNvPicPr>
             <a:picLocks noChangeAspect="1"/>
@@ -5893,7 +5699,7 @@
         </p:blipFill>
         <p:spPr>
           <a:xfrm>
-            <a:off x="1335087" y="1551780"/>
+            <a:off x="1177925" y="1551780"/>
             <a:ext cx="9305925" cy="4010025"/>
           </a:xfrm>
           <a:prstGeom prst="rect">
@@ -5905,6 +5711,200 @@
     <p:extLst>
       <p:ext uri="{BB962C8B-B14F-4D97-AF65-F5344CB8AC3E}">
         <p14:creationId xmlns:p14="http://schemas.microsoft.com/office/powerpoint/2010/main" val="2317851649"/>
+      </p:ext>
+    </p:extLst>
+  </p:cSld>
+  <p:clrMapOvr>
+    <a:masterClrMapping/>
+  </p:clrMapOvr>
+</p:sld>
+</file>
+
+<file path=ppt/slides/slide18.xml><?xml version="1.0" encoding="utf-8"?>
+<p:sld xmlns:a="http://schemas.openxmlformats.org/drawingml/2006/main" xmlns:r="http://schemas.openxmlformats.org/officeDocument/2006/relationships" xmlns:p="http://schemas.openxmlformats.org/presentationml/2006/main">
+  <p:cSld>
+    <p:spTree>
+      <p:nvGrpSpPr>
+        <p:cNvPr id="1" name=""/>
+        <p:cNvGrpSpPr/>
+        <p:nvPr/>
+      </p:nvGrpSpPr>
+      <p:grpSpPr>
+        <a:xfrm>
+          <a:off x="0" y="0"/>
+          <a:ext cx="0" cy="0"/>
+          <a:chOff x="0" y="0"/>
+          <a:chExt cx="0" cy="0"/>
+        </a:xfrm>
+      </p:grpSpPr>
+      <p:pic>
+        <p:nvPicPr>
+          <p:cNvPr id="13" name="Picture 12"/>
+          <p:cNvPicPr>
+            <a:picLocks noChangeAspect="1"/>
+          </p:cNvPicPr>
+          <p:nvPr/>
+        </p:nvPicPr>
+        <p:blipFill>
+          <a:blip r:embed="rId2"/>
+          <a:stretch>
+            <a:fillRect/>
+          </a:stretch>
+        </p:blipFill>
+        <p:spPr>
+          <a:xfrm>
+            <a:off x="10532138" y="1024654"/>
+            <a:ext cx="1659861" cy="4076700"/>
+          </a:xfrm>
+          <a:prstGeom prst="rect">
+            <a:avLst/>
+          </a:prstGeom>
+        </p:spPr>
+      </p:pic>
+      <p:pic>
+        <p:nvPicPr>
+          <p:cNvPr id="8" name="Picture 7"/>
+          <p:cNvPicPr>
+            <a:picLocks noChangeAspect="1"/>
+          </p:cNvPicPr>
+          <p:nvPr/>
+        </p:nvPicPr>
+        <p:blipFill rotWithShape="1">
+          <a:blip r:embed="rId3">
+            <a:extLst>
+              <a:ext uri="{28A0092B-C50C-407E-A947-70E740481C1C}">
+                <a14:useLocalDpi xmlns:a14="http://schemas.microsoft.com/office/drawing/2010/main" val="0"/>
+              </a:ext>
+            </a:extLst>
+          </a:blip>
+          <a:srcRect l="3970" r="6615"/>
+          <a:stretch/>
+        </p:blipFill>
+        <p:spPr>
+          <a:xfrm>
+            <a:off x="5486400" y="106366"/>
+            <a:ext cx="4860000" cy="2717710"/>
+          </a:xfrm>
+          <a:prstGeom prst="rect">
+            <a:avLst/>
+          </a:prstGeom>
+        </p:spPr>
+      </p:pic>
+      <p:pic>
+        <p:nvPicPr>
+          <p:cNvPr id="9" name="Picture 8"/>
+          <p:cNvPicPr>
+            <a:picLocks noChangeAspect="1"/>
+          </p:cNvPicPr>
+          <p:nvPr/>
+        </p:nvPicPr>
+        <p:blipFill rotWithShape="1">
+          <a:blip r:embed="rId4">
+            <a:extLst>
+              <a:ext uri="{28A0092B-C50C-407E-A947-70E740481C1C}">
+                <a14:useLocalDpi xmlns:a14="http://schemas.microsoft.com/office/drawing/2010/main" val="0"/>
+              </a:ext>
+            </a:extLst>
+          </a:blip>
+          <a:srcRect l="4298" t="1401" r="5588" b="-1401"/>
+          <a:stretch/>
+        </p:blipFill>
+        <p:spPr>
+          <a:xfrm>
+            <a:off x="300038" y="3528501"/>
+            <a:ext cx="4860000" cy="2696580"/>
+          </a:xfrm>
+          <a:prstGeom prst="rect">
+            <a:avLst/>
+          </a:prstGeom>
+        </p:spPr>
+      </p:pic>
+      <p:pic>
+        <p:nvPicPr>
+          <p:cNvPr id="10" name="Picture 9"/>
+          <p:cNvPicPr>
+            <a:picLocks noChangeAspect="1"/>
+          </p:cNvPicPr>
+          <p:nvPr/>
+        </p:nvPicPr>
+        <p:blipFill rotWithShape="1">
+          <a:blip r:embed="rId5">
+            <a:extLst>
+              <a:ext uri="{28A0092B-C50C-407E-A947-70E740481C1C}">
+                <a14:useLocalDpi xmlns:a14="http://schemas.microsoft.com/office/drawing/2010/main" val="0"/>
+              </a:ext>
+            </a:extLst>
+          </a:blip>
+          <a:srcRect l="5582" t="-467" r="6499" b="467"/>
+          <a:stretch/>
+        </p:blipFill>
+        <p:spPr>
+          <a:xfrm>
+            <a:off x="371475" y="149228"/>
+            <a:ext cx="4860000" cy="2753665"/>
+          </a:xfrm>
+          <a:prstGeom prst="rect">
+            <a:avLst/>
+          </a:prstGeom>
+        </p:spPr>
+      </p:pic>
+      <p:pic>
+        <p:nvPicPr>
+          <p:cNvPr id="11" name="Picture 10"/>
+          <p:cNvPicPr>
+            <a:picLocks noChangeAspect="1"/>
+          </p:cNvPicPr>
+          <p:nvPr/>
+        </p:nvPicPr>
+        <p:blipFill rotWithShape="1">
+          <a:blip r:embed="rId6">
+            <a:extLst>
+              <a:ext uri="{28A0092B-C50C-407E-A947-70E740481C1C}">
+                <a14:useLocalDpi xmlns:a14="http://schemas.microsoft.com/office/drawing/2010/main" val="0"/>
+              </a:ext>
+            </a:extLst>
+          </a:blip>
+          <a:srcRect l="5230" t="-467" r="8390" b="467"/>
+          <a:stretch/>
+        </p:blipFill>
+        <p:spPr>
+          <a:xfrm>
+            <a:off x="5672138" y="3485630"/>
+            <a:ext cx="4860000" cy="2813198"/>
+          </a:xfrm>
+          <a:prstGeom prst="rect">
+            <a:avLst/>
+          </a:prstGeom>
+        </p:spPr>
+      </p:pic>
+      <p:pic>
+        <p:nvPicPr>
+          <p:cNvPr id="12" name="Picture 11"/>
+          <p:cNvPicPr>
+            <a:picLocks noChangeAspect="1"/>
+          </p:cNvPicPr>
+          <p:nvPr/>
+        </p:nvPicPr>
+        <p:blipFill>
+          <a:blip r:embed="rId7"/>
+          <a:stretch>
+            <a:fillRect/>
+          </a:stretch>
+        </p:blipFill>
+        <p:spPr>
+          <a:xfrm>
+            <a:off x="10301288" y="6400800"/>
+            <a:ext cx="1890711" cy="457200"/>
+          </a:xfrm>
+          <a:prstGeom prst="rect">
+            <a:avLst/>
+          </a:prstGeom>
+        </p:spPr>
+      </p:pic>
+    </p:spTree>
+    <p:extLst>
+      <p:ext uri="{BB962C8B-B14F-4D97-AF65-F5344CB8AC3E}">
+        <p14:creationId xmlns:p14="http://schemas.microsoft.com/office/powerpoint/2010/main" val="3879019294"/>
       </p:ext>
     </p:extLst>
   </p:cSld>
@@ -5933,6 +5933,102 @@
       </p:grpSpPr>
       <p:pic>
         <p:nvPicPr>
+          <p:cNvPr id="15" name="Picture 14"/>
+          <p:cNvPicPr>
+            <a:picLocks noChangeAspect="1"/>
+          </p:cNvPicPr>
+          <p:nvPr/>
+        </p:nvPicPr>
+        <p:blipFill>
+          <a:blip r:embed="rId2"/>
+          <a:stretch>
+            <a:fillRect/>
+          </a:stretch>
+        </p:blipFill>
+        <p:spPr>
+          <a:xfrm>
+            <a:off x="1647909" y="1275346"/>
+            <a:ext cx="3869016" cy="2556000"/>
+          </a:xfrm>
+          <a:prstGeom prst="rect">
+            <a:avLst/>
+          </a:prstGeom>
+        </p:spPr>
+      </p:pic>
+      <p:pic>
+        <p:nvPicPr>
+          <p:cNvPr id="16" name="Picture 15"/>
+          <p:cNvPicPr>
+            <a:picLocks noChangeAspect="1"/>
+          </p:cNvPicPr>
+          <p:nvPr/>
+        </p:nvPicPr>
+        <p:blipFill>
+          <a:blip r:embed="rId3"/>
+          <a:stretch>
+            <a:fillRect/>
+          </a:stretch>
+        </p:blipFill>
+        <p:spPr>
+          <a:xfrm>
+            <a:off x="7442025" y="1146028"/>
+            <a:ext cx="2663999" cy="2520000"/>
+          </a:xfrm>
+          <a:prstGeom prst="rect">
+            <a:avLst/>
+          </a:prstGeom>
+        </p:spPr>
+      </p:pic>
+      <p:pic>
+        <p:nvPicPr>
+          <p:cNvPr id="11" name="Picture 10"/>
+          <p:cNvPicPr>
+            <a:picLocks noChangeAspect="1"/>
+          </p:cNvPicPr>
+          <p:nvPr/>
+        </p:nvPicPr>
+        <p:blipFill>
+          <a:blip r:embed="rId4"/>
+          <a:stretch>
+            <a:fillRect/>
+          </a:stretch>
+        </p:blipFill>
+        <p:spPr>
+          <a:xfrm>
+            <a:off x="1471613" y="3762878"/>
+            <a:ext cx="3876870" cy="2556000"/>
+          </a:xfrm>
+          <a:prstGeom prst="rect">
+            <a:avLst/>
+          </a:prstGeom>
+        </p:spPr>
+      </p:pic>
+      <p:pic>
+        <p:nvPicPr>
+          <p:cNvPr id="12" name="Picture 11"/>
+          <p:cNvPicPr>
+            <a:picLocks noChangeAspect="1"/>
+          </p:cNvPicPr>
+          <p:nvPr/>
+        </p:nvPicPr>
+        <p:blipFill>
+          <a:blip r:embed="rId5"/>
+          <a:stretch>
+            <a:fillRect/>
+          </a:stretch>
+        </p:blipFill>
+        <p:spPr>
+          <a:xfrm>
+            <a:off x="7200898" y="3676558"/>
+            <a:ext cx="3530209" cy="2520000"/>
+          </a:xfrm>
+          <a:prstGeom prst="rect">
+            <a:avLst/>
+          </a:prstGeom>
+        </p:spPr>
+      </p:pic>
+      <p:pic>
+        <p:nvPicPr>
           <p:cNvPr id="4" name="Picture 3"/>
           <p:cNvPicPr>
             <a:picLocks noChangeAspect="1"/>
@@ -5940,7 +6036,7 @@
           <p:nvPr/>
         </p:nvPicPr>
         <p:blipFill>
-          <a:blip r:embed="rId2"/>
+          <a:blip r:embed="rId6"/>
           <a:stretch>
             <a:fillRect/>
           </a:stretch>
@@ -6213,7 +6309,7 @@
                 </a:effectLst>
                 <a:latin typeface="Britannic Bold" panose="020B0903060703020204" pitchFamily="34" charset="0"/>
               </a:rPr>
-              <a:t>Property Types Vs Price </a:t>
+              <a:t>Property , Room Types Vs Price </a:t>
             </a:r>
             <a:br>
               <a:rPr lang="en-IN" sz="3200" b="1" dirty="0" smtClean="0">
@@ -6235,54 +6331,6 @@
           </a:p>
         </p:txBody>
       </p:sp>
-      <p:pic>
-        <p:nvPicPr>
-          <p:cNvPr id="9" name="Picture 8"/>
-          <p:cNvPicPr>
-            <a:picLocks noChangeAspect="1"/>
-          </p:cNvPicPr>
-          <p:nvPr/>
-        </p:nvPicPr>
-        <p:blipFill>
-          <a:blip r:embed="rId3"/>
-          <a:stretch>
-            <a:fillRect/>
-          </a:stretch>
-        </p:blipFill>
-        <p:spPr>
-          <a:xfrm>
-            <a:off x="1333501" y="1890713"/>
-            <a:ext cx="5486400" cy="3681412"/>
-          </a:xfrm>
-          <a:prstGeom prst="rect">
-            <a:avLst/>
-          </a:prstGeom>
-        </p:spPr>
-      </p:pic>
-      <p:pic>
-        <p:nvPicPr>
-          <p:cNvPr id="10" name="Picture 9"/>
-          <p:cNvPicPr>
-            <a:picLocks noChangeAspect="1"/>
-          </p:cNvPicPr>
-          <p:nvPr/>
-        </p:nvPicPr>
-        <p:blipFill>
-          <a:blip r:embed="rId4"/>
-          <a:stretch>
-            <a:fillRect/>
-          </a:stretch>
-        </p:blipFill>
-        <p:spPr>
-          <a:xfrm>
-            <a:off x="7258050" y="2014540"/>
-            <a:ext cx="3657600" cy="3200400"/>
-          </a:xfrm>
-          <a:prstGeom prst="rect">
-            <a:avLst/>
-          </a:prstGeom>
-        </p:spPr>
-      </p:pic>
     </p:spTree>
     <p:extLst>
       <p:ext uri="{BB962C8B-B14F-4D97-AF65-F5344CB8AC3E}">
@@ -6917,7 +6965,7 @@
                 </a:effectLst>
                 <a:latin typeface="Britannic Bold" panose="020B0903060703020204" pitchFamily="34" charset="0"/>
               </a:rPr>
-              <a:t>Neighbourhood Vs Price </a:t>
+              <a:t>Neighbourhood Vs Profit </a:t>
             </a:r>
             <a:br>
               <a:rPr lang="en-IN" sz="3200" b="1" dirty="0" smtClean="0">
@@ -7917,11 +7965,26 @@
               <a:buFont typeface="Wingdings" panose="05000000000000000000" pitchFamily="2" charset="2"/>
               <a:buChar char="Ø"/>
             </a:pPr>
+            <a:endParaRPr lang="en-IN" sz="2400" dirty="0" smtClean="0">
+              <a:hlinkClick r:id="rId2"/>
+            </a:endParaRPr>
+          </a:p>
+          <a:p>
+            <a:pPr>
+              <a:buFont typeface="Wingdings" panose="05000000000000000000" pitchFamily="2" charset="2"/>
+              <a:buChar char="Ø"/>
+            </a:pPr>
+            <a:r>
+              <a:rPr lang="en-IN" sz="2400" dirty="0" smtClean="0">
+                <a:hlinkClick r:id="rId2"/>
+              </a:rPr>
+              <a:t>http</a:t>
+            </a:r>
             <a:r>
               <a:rPr lang="en-IN" sz="2400" dirty="0">
                 <a:hlinkClick r:id="rId2"/>
               </a:rPr>
-              <a:t>http://insideairbnb.com/berlin/</a:t>
+              <a:t>://insideairbnb.com/berlin/</a:t>
             </a:r>
             <a:endParaRPr lang="en-IN" sz="2400" u="sng" dirty="0" smtClean="0">
               <a:hlinkClick r:id="rId3"/>

</xml_diff>